<commit_message>
New version of git presentation using my-isc-work example
</commit_message>
<xml_diff>
--- a/shell/presentations/01_git1.pptx
+++ b/shell/presentations/01_git1.pptx
@@ -5,7 +5,7 @@
     <p:sldMasterId id="2147483648" r:id="rId1"/>
   </p:sldMasterIdLst>
   <p:notesMasterIdLst>
-    <p:notesMasterId r:id="rId15"/>
+    <p:notesMasterId r:id="rId17"/>
   </p:notesMasterIdLst>
   <p:sldIdLst>
     <p:sldId id="256" r:id="rId2"/>
@@ -17,10 +17,12 @@
     <p:sldId id="501" r:id="rId8"/>
     <p:sldId id="502" r:id="rId9"/>
     <p:sldId id="519" r:id="rId10"/>
-    <p:sldId id="514" r:id="rId11"/>
+    <p:sldId id="540" r:id="rId11"/>
     <p:sldId id="515" r:id="rId12"/>
     <p:sldId id="531" r:id="rId13"/>
-    <p:sldId id="539" r:id="rId14"/>
+    <p:sldId id="541" r:id="rId14"/>
+    <p:sldId id="542" r:id="rId15"/>
+    <p:sldId id="539" r:id="rId16"/>
   </p:sldIdLst>
   <p:sldSz cx="9144000" cy="6858000" type="screen4x3"/>
   <p:notesSz cx="6858000" cy="9144000"/>
@@ -149,6 +151,22 @@
       </a:defRPr>
     </a:lvl9pPr>
   </p:defaultTextStyle>
+  <p:extLst>
+    <p:ext uri="{EFAFB233-063F-42B5-8137-9DF3F51BA10A}">
+      <p15:sldGuideLst xmlns:p15="http://schemas.microsoft.com/office/powerpoint/2012/main">
+        <p15:guide id="1" orient="horz" pos="2160">
+          <p15:clr>
+            <a:srgbClr val="A4A3A4"/>
+          </p15:clr>
+        </p15:guide>
+        <p15:guide id="2" pos="2880">
+          <p15:clr>
+            <a:srgbClr val="A4A3A4"/>
+          </p15:clr>
+        </p15:guide>
+      </p15:sldGuideLst>
+    </p:ext>
+  </p:extLst>
 </p:presentation>
 </file>
 
@@ -249,7 +267,7 @@
             <a:fld id="{17F80633-BAA2-0049-BDEC-E483C21777A6}" type="datetimeFigureOut">
               <a:rPr lang="en-GB"/>
               <a:pPr/>
-              <a:t>23/02/17</a:t>
+              <a:t>30/10/2017</a:t>
             </a:fld>
             <a:endParaRPr lang="en-GB"/>
           </a:p>
@@ -601,14 +619,14 @@
           <a:noFill/>
           <a:extLst>
             <a:ext uri="{909E8E84-426E-40dd-AFC4-6F175D3DCCD1}">
-              <a14:hiddenFill xmlns:a14="http://schemas.microsoft.com/office/drawing/2010/main">
+              <a14:hiddenFill xmlns:a14="http://schemas.microsoft.com/office/drawing/2010/main" xmlns="">
                 <a:solidFill>
                   <a:srgbClr val="FFFFFF"/>
                 </a:solidFill>
               </a14:hiddenFill>
             </a:ext>
             <a:ext uri="{91240B29-F687-4f45-9708-019B960494DF}">
-              <a14:hiddenLine xmlns:a14="http://schemas.microsoft.com/office/drawing/2010/main" w="9525">
+              <a14:hiddenLine xmlns:a14="http://schemas.microsoft.com/office/drawing/2010/main" xmlns="" w="9525">
                 <a:solidFill>
                   <a:srgbClr val="000000"/>
                 </a:solidFill>
@@ -803,15 +821,18 @@
           </a:xfrm>
           <a:noFill/>
           <a:extLst>
+            <a:ext uri="{FAA26D3D-D897-4be2-8F04-BA451C77F1D7}">
+              <ma14:placeholderFlag xmlns:ma14="http://schemas.microsoft.com/office/mac/drawingml/2011/main" val="1"/>
+            </a:ext>
             <a:ext uri="{909E8E84-426E-40dd-AFC4-6F175D3DCCD1}">
-              <a14:hiddenFill xmlns:a14="http://schemas.microsoft.com/office/drawing/2010/main">
+              <a14:hiddenFill xmlns:a14="http://schemas.microsoft.com/office/drawing/2010/main" xmlns="">
                 <a:solidFill>
                   <a:srgbClr val="FFFFFF"/>
                 </a:solidFill>
               </a14:hiddenFill>
             </a:ext>
             <a:ext uri="{91240B29-F687-4f45-9708-019B960494DF}">
-              <a14:hiddenLine xmlns:a14="http://schemas.microsoft.com/office/drawing/2010/main" w="9525">
+              <a14:hiddenLine xmlns:a14="http://schemas.microsoft.com/office/drawing/2010/main" xmlns="" w="9525">
                 <a:solidFill>
                   <a:srgbClr val="000000"/>
                 </a:solidFill>
@@ -819,9 +840,6 @@
                 <a:headEnd/>
                 <a:tailEnd/>
               </a14:hiddenLine>
-            </a:ext>
-            <a:ext uri="{FAA26D3D-D897-4be2-8F04-BA451C77F1D7}">
-              <ma14:placeholderFlag xmlns:ma14="http://schemas.microsoft.com/office/mac/drawingml/2011/main" val="1"/>
             </a:ext>
           </a:extLst>
         </p:spPr>
@@ -893,14 +911,14 @@
           <a:noFill/>
           <a:extLst>
             <a:ext uri="{909E8E84-426E-40dd-AFC4-6F175D3DCCD1}">
-              <a14:hiddenFill xmlns:a14="http://schemas.microsoft.com/office/drawing/2010/main">
+              <a14:hiddenFill xmlns:a14="http://schemas.microsoft.com/office/drawing/2010/main" xmlns="">
                 <a:solidFill>
                   <a:srgbClr val="FFFFFF"/>
                 </a:solidFill>
               </a14:hiddenFill>
             </a:ext>
             <a:ext uri="{91240B29-F687-4f45-9708-019B960494DF}">
-              <a14:hiddenLine xmlns:a14="http://schemas.microsoft.com/office/drawing/2010/main" w="9525">
+              <a14:hiddenLine xmlns:a14="http://schemas.microsoft.com/office/drawing/2010/main" xmlns="" w="9525">
                 <a:solidFill>
                   <a:srgbClr val="000000"/>
                 </a:solidFill>
@@ -1096,14 +1114,14 @@
           <a:noFill/>
           <a:extLst>
             <a:ext uri="{909E8E84-426E-40dd-AFC4-6F175D3DCCD1}">
-              <a14:hiddenFill xmlns:a14="http://schemas.microsoft.com/office/drawing/2010/main">
+              <a14:hiddenFill xmlns:a14="http://schemas.microsoft.com/office/drawing/2010/main" xmlns="">
                 <a:solidFill>
                   <a:srgbClr val="FFFFFF"/>
                 </a:solidFill>
               </a14:hiddenFill>
             </a:ext>
             <a:ext uri="{91240B29-F687-4f45-9708-019B960494DF}">
-              <a14:hiddenLine xmlns:a14="http://schemas.microsoft.com/office/drawing/2010/main" w="9525">
+              <a14:hiddenLine xmlns:a14="http://schemas.microsoft.com/office/drawing/2010/main" xmlns="" w="9525">
                 <a:solidFill>
                   <a:srgbClr val="000000"/>
                 </a:solidFill>
@@ -1199,15 +1217,15 @@
             <a:tailEnd/>
           </a:ln>
           <a:extLst>
-            <a:ext uri="{909E8E84-426E-40dd-AFC4-6F175D3DCCD1}">
-              <a14:hiddenFill xmlns:a14="http://schemas.microsoft.com/office/drawing/2010/main">
-                <a:solidFill>
-                  <a:srgbClr val="FFFFFF"/>
-                </a:solidFill>
-              </a14:hiddenFill>
-            </a:ext>
             <a:ext uri="{FAA26D3D-D897-4be2-8F04-BA451C77F1D7}">
               <ma14:placeholderFlag xmlns:ma14="http://schemas.microsoft.com/office/mac/drawingml/2011/main" val="1"/>
+            </a:ext>
+            <a:ext uri="{909E8E84-426E-40dd-AFC4-6F175D3DCCD1}">
+              <a14:hiddenFill xmlns:a14="http://schemas.microsoft.com/office/drawing/2010/main" xmlns="">
+                <a:solidFill>
+                  <a:srgbClr val="FFFFFF"/>
+                </a:solidFill>
+              </a14:hiddenFill>
             </a:ext>
           </a:extLst>
         </p:spPr>
@@ -1226,14 +1244,14 @@
           <a:noFill/>
           <a:extLst>
             <a:ext uri="{909E8E84-426E-40dd-AFC4-6F175D3DCCD1}">
-              <a14:hiddenFill xmlns:a14="http://schemas.microsoft.com/office/drawing/2010/main">
+              <a14:hiddenFill xmlns:a14="http://schemas.microsoft.com/office/drawing/2010/main" xmlns="">
                 <a:solidFill>
                   <a:srgbClr val="FFFFFF"/>
                 </a:solidFill>
               </a14:hiddenFill>
             </a:ext>
             <a:ext uri="{91240B29-F687-4f45-9708-019B960494DF}">
-              <a14:hiddenLine xmlns:a14="http://schemas.microsoft.com/office/drawing/2010/main" w="9525">
+              <a14:hiddenLine xmlns:a14="http://schemas.microsoft.com/office/drawing/2010/main" xmlns="" w="9525">
                 <a:solidFill>
                   <a:srgbClr val="000000"/>
                 </a:solidFill>
@@ -1275,14 +1293,14 @@
           <a:noFill/>
           <a:extLst>
             <a:ext uri="{909E8E84-426E-40dd-AFC4-6F175D3DCCD1}">
-              <a14:hiddenFill xmlns:a14="http://schemas.microsoft.com/office/drawing/2010/main">
+              <a14:hiddenFill xmlns:a14="http://schemas.microsoft.com/office/drawing/2010/main" xmlns="">
                 <a:solidFill>
                   <a:srgbClr val="FFFFFF"/>
                 </a:solidFill>
               </a14:hiddenFill>
             </a:ext>
             <a:ext uri="{91240B29-F687-4f45-9708-019B960494DF}">
-              <a14:hiddenLine xmlns:a14="http://schemas.microsoft.com/office/drawing/2010/main" w="9525">
+              <a14:hiddenLine xmlns:a14="http://schemas.microsoft.com/office/drawing/2010/main" xmlns="" w="9525">
                 <a:solidFill>
                   <a:srgbClr val="000000"/>
                 </a:solidFill>
@@ -1610,7 +1628,7 @@
             <a:fld id="{B7A367C5-1E2C-CB49-90C2-50C3BE82679A}" type="datetimeFigureOut">
               <a:rPr lang="en-GB"/>
               <a:pPr/>
-              <a:t>23/02/17</a:t>
+              <a:t>30/10/2017</a:t>
             </a:fld>
             <a:endParaRPr lang="en-GB"/>
           </a:p>
@@ -1797,7 +1815,7 @@
             <a:fld id="{1AF0192A-B5CE-2E46-846F-9DA536A07A6F}" type="datetimeFigureOut">
               <a:rPr lang="en-GB"/>
               <a:pPr/>
-              <a:t>23/02/17</a:t>
+              <a:t>30/10/2017</a:t>
             </a:fld>
             <a:endParaRPr lang="en-GB"/>
           </a:p>
@@ -1994,7 +2012,7 @@
             <a:fld id="{14964D74-F6FD-584B-8773-DA379A568572}" type="datetimeFigureOut">
               <a:rPr lang="en-GB"/>
               <a:pPr/>
-              <a:t>23/02/17</a:t>
+              <a:t>30/10/2017</a:t>
             </a:fld>
             <a:endParaRPr lang="en-GB"/>
           </a:p>
@@ -2181,7 +2199,7 @@
             <a:fld id="{FA908017-0343-2E4A-A971-A34E43823FE2}" type="datetimeFigureOut">
               <a:rPr lang="en-GB"/>
               <a:pPr/>
-              <a:t>23/02/17</a:t>
+              <a:t>30/10/2017</a:t>
             </a:fld>
             <a:endParaRPr lang="en-GB"/>
           </a:p>
@@ -2444,7 +2462,7 @@
             <a:fld id="{7262627B-B807-9440-AD38-D8B4DA6F586E}" type="datetimeFigureOut">
               <a:rPr lang="en-GB"/>
               <a:pPr/>
-              <a:t>23/02/17</a:t>
+              <a:t>30/10/2017</a:t>
             </a:fld>
             <a:endParaRPr lang="en-GB"/>
           </a:p>
@@ -2749,7 +2767,7 @@
             <a:fld id="{96AD9194-77F4-8A47-892A-B7B6CD36162F}" type="datetimeFigureOut">
               <a:rPr lang="en-GB"/>
               <a:pPr/>
-              <a:t>23/02/17</a:t>
+              <a:t>30/10/2017</a:t>
             </a:fld>
             <a:endParaRPr lang="en-GB"/>
           </a:p>
@@ -3188,7 +3206,7 @@
             <a:fld id="{AA9A3B28-0B63-874E-ACA7-CC8A68737EB4}" type="datetimeFigureOut">
               <a:rPr lang="en-GB"/>
               <a:pPr/>
-              <a:t>23/02/17</a:t>
+              <a:t>30/10/2017</a:t>
             </a:fld>
             <a:endParaRPr lang="en-GB"/>
           </a:p>
@@ -3323,7 +3341,7 @@
             <a:fld id="{91345AEA-5A42-614B-8C2F-EAF77C40756C}" type="datetimeFigureOut">
               <a:rPr lang="en-GB"/>
               <a:pPr/>
-              <a:t>23/02/17</a:t>
+              <a:t>30/10/2017</a:t>
             </a:fld>
             <a:endParaRPr lang="en-GB"/>
           </a:p>
@@ -3435,7 +3453,7 @@
             <a:fld id="{F967FF78-FFF3-D94C-8CB8-21E3487233EA}" type="datetimeFigureOut">
               <a:rPr lang="en-GB"/>
               <a:pPr/>
-              <a:t>23/02/17</a:t>
+              <a:t>30/10/2017</a:t>
             </a:fld>
             <a:endParaRPr lang="en-GB"/>
           </a:p>
@@ -3729,7 +3747,7 @@
             <a:fld id="{9F21DFAE-376C-6746-8A99-31F1B1243D38}" type="datetimeFigureOut">
               <a:rPr lang="en-GB"/>
               <a:pPr/>
-              <a:t>23/02/17</a:t>
+              <a:t>30/10/2017</a:t>
             </a:fld>
             <a:endParaRPr lang="en-GB"/>
           </a:p>
@@ -4002,7 +4020,7 @@
             <a:fld id="{9CC96C97-DE49-4347-998C-7CD167784C4D}" type="datetimeFigureOut">
               <a:rPr lang="en-GB"/>
               <a:pPr/>
-              <a:t>23/02/17</a:t>
+              <a:t>30/10/2017</a:t>
             </a:fld>
             <a:endParaRPr lang="en-GB"/>
           </a:p>
@@ -4123,15 +4141,18 @@
             <a:noFill/>
           </a:ln>
           <a:extLst>
+            <a:ext uri="{FAA26D3D-D897-4be2-8F04-BA451C77F1D7}">
+              <ma14:placeholderFlag xmlns:ma14="http://schemas.microsoft.com/office/mac/drawingml/2011/main" val="1"/>
+            </a:ext>
             <a:ext uri="{909E8E84-426E-40dd-AFC4-6F175D3DCCD1}">
-              <a14:hiddenFill xmlns:a14="http://schemas.microsoft.com/office/drawing/2010/main">
+              <a14:hiddenFill xmlns:a14="http://schemas.microsoft.com/office/drawing/2010/main" xmlns="">
                 <a:solidFill>
                   <a:srgbClr val="FFFFFF"/>
                 </a:solidFill>
               </a14:hiddenFill>
             </a:ext>
             <a:ext uri="{91240B29-F687-4f45-9708-019B960494DF}">
-              <a14:hiddenLine xmlns:a14="http://schemas.microsoft.com/office/drawing/2010/main" w="9525">
+              <a14:hiddenLine xmlns:a14="http://schemas.microsoft.com/office/drawing/2010/main" xmlns="" w="9525">
                 <a:solidFill>
                   <a:srgbClr val="000000"/>
                 </a:solidFill>
@@ -4139,9 +4160,6 @@
                 <a:headEnd/>
                 <a:tailEnd/>
               </a14:hiddenLine>
-            </a:ext>
-            <a:ext uri="{FAA26D3D-D897-4be2-8F04-BA451C77F1D7}">
-              <ma14:placeholderFlag xmlns:ma14="http://schemas.microsoft.com/office/mac/drawingml/2011/main" val="1"/>
             </a:ext>
           </a:extLst>
         </p:spPr>
@@ -4185,15 +4203,18 @@
             <a:noFill/>
           </a:ln>
           <a:extLst>
+            <a:ext uri="{FAA26D3D-D897-4be2-8F04-BA451C77F1D7}">
+              <ma14:placeholderFlag xmlns:ma14="http://schemas.microsoft.com/office/mac/drawingml/2011/main" val="1"/>
+            </a:ext>
             <a:ext uri="{909E8E84-426E-40dd-AFC4-6F175D3DCCD1}">
-              <a14:hiddenFill xmlns:a14="http://schemas.microsoft.com/office/drawing/2010/main">
+              <a14:hiddenFill xmlns:a14="http://schemas.microsoft.com/office/drawing/2010/main" xmlns="">
                 <a:solidFill>
                   <a:srgbClr val="FFFFFF"/>
                 </a:solidFill>
               </a14:hiddenFill>
             </a:ext>
             <a:ext uri="{91240B29-F687-4f45-9708-019B960494DF}">
-              <a14:hiddenLine xmlns:a14="http://schemas.microsoft.com/office/drawing/2010/main" w="9525">
+              <a14:hiddenLine xmlns:a14="http://schemas.microsoft.com/office/drawing/2010/main" xmlns="" w="9525">
                 <a:solidFill>
                   <a:srgbClr val="000000"/>
                 </a:solidFill>
@@ -4201,9 +4222,6 @@
                 <a:headEnd/>
                 <a:tailEnd/>
               </a14:hiddenLine>
-            </a:ext>
-            <a:ext uri="{FAA26D3D-D897-4be2-8F04-BA451C77F1D7}">
-              <ma14:placeholderFlag xmlns:ma14="http://schemas.microsoft.com/office/mac/drawingml/2011/main" val="1"/>
             </a:ext>
           </a:extLst>
         </p:spPr>
@@ -4291,7 +4309,7 @@
             <a:fld id="{EC40E7FB-B30A-A942-A21D-EE0E54040989}" type="datetimeFigureOut">
               <a:rPr lang="en-GB"/>
               <a:pPr/>
-              <a:t>23/02/17</a:t>
+              <a:t>30/10/2017</a:t>
             </a:fld>
             <a:endParaRPr lang="en-GB"/>
           </a:p>
@@ -4426,14 +4444,14 @@
           </a:ln>
           <a:extLst>
             <a:ext uri="{909E8E84-426E-40dd-AFC4-6F175D3DCCD1}">
-              <a14:hiddenFill xmlns:a14="http://schemas.microsoft.com/office/drawing/2010/main">
+              <a14:hiddenFill xmlns:a14="http://schemas.microsoft.com/office/drawing/2010/main" xmlns="">
                 <a:solidFill>
                   <a:srgbClr val="FFFFFF"/>
                 </a:solidFill>
               </a14:hiddenFill>
             </a:ext>
             <a:ext uri="{91240B29-F687-4f45-9708-019B960494DF}">
-              <a14:hiddenLine xmlns:a14="http://schemas.microsoft.com/office/drawing/2010/main" w="9525">
+              <a14:hiddenLine xmlns:a14="http://schemas.microsoft.com/office/drawing/2010/main" xmlns="" w="9525">
                 <a:solidFill>
                   <a:srgbClr val="000000"/>
                 </a:solidFill>
@@ -4480,14 +4498,14 @@
           </a:ln>
           <a:extLst>
             <a:ext uri="{909E8E84-426E-40dd-AFC4-6F175D3DCCD1}">
-              <a14:hiddenFill xmlns:a14="http://schemas.microsoft.com/office/drawing/2010/main">
+              <a14:hiddenFill xmlns:a14="http://schemas.microsoft.com/office/drawing/2010/main" xmlns="">
                 <a:solidFill>
                   <a:srgbClr val="FFFFFF"/>
                 </a:solidFill>
               </a14:hiddenFill>
             </a:ext>
             <a:ext uri="{91240B29-F687-4f45-9708-019B960494DF}">
-              <a14:hiddenLine xmlns:a14="http://schemas.microsoft.com/office/drawing/2010/main" w="9525">
+              <a14:hiddenLine xmlns:a14="http://schemas.microsoft.com/office/drawing/2010/main" xmlns="" w="9525">
                 <a:solidFill>
                   <a:srgbClr val="000000"/>
                 </a:solidFill>
@@ -5062,14 +5080,14 @@
           </a:ln>
           <a:extLst>
             <a:ext uri="{909E8E84-426E-40dd-AFC4-6F175D3DCCD1}">
-              <a14:hiddenFill xmlns:a14="http://schemas.microsoft.com/office/drawing/2010/main">
+              <a14:hiddenFill xmlns:a14="http://schemas.microsoft.com/office/drawing/2010/main" xmlns="">
                 <a:solidFill>
                   <a:srgbClr val="FFFFFF"/>
                 </a:solidFill>
               </a14:hiddenFill>
             </a:ext>
             <a:ext uri="{91240B29-F687-4f45-9708-019B960494DF}">
-              <a14:hiddenLine xmlns:a14="http://schemas.microsoft.com/office/drawing/2010/main" w="9525">
+              <a14:hiddenLine xmlns:a14="http://schemas.microsoft.com/office/drawing/2010/main" xmlns="" w="9525">
                 <a:solidFill>
                   <a:srgbClr val="000000"/>
                 </a:solidFill>
@@ -5116,14 +5134,14 @@
           </a:ln>
           <a:extLst>
             <a:ext uri="{909E8E84-426E-40dd-AFC4-6F175D3DCCD1}">
-              <a14:hiddenFill xmlns:a14="http://schemas.microsoft.com/office/drawing/2010/main">
+              <a14:hiddenFill xmlns:a14="http://schemas.microsoft.com/office/drawing/2010/main" xmlns="">
                 <a:solidFill>
                   <a:srgbClr val="FFFFFF"/>
                 </a:solidFill>
               </a14:hiddenFill>
             </a:ext>
             <a:ext uri="{91240B29-F687-4f45-9708-019B960494DF}">
-              <a14:hiddenLine xmlns:a14="http://schemas.microsoft.com/office/drawing/2010/main" w="9525">
+              <a14:hiddenLine xmlns:a14="http://schemas.microsoft.com/office/drawing/2010/main" xmlns="" w="9525">
                 <a:solidFill>
                   <a:srgbClr val="000000"/>
                 </a:solidFill>
@@ -5143,7 +5161,7 @@
   <p:timing>
     <p:tnLst>
       <p:par>
-        <p:cTn xmlns:p14="http://schemas.microsoft.com/office/powerpoint/2010/main" id="1" dur="indefinite" restart="never" nodeType="tmRoot"/>
+        <p:cTn id="1" dur="indefinite" restart="never" nodeType="tmRoot"/>
       </p:par>
     </p:tnLst>
   </p:timing>
@@ -5167,225 +5185,348 @@
           <a:chExt cx="0" cy="0"/>
         </a:xfrm>
       </p:grpSpPr>
-      <p:sp>
-        <p:nvSpPr>
-          <p:cNvPr id="31746" name="Title 1"/>
-          <p:cNvSpPr>
-            <a:spLocks noGrp="1"/>
-          </p:cNvSpPr>
-          <p:nvPr>
-            <p:ph type="title"/>
-          </p:nvPr>
-        </p:nvSpPr>
-        <p:spPr/>
-        <p:txBody>
-          <a:bodyPr/>
-          <a:lstStyle/>
-          <a:p>
-            <a:r>
-              <a:rPr lang="en-GB">
-                <a:latin typeface="Calibri" charset="0"/>
-              </a:rPr>
-              <a:t>Fork the "ncas-isc" repository</a:t>
-            </a:r>
-          </a:p>
-        </p:txBody>
-      </p:sp>
-      <p:sp>
-        <p:nvSpPr>
-          <p:cNvPr id="31747" name="Content Placeholder 2"/>
-          <p:cNvSpPr>
-            <a:spLocks noGrp="1"/>
-          </p:cNvSpPr>
-          <p:nvPr>
-            <p:ph idx="1"/>
-          </p:nvPr>
-        </p:nvSpPr>
-        <p:spPr/>
-        <p:txBody>
-          <a:bodyPr/>
-          <a:lstStyle/>
-          <a:p>
-            <a:pPr marL="0" indent="0">
-              <a:buFont typeface="Arial" charset="0"/>
-              <a:buNone/>
-            </a:pPr>
-            <a:r>
-              <a:rPr lang="en-GB">
-                <a:latin typeface="Calibri" charset="0"/>
-              </a:rPr>
-              <a:t>Go to the "ncas-isc" repository:</a:t>
-            </a:r>
-          </a:p>
-          <a:p>
-            <a:pPr marL="0" indent="0">
-              <a:buFont typeface="Arial" charset="0"/>
-              <a:buNone/>
-            </a:pPr>
-            <a:r>
-              <a:rPr lang="en-GB">
-                <a:latin typeface="Calibri" charset="0"/>
-              </a:rPr>
-              <a:t>	</a:t>
-            </a:r>
-            <a:r>
-              <a:rPr lang="en-GB">
-                <a:latin typeface="Calibri" charset="0"/>
-                <a:hlinkClick r:id="rId2"/>
-              </a:rPr>
-              <a:t>https://github.com/ncasuk/ncas-isc</a:t>
-            </a:r>
-            <a:r>
-              <a:rPr lang="en-GB">
-                <a:latin typeface="Calibri" charset="0"/>
-              </a:rPr>
-              <a:t> </a:t>
-            </a:r>
-          </a:p>
-          <a:p>
-            <a:pPr marL="0" indent="0">
-              <a:buFont typeface="Arial" charset="0"/>
-              <a:buNone/>
-            </a:pPr>
-            <a:endParaRPr lang="en-GB">
-              <a:latin typeface="Calibri" charset="0"/>
-            </a:endParaRPr>
-          </a:p>
-          <a:p>
-            <a:pPr marL="0" indent="0">
-              <a:buFont typeface="Arial" charset="0"/>
-              <a:buNone/>
-            </a:pPr>
-            <a:r>
-              <a:rPr lang="en-GB">
-                <a:latin typeface="Calibri" charset="0"/>
-              </a:rPr>
-              <a:t>Click on the big "Fork" </a:t>
-            </a:r>
-            <a:br>
-              <a:rPr lang="en-GB">
-                <a:latin typeface="Calibri" charset="0"/>
-              </a:rPr>
-            </a:br>
-            <a:r>
-              <a:rPr lang="en-GB">
-                <a:latin typeface="Calibri" charset="0"/>
-              </a:rPr>
-              <a:t>button and select your</a:t>
-            </a:r>
-            <a:br>
-              <a:rPr lang="en-GB">
-                <a:latin typeface="Calibri" charset="0"/>
-              </a:rPr>
-            </a:br>
-            <a:r>
-              <a:rPr lang="en-GB">
-                <a:latin typeface="Calibri" charset="0"/>
-              </a:rPr>
-              <a:t>own your own GitHub </a:t>
-            </a:r>
-            <a:br>
-              <a:rPr lang="en-GB">
-                <a:latin typeface="Calibri" charset="0"/>
-              </a:rPr>
-            </a:br>
-            <a:r>
-              <a:rPr lang="en-GB">
-                <a:latin typeface="Calibri" charset="0"/>
-              </a:rPr>
-              <a:t>space for the fork to be</a:t>
-            </a:r>
-            <a:br>
-              <a:rPr lang="en-GB">
-                <a:latin typeface="Calibri" charset="0"/>
-              </a:rPr>
-            </a:br>
-            <a:r>
-              <a:rPr lang="en-GB">
-                <a:latin typeface="Calibri" charset="0"/>
-              </a:rPr>
-              <a:t>created in.</a:t>
-            </a:r>
-          </a:p>
-        </p:txBody>
-      </p:sp>
       <p:pic>
         <p:nvPicPr>
-          <p:cNvPr id="30725" name="Picture 5"/>
+          <p:cNvPr id="5" name="Picture 4"/>
           <p:cNvPicPr>
-            <a:picLocks noChangeAspect="1" noChangeArrowheads="1"/>
+            <a:picLocks noChangeAspect="1"/>
           </p:cNvPicPr>
           <p:nvPr/>
         </p:nvPicPr>
-        <p:blipFill rotWithShape="1">
-          <a:blip r:embed="rId3"/>
-          <a:srcRect l="80628" t="21614" r="11558" b="73217"/>
-          <a:stretch/>
+        <p:blipFill>
+          <a:blip r:embed="rId2">
+            <a:extLst>
+              <a:ext uri="{28A0092B-C50C-407E-A947-70E740481C1C}">
+                <a14:useLocalDpi xmlns:a14="http://schemas.microsoft.com/office/drawing/2010/main" val="0"/>
+              </a:ext>
+            </a:extLst>
+          </a:blip>
+          <a:stretch>
+            <a:fillRect/>
+          </a:stretch>
         </p:blipFill>
-        <p:spPr bwMode="auto">
+        <p:spPr>
           <a:xfrm>
-            <a:off x="5345113" y="2863850"/>
-            <a:ext cx="2647950" cy="1065213"/>
+            <a:off x="-6515100" y="2120699"/>
+            <a:ext cx="9144000" cy="1497214"/>
           </a:xfrm>
           <a:prstGeom prst="rect">
             <a:avLst/>
           </a:prstGeom>
-          <a:ln/>
+        </p:spPr>
+      </p:pic>
+      <p:sp>
+        <p:nvSpPr>
+          <p:cNvPr id="2" name="Title 1"/>
+          <p:cNvSpPr>
+            <a:spLocks noGrp="1"/>
+          </p:cNvSpPr>
+          <p:nvPr>
+            <p:ph type="title"/>
+          </p:nvPr>
+        </p:nvSpPr>
+        <p:spPr/>
+        <p:txBody>
+          <a:bodyPr/>
+          <a:lstStyle/>
+          <a:p>
+            <a:r>
+              <a:rPr lang="en-US" dirty="0" smtClean="0"/>
+              <a:t>Make a repo</a:t>
+            </a:r>
+            <a:endParaRPr lang="en-US" dirty="0"/>
+          </a:p>
+        </p:txBody>
+      </p:sp>
+      <p:pic>
+        <p:nvPicPr>
+          <p:cNvPr id="4" name="Content Placeholder 3"/>
+          <p:cNvPicPr>
+            <a:picLocks noGrp="1" noChangeAspect="1"/>
+          </p:cNvPicPr>
+          <p:nvPr>
+            <p:ph idx="1"/>
+          </p:nvPr>
+        </p:nvPicPr>
+        <p:blipFill>
+          <a:blip r:embed="rId3">
+            <a:extLst>
+              <a:ext uri="{28A0092B-C50C-407E-A947-70E740481C1C}">
+                <a14:useLocalDpi xmlns:a14="http://schemas.microsoft.com/office/drawing/2010/main" val="0"/>
+              </a:ext>
+            </a:extLst>
+          </a:blip>
+          <a:stretch>
+            <a:fillRect/>
+          </a:stretch>
+        </p:blipFill>
+        <p:spPr>
+          <a:xfrm>
+            <a:off x="2832846" y="1244601"/>
+            <a:ext cx="6311154" cy="5613400"/>
+          </a:xfrm>
+        </p:spPr>
+      </p:pic>
+      <p:cxnSp>
+        <p:nvCxnSpPr>
+          <p:cNvPr id="7" name="Straight Arrow Connector 6"/>
+          <p:cNvCxnSpPr/>
+          <p:nvPr/>
+        </p:nvCxnSpPr>
+        <p:spPr>
+          <a:xfrm>
+            <a:off x="1117600" y="1701800"/>
+            <a:ext cx="0" cy="660400"/>
+          </a:xfrm>
+          <a:prstGeom prst="straightConnector1">
+            <a:avLst/>
+          </a:prstGeom>
+          <a:ln w="60325">
+            <a:solidFill>
+              <a:srgbClr val="FF0000"/>
+            </a:solidFill>
+            <a:tailEnd type="triangle"/>
+          </a:ln>
         </p:spPr>
         <p:style>
-          <a:lnRef idx="2">
-            <a:schemeClr val="dk1"/>
+          <a:lnRef idx="1">
+            <a:schemeClr val="accent1"/>
           </a:lnRef>
-          <a:fillRef idx="1">
-            <a:schemeClr val="lt1"/>
+          <a:fillRef idx="0">
+            <a:schemeClr val="accent1"/>
           </a:fillRef>
           <a:effectRef idx="0">
-            <a:schemeClr val="dk1"/>
+            <a:schemeClr val="accent1"/>
           </a:effectRef>
           <a:fontRef idx="minor">
-            <a:schemeClr val="dk1"/>
+            <a:schemeClr val="tx1"/>
           </a:fontRef>
         </p:style>
-      </p:pic>
-      <p:pic>
-        <p:nvPicPr>
-          <p:cNvPr id="30726" name="Picture 6"/>
-          <p:cNvPicPr>
-            <a:picLocks noChangeAspect="1" noChangeArrowheads="1"/>
-          </p:cNvPicPr>
+      </p:cxnSp>
+      <p:cxnSp>
+        <p:nvCxnSpPr>
+          <p:cNvPr id="11" name="Straight Arrow Connector 10"/>
+          <p:cNvCxnSpPr/>
           <p:nvPr/>
-        </p:nvPicPr>
-        <p:blipFill rotWithShape="1">
-          <a:blip r:embed="rId4"/>
-          <a:srcRect l="29504" t="13689" r="30374" b="25627"/>
-          <a:stretch/>
-        </p:blipFill>
-        <p:spPr bwMode="auto">
+        </p:nvCxnSpPr>
+        <p:spPr>
+          <a:xfrm flipH="1">
+            <a:off x="6248400" y="3200400"/>
+            <a:ext cx="1943100" cy="12700"/>
+          </a:xfrm>
+          <a:prstGeom prst="straightConnector1">
+            <a:avLst/>
+          </a:prstGeom>
+          <a:ln w="60325">
+            <a:solidFill>
+              <a:srgbClr val="FF0000"/>
+            </a:solidFill>
+            <a:tailEnd type="triangle"/>
+          </a:ln>
+        </p:spPr>
+        <p:style>
+          <a:lnRef idx="1">
+            <a:schemeClr val="accent1"/>
+          </a:lnRef>
+          <a:fillRef idx="0">
+            <a:schemeClr val="accent1"/>
+          </a:fillRef>
+          <a:effectRef idx="0">
+            <a:schemeClr val="accent1"/>
+          </a:effectRef>
+          <a:fontRef idx="minor">
+            <a:schemeClr val="tx1"/>
+          </a:fontRef>
+        </p:style>
+      </p:cxnSp>
+      <p:cxnSp>
+        <p:nvCxnSpPr>
+          <p:cNvPr id="12" name="Straight Arrow Connector 11"/>
+          <p:cNvCxnSpPr/>
+          <p:nvPr/>
+        </p:nvCxnSpPr>
+        <p:spPr>
+          <a:xfrm flipV="1">
+            <a:off x="2984500" y="5435600"/>
+            <a:ext cx="952500" cy="12700"/>
+          </a:xfrm>
+          <a:prstGeom prst="straightConnector1">
+            <a:avLst/>
+          </a:prstGeom>
+          <a:ln w="60325">
+            <a:solidFill>
+              <a:srgbClr val="FF0000"/>
+            </a:solidFill>
+            <a:tailEnd type="triangle"/>
+          </a:ln>
+        </p:spPr>
+        <p:style>
+          <a:lnRef idx="1">
+            <a:schemeClr val="accent1"/>
+          </a:lnRef>
+          <a:fillRef idx="0">
+            <a:schemeClr val="accent1"/>
+          </a:fillRef>
+          <a:effectRef idx="0">
+            <a:schemeClr val="accent1"/>
+          </a:effectRef>
+          <a:fontRef idx="minor">
+            <a:schemeClr val="tx1"/>
+          </a:fontRef>
+        </p:style>
+      </p:cxnSp>
+      <p:sp>
+        <p:nvSpPr>
+          <p:cNvPr id="18" name="TextBox 17"/>
+          <p:cNvSpPr txBox="1"/>
+          <p:nvPr/>
+        </p:nvSpPr>
+        <p:spPr>
           <a:xfrm>
-            <a:off x="5345113" y="4181475"/>
-            <a:ext cx="2647950" cy="2435225"/>
+            <a:off x="457200" y="846138"/>
+            <a:ext cx="1302123" cy="923330"/>
           </a:xfrm>
           <a:prstGeom prst="rect">
             <a:avLst/>
           </a:prstGeom>
-          <a:ln/>
+          <a:noFill/>
         </p:spPr>
-        <p:style>
-          <a:lnRef idx="2">
-            <a:schemeClr val="dk1"/>
-          </a:lnRef>
-          <a:fillRef idx="1">
-            <a:schemeClr val="lt1"/>
-          </a:fillRef>
-          <a:effectRef idx="0">
-            <a:schemeClr val="dk1"/>
-          </a:effectRef>
-          <a:fontRef idx="minor">
-            <a:schemeClr val="dk1"/>
-          </a:fontRef>
-        </p:style>
-      </p:pic>
+        <p:txBody>
+          <a:bodyPr wrap="square" rtlCol="0">
+            <a:spAutoFit/>
+          </a:bodyPr>
+          <a:lstStyle/>
+          <a:p>
+            <a:r>
+              <a:rPr lang="en-US" dirty="0" smtClean="0">
+                <a:solidFill>
+                  <a:srgbClr val="FF0000"/>
+                </a:solidFill>
+              </a:rPr>
+              <a:t>1) Click to add a new repo</a:t>
+            </a:r>
+            <a:endParaRPr lang="en-US" dirty="0">
+              <a:solidFill>
+                <a:srgbClr val="FF0000"/>
+              </a:solidFill>
+            </a:endParaRPr>
+          </a:p>
+        </p:txBody>
+      </p:sp>
+      <p:sp>
+        <p:nvSpPr>
+          <p:cNvPr id="19" name="TextBox 18"/>
+          <p:cNvSpPr txBox="1"/>
+          <p:nvPr/>
+        </p:nvSpPr>
+        <p:spPr>
+          <a:xfrm>
+            <a:off x="1682377" y="4835435"/>
+            <a:ext cx="1302123" cy="1200329"/>
+          </a:xfrm>
+          <a:prstGeom prst="rect">
+            <a:avLst/>
+          </a:prstGeom>
+          <a:noFill/>
+        </p:spPr>
+        <p:txBody>
+          <a:bodyPr wrap="square" rtlCol="0">
+            <a:spAutoFit/>
+          </a:bodyPr>
+          <a:lstStyle/>
+          <a:p>
+            <a:r>
+              <a:rPr lang="en-US">
+                <a:solidFill>
+                  <a:srgbClr val="FF0000"/>
+                </a:solidFill>
+              </a:rPr>
+              <a:t>3</a:t>
+            </a:r>
+            <a:r>
+              <a:rPr lang="en-US" smtClean="0">
+                <a:solidFill>
+                  <a:srgbClr val="FF0000"/>
+                </a:solidFill>
+              </a:rPr>
+              <a:t>) Click the add README box</a:t>
+            </a:r>
+            <a:endParaRPr lang="en-US" dirty="0">
+              <a:solidFill>
+                <a:srgbClr val="FF0000"/>
+              </a:solidFill>
+            </a:endParaRPr>
+          </a:p>
+        </p:txBody>
+      </p:sp>
+      <p:sp>
+        <p:nvSpPr>
+          <p:cNvPr id="20" name="TextBox 19"/>
+          <p:cNvSpPr txBox="1"/>
+          <p:nvPr/>
+        </p:nvSpPr>
+        <p:spPr>
+          <a:xfrm>
+            <a:off x="7023100" y="2438400"/>
+            <a:ext cx="1958789" cy="646331"/>
+          </a:xfrm>
+          <a:prstGeom prst="rect">
+            <a:avLst/>
+          </a:prstGeom>
+          <a:noFill/>
+        </p:spPr>
+        <p:txBody>
+          <a:bodyPr wrap="square" rtlCol="0">
+            <a:spAutoFit/>
+          </a:bodyPr>
+          <a:lstStyle/>
+          <a:p>
+            <a:r>
+              <a:rPr lang="en-US" dirty="0">
+                <a:solidFill>
+                  <a:srgbClr val="FF0000"/>
+                </a:solidFill>
+              </a:rPr>
+              <a:t>2</a:t>
+            </a:r>
+            <a:r>
+              <a:rPr lang="en-US" dirty="0" smtClean="0">
+                <a:solidFill>
+                  <a:srgbClr val="FF0000"/>
+                </a:solidFill>
+              </a:rPr>
+              <a:t>) Call new repo my-</a:t>
+            </a:r>
+            <a:r>
+              <a:rPr lang="en-US" dirty="0" err="1" smtClean="0">
+                <a:solidFill>
+                  <a:srgbClr val="FF0000"/>
+                </a:solidFill>
+              </a:rPr>
+              <a:t>isc</a:t>
+            </a:r>
+            <a:r>
+              <a:rPr lang="en-US" dirty="0" smtClean="0">
+                <a:solidFill>
+                  <a:srgbClr val="FF0000"/>
+                </a:solidFill>
+              </a:rPr>
+              <a:t>-work</a:t>
+            </a:r>
+            <a:endParaRPr lang="en-US" dirty="0">
+              <a:solidFill>
+                <a:srgbClr val="FF0000"/>
+              </a:solidFill>
+            </a:endParaRPr>
+          </a:p>
+        </p:txBody>
+      </p:sp>
     </p:spTree>
+    <p:extLst>
+      <p:ext uri="{BB962C8B-B14F-4D97-AF65-F5344CB8AC3E}">
+        <p14:creationId xmlns:p14="http://schemas.microsoft.com/office/powerpoint/2010/main" val="648905356"/>
+      </p:ext>
+    </p:extLst>
   </p:cSld>
   <p:clrMapOvr>
     <a:masterClrMapping/>
@@ -5583,7 +5724,7 @@
           </a:ln>
           <a:extLst>
             <a:ext uri="{909E8E84-426E-40dd-AFC4-6F175D3DCCD1}">
-              <a14:hiddenFill xmlns:a14="http://schemas.microsoft.com/office/drawing/2010/main">
+              <a14:hiddenFill xmlns:a14="http://schemas.microsoft.com/office/drawing/2010/main" xmlns="">
                 <a:solidFill>
                   <a:srgbClr val="FFFFFF"/>
                 </a:solidFill>
@@ -5632,7 +5773,7 @@
           </a:ln>
           <a:extLst>
             <a:ext uri="{909E8E84-426E-40dd-AFC4-6F175D3DCCD1}">
-              <a14:hiddenFill xmlns:a14="http://schemas.microsoft.com/office/drawing/2010/main">
+              <a14:hiddenFill xmlns:a14="http://schemas.microsoft.com/office/drawing/2010/main" xmlns="">
                 <a:solidFill>
                   <a:schemeClr val="accent1"/>
                 </a:solidFill>
@@ -5941,8 +6082,132 @@
                 <a:ea typeface="+mn-ea"/>
                 <a:cs typeface="Courier New" panose="02070309020205020404" pitchFamily="49" charset="0"/>
               </a:rPr>
-              <a:t>  https://agstephens@github.com/agstephens/keep-safe</a:t>
-            </a:r>
+              <a:t>  https</a:t>
+            </a:r>
+            <a:r>
+              <a:rPr lang="en-GB" sz="2000" dirty="0" smtClean="0">
+                <a:solidFill>
+                  <a:schemeClr val="lt1"/>
+                </a:solidFill>
+                <a:latin typeface="Courier New" panose="02070309020205020404" pitchFamily="49" charset="0"/>
+                <a:ea typeface="+mn-ea"/>
+                <a:cs typeface="Courier New" panose="02070309020205020404" pitchFamily="49" charset="0"/>
+              </a:rPr>
+              <a:t>://</a:t>
+            </a:r>
+            <a:r>
+              <a:rPr lang="en-GB" sz="2000" dirty="0" smtClean="0">
+                <a:solidFill>
+                  <a:schemeClr val="accent2">
+                    <a:lumMod val="60000"/>
+                    <a:lumOff val="40000"/>
+                  </a:schemeClr>
+                </a:solidFill>
+                <a:latin typeface="Courier New" panose="02070309020205020404" pitchFamily="49" charset="0"/>
+                <a:ea typeface="+mn-ea"/>
+                <a:cs typeface="Courier New" panose="02070309020205020404" pitchFamily="49" charset="0"/>
+              </a:rPr>
+              <a:t>&lt;username&gt;</a:t>
+            </a:r>
+            <a:r>
+              <a:rPr lang="en-GB" sz="2000" dirty="0" smtClean="0">
+                <a:solidFill>
+                  <a:schemeClr val="lt1"/>
+                </a:solidFill>
+                <a:latin typeface="Courier New" panose="02070309020205020404" pitchFamily="49" charset="0"/>
+                <a:ea typeface="+mn-ea"/>
+                <a:cs typeface="Courier New" panose="02070309020205020404" pitchFamily="49" charset="0"/>
+              </a:rPr>
+              <a:t>@</a:t>
+            </a:r>
+            <a:r>
+              <a:rPr lang="en-GB" sz="2000" dirty="0" err="1" smtClean="0">
+                <a:solidFill>
+                  <a:schemeClr val="lt1"/>
+                </a:solidFill>
+                <a:latin typeface="Courier New" panose="02070309020205020404" pitchFamily="49" charset="0"/>
+                <a:ea typeface="+mn-ea"/>
+                <a:cs typeface="Courier New" panose="02070309020205020404" pitchFamily="49" charset="0"/>
+              </a:rPr>
+              <a:t>github.com</a:t>
+            </a:r>
+            <a:r>
+              <a:rPr lang="en-GB" sz="2000" dirty="0" smtClean="0">
+                <a:solidFill>
+                  <a:schemeClr val="bg1"/>
+                </a:solidFill>
+                <a:latin typeface="Courier New" panose="02070309020205020404" pitchFamily="49" charset="0"/>
+                <a:ea typeface="+mn-ea"/>
+                <a:cs typeface="Courier New" panose="02070309020205020404" pitchFamily="49" charset="0"/>
+              </a:rPr>
+              <a:t>/</a:t>
+            </a:r>
+            <a:r>
+              <a:rPr lang="en-GB" sz="2000" dirty="0" smtClean="0">
+                <a:solidFill>
+                  <a:schemeClr val="accent2">
+                    <a:lumMod val="60000"/>
+                    <a:lumOff val="40000"/>
+                  </a:schemeClr>
+                </a:solidFill>
+                <a:latin typeface="Courier New" panose="02070309020205020404" pitchFamily="49" charset="0"/>
+                <a:ea typeface="+mn-ea"/>
+                <a:cs typeface="Courier New" panose="02070309020205020404" pitchFamily="49" charset="0"/>
+              </a:rPr>
+              <a:t>&lt;username&gt;</a:t>
+            </a:r>
+            <a:r>
+              <a:rPr lang="en-GB" sz="2000" dirty="0" smtClean="0">
+                <a:solidFill>
+                  <a:schemeClr val="bg1"/>
+                </a:solidFill>
+                <a:latin typeface="Courier New" panose="02070309020205020404" pitchFamily="49" charset="0"/>
+                <a:ea typeface="+mn-ea"/>
+                <a:cs typeface="Courier New" panose="02070309020205020404" pitchFamily="49" charset="0"/>
+              </a:rPr>
+              <a:t>/</a:t>
+            </a:r>
+            <a:r>
+              <a:rPr lang="en-GB" sz="2000" dirty="0" smtClean="0">
+                <a:solidFill>
+                  <a:schemeClr val="lt1"/>
+                </a:solidFill>
+                <a:latin typeface="Courier New" panose="02070309020205020404" pitchFamily="49" charset="0"/>
+                <a:ea typeface="+mn-ea"/>
+                <a:cs typeface="Courier New" panose="02070309020205020404" pitchFamily="49" charset="0"/>
+              </a:rPr>
+              <a:t>my-</a:t>
+            </a:r>
+            <a:r>
+              <a:rPr lang="en-GB" sz="2000" dirty="0" err="1" smtClean="0">
+                <a:solidFill>
+                  <a:schemeClr val="lt1"/>
+                </a:solidFill>
+                <a:latin typeface="Courier New" panose="02070309020205020404" pitchFamily="49" charset="0"/>
+                <a:ea typeface="+mn-ea"/>
+                <a:cs typeface="Courier New" panose="02070309020205020404" pitchFamily="49" charset="0"/>
+              </a:rPr>
+              <a:t>isc</a:t>
+            </a:r>
+            <a:r>
+              <a:rPr lang="en-GB" sz="2000" dirty="0" smtClean="0">
+                <a:solidFill>
+                  <a:schemeClr val="lt1"/>
+                </a:solidFill>
+                <a:latin typeface="Courier New" panose="02070309020205020404" pitchFamily="49" charset="0"/>
+                <a:ea typeface="+mn-ea"/>
+                <a:cs typeface="Courier New" panose="02070309020205020404" pitchFamily="49" charset="0"/>
+              </a:rPr>
+              <a:t>-work</a:t>
+            </a:r>
+            <a:endParaRPr lang="en-GB" sz="2000" dirty="0">
+              <a:solidFill>
+                <a:schemeClr val="lt1"/>
+              </a:solidFill>
+              <a:latin typeface="Courier New" panose="02070309020205020404" pitchFamily="49" charset="0"/>
+              <a:ea typeface="+mn-ea"/>
+              <a:cs typeface="Courier New" panose="02070309020205020404" pitchFamily="49" charset="0"/>
+            </a:endParaRPr>
           </a:p>
           <a:p>
             <a:pPr>
@@ -5986,6 +6251,926 @@
       </p:grpSpPr>
       <p:sp>
         <p:nvSpPr>
+          <p:cNvPr id="5" name="Rectangle 4"/>
+          <p:cNvSpPr/>
+          <p:nvPr/>
+        </p:nvSpPr>
+        <p:spPr>
+          <a:xfrm>
+            <a:off x="0" y="452438"/>
+            <a:ext cx="9144000" cy="5414962"/>
+          </a:xfrm>
+          <a:prstGeom prst="rect">
+            <a:avLst/>
+          </a:prstGeom>
+          <a:solidFill>
+            <a:schemeClr val="tx1"/>
+          </a:solidFill>
+        </p:spPr>
+        <p:txBody>
+          <a:bodyPr wrap="square">
+            <a:spAutoFit/>
+          </a:bodyPr>
+          <a:lstStyle/>
+          <a:p>
+            <a:r>
+              <a:rPr lang="en-US" dirty="0" smtClean="0">
+                <a:solidFill>
+                  <a:schemeClr val="bg1"/>
+                </a:solidFill>
+                <a:latin typeface="Menlo" charset="0"/>
+              </a:rPr>
+              <a:t>$ </a:t>
+            </a:r>
+            <a:r>
+              <a:rPr lang="en-US" dirty="0">
+                <a:solidFill>
+                  <a:schemeClr val="bg1"/>
+                </a:solidFill>
+                <a:latin typeface="Menlo" charset="0"/>
+              </a:rPr>
+              <a:t>cd my-</a:t>
+            </a:r>
+            <a:r>
+              <a:rPr lang="en-US" dirty="0" err="1">
+                <a:solidFill>
+                  <a:schemeClr val="bg1"/>
+                </a:solidFill>
+                <a:latin typeface="Menlo" charset="0"/>
+              </a:rPr>
+              <a:t>isc</a:t>
+            </a:r>
+            <a:r>
+              <a:rPr lang="en-US" dirty="0">
+                <a:solidFill>
+                  <a:schemeClr val="bg1"/>
+                </a:solidFill>
+                <a:latin typeface="Menlo" charset="0"/>
+              </a:rPr>
+              <a:t>-work</a:t>
+            </a:r>
+            <a:r>
+              <a:rPr lang="en-US" dirty="0" smtClean="0">
+                <a:solidFill>
+                  <a:schemeClr val="bg1"/>
+                </a:solidFill>
+                <a:latin typeface="Menlo" charset="0"/>
+              </a:rPr>
+              <a:t>/</a:t>
+            </a:r>
+            <a:r>
+              <a:rPr lang="en-US" dirty="0">
+                <a:solidFill>
+                  <a:schemeClr val="bg1"/>
+                </a:solidFill>
+                <a:latin typeface="Menlo" charset="0"/>
+              </a:rPr>
+              <a:t> </a:t>
+            </a:r>
+            <a:r>
+              <a:rPr lang="en-US" dirty="0" smtClean="0">
+                <a:solidFill>
+                  <a:schemeClr val="bg1"/>
+                </a:solidFill>
+                <a:latin typeface="Menlo" charset="0"/>
+              </a:rPr>
+              <a:t>    </a:t>
+            </a:r>
+          </a:p>
+          <a:p>
+            <a:r>
+              <a:rPr lang="en-US" dirty="0" smtClean="0">
+                <a:solidFill>
+                  <a:schemeClr val="bg1"/>
+                </a:solidFill>
+                <a:latin typeface="Menlo" charset="0"/>
+              </a:rPr>
+              <a:t>$ </a:t>
+            </a:r>
+            <a:r>
+              <a:rPr lang="en-US" dirty="0">
+                <a:solidFill>
+                  <a:schemeClr val="bg1"/>
+                </a:solidFill>
+                <a:latin typeface="Menlo" charset="0"/>
+              </a:rPr>
+              <a:t>ls</a:t>
+            </a:r>
+          </a:p>
+          <a:p>
+            <a:r>
+              <a:rPr lang="en-US" dirty="0" err="1">
+                <a:solidFill>
+                  <a:schemeClr val="bg1"/>
+                </a:solidFill>
+                <a:latin typeface="Menlo" charset="0"/>
+              </a:rPr>
+              <a:t>README.md</a:t>
+            </a:r>
+            <a:endParaRPr lang="en-US" dirty="0">
+              <a:solidFill>
+                <a:schemeClr val="bg1"/>
+              </a:solidFill>
+              <a:latin typeface="Menlo" charset="0"/>
+            </a:endParaRPr>
+          </a:p>
+          <a:p>
+            <a:r>
+              <a:rPr lang="en-US" dirty="0" smtClean="0">
+                <a:solidFill>
+                  <a:schemeClr val="bg1"/>
+                </a:solidFill>
+                <a:latin typeface="Menlo" charset="0"/>
+              </a:rPr>
+              <a:t>$ </a:t>
+            </a:r>
+            <a:r>
+              <a:rPr lang="en-US" dirty="0">
+                <a:solidFill>
+                  <a:schemeClr val="bg1"/>
+                </a:solidFill>
+                <a:latin typeface="Menlo" charset="0"/>
+              </a:rPr>
+              <a:t>touch x</a:t>
+            </a:r>
+          </a:p>
+          <a:p>
+            <a:r>
+              <a:rPr lang="en-US" dirty="0" smtClean="0">
+                <a:solidFill>
+                  <a:schemeClr val="bg1"/>
+                </a:solidFill>
+                <a:latin typeface="Menlo" charset="0"/>
+              </a:rPr>
+              <a:t>$ </a:t>
+            </a:r>
+            <a:r>
+              <a:rPr lang="en-US" dirty="0">
+                <a:solidFill>
+                  <a:schemeClr val="bg1"/>
+                </a:solidFill>
+                <a:latin typeface="Menlo" charset="0"/>
+              </a:rPr>
+              <a:t>ls</a:t>
+            </a:r>
+          </a:p>
+          <a:p>
+            <a:r>
+              <a:rPr lang="en-US" dirty="0" err="1">
+                <a:solidFill>
+                  <a:schemeClr val="bg1"/>
+                </a:solidFill>
+                <a:latin typeface="Menlo" charset="0"/>
+              </a:rPr>
+              <a:t>README.md</a:t>
+            </a:r>
+            <a:r>
+              <a:rPr lang="en-US" dirty="0">
+                <a:solidFill>
+                  <a:schemeClr val="bg1"/>
+                </a:solidFill>
+                <a:latin typeface="Menlo" charset="0"/>
+              </a:rPr>
+              <a:t> x</a:t>
+            </a:r>
+          </a:p>
+          <a:p>
+            <a:r>
+              <a:rPr lang="en-US" dirty="0" smtClean="0">
+                <a:solidFill>
+                  <a:schemeClr val="bg1"/>
+                </a:solidFill>
+                <a:latin typeface="Menlo" charset="0"/>
+              </a:rPr>
+              <a:t>$ </a:t>
+            </a:r>
+            <a:r>
+              <a:rPr lang="en-US" dirty="0" err="1">
+                <a:solidFill>
+                  <a:schemeClr val="bg1"/>
+                </a:solidFill>
+                <a:latin typeface="Menlo" charset="0"/>
+              </a:rPr>
+              <a:t>git</a:t>
+            </a:r>
+            <a:r>
+              <a:rPr lang="en-US" dirty="0">
+                <a:solidFill>
+                  <a:schemeClr val="bg1"/>
+                </a:solidFill>
+                <a:latin typeface="Menlo" charset="0"/>
+              </a:rPr>
+              <a:t> add x</a:t>
+            </a:r>
+          </a:p>
+          <a:p>
+            <a:r>
+              <a:rPr lang="en-US" dirty="0" smtClean="0">
+                <a:solidFill>
+                  <a:schemeClr val="bg1"/>
+                </a:solidFill>
+                <a:latin typeface="Menlo" charset="0"/>
+              </a:rPr>
+              <a:t>$ </a:t>
+            </a:r>
+            <a:r>
+              <a:rPr lang="en-US" dirty="0" err="1">
+                <a:solidFill>
+                  <a:schemeClr val="bg1"/>
+                </a:solidFill>
+                <a:latin typeface="Menlo" charset="0"/>
+              </a:rPr>
+              <a:t>git</a:t>
+            </a:r>
+            <a:r>
+              <a:rPr lang="en-US" dirty="0">
+                <a:solidFill>
+                  <a:schemeClr val="bg1"/>
+                </a:solidFill>
+                <a:latin typeface="Menlo" charset="0"/>
+              </a:rPr>
+              <a:t> commit x -m 'new x file'</a:t>
+            </a:r>
+          </a:p>
+          <a:p>
+            <a:r>
+              <a:rPr lang="en-US" dirty="0">
+                <a:solidFill>
+                  <a:schemeClr val="bg1"/>
+                </a:solidFill>
+                <a:latin typeface="Menlo" charset="0"/>
+              </a:rPr>
+              <a:t>[master 3aefe17] new x file</a:t>
+            </a:r>
+          </a:p>
+          <a:p>
+            <a:r>
+              <a:rPr lang="en-US" dirty="0">
+                <a:solidFill>
+                  <a:schemeClr val="bg1"/>
+                </a:solidFill>
+                <a:latin typeface="Menlo" charset="0"/>
+              </a:rPr>
+              <a:t> 1 file changed, 0 insertions(+), 0 deletions(-)</a:t>
+            </a:r>
+          </a:p>
+          <a:p>
+            <a:r>
+              <a:rPr lang="en-US" dirty="0">
+                <a:solidFill>
+                  <a:schemeClr val="bg1"/>
+                </a:solidFill>
+                <a:latin typeface="Menlo" charset="0"/>
+              </a:rPr>
+              <a:t> create mode 100644 x</a:t>
+            </a:r>
+          </a:p>
+          <a:p>
+            <a:r>
+              <a:rPr lang="en-US" dirty="0" smtClean="0">
+                <a:solidFill>
+                  <a:schemeClr val="bg1"/>
+                </a:solidFill>
+                <a:latin typeface="Menlo" charset="0"/>
+              </a:rPr>
+              <a:t>$ </a:t>
+            </a:r>
+            <a:r>
+              <a:rPr lang="en-US" dirty="0" err="1">
+                <a:solidFill>
+                  <a:schemeClr val="bg1"/>
+                </a:solidFill>
+                <a:latin typeface="Menlo" charset="0"/>
+              </a:rPr>
+              <a:t>git</a:t>
+            </a:r>
+            <a:r>
+              <a:rPr lang="en-US" dirty="0">
+                <a:solidFill>
+                  <a:schemeClr val="bg1"/>
+                </a:solidFill>
+                <a:latin typeface="Menlo" charset="0"/>
+              </a:rPr>
+              <a:t> push</a:t>
+            </a:r>
+          </a:p>
+          <a:p>
+            <a:r>
+              <a:rPr lang="en-US" dirty="0">
+                <a:solidFill>
+                  <a:schemeClr val="bg1"/>
+                </a:solidFill>
+                <a:latin typeface="Menlo" charset="0"/>
+              </a:rPr>
+              <a:t>Counting objects: 3, done.</a:t>
+            </a:r>
+          </a:p>
+          <a:p>
+            <a:r>
+              <a:rPr lang="en-US" dirty="0">
+                <a:solidFill>
+                  <a:schemeClr val="bg1"/>
+                </a:solidFill>
+                <a:latin typeface="Menlo" charset="0"/>
+              </a:rPr>
+              <a:t>Delta compression using up to 4 threads.</a:t>
+            </a:r>
+          </a:p>
+          <a:p>
+            <a:r>
+              <a:rPr lang="en-US" dirty="0">
+                <a:solidFill>
+                  <a:schemeClr val="bg1"/>
+                </a:solidFill>
+                <a:latin typeface="Menlo" charset="0"/>
+              </a:rPr>
+              <a:t>Compressing objects: 100% (2/2), done.</a:t>
+            </a:r>
+          </a:p>
+          <a:p>
+            <a:r>
+              <a:rPr lang="en-US" dirty="0">
+                <a:solidFill>
+                  <a:schemeClr val="bg1"/>
+                </a:solidFill>
+                <a:latin typeface="Menlo" charset="0"/>
+              </a:rPr>
+              <a:t>Writing objects: 100% (3/3), 272 bytes | 272.00 KiB/s, done.</a:t>
+            </a:r>
+          </a:p>
+          <a:p>
+            <a:r>
+              <a:rPr lang="en-US" dirty="0">
+                <a:solidFill>
+                  <a:schemeClr val="bg1"/>
+                </a:solidFill>
+                <a:latin typeface="Menlo" charset="0"/>
+              </a:rPr>
+              <a:t>Total 3 (delta 0), reused 0 (delta 0)</a:t>
+            </a:r>
+          </a:p>
+          <a:p>
+            <a:r>
+              <a:rPr lang="en-US" dirty="0">
+                <a:solidFill>
+                  <a:schemeClr val="bg1"/>
+                </a:solidFill>
+                <a:latin typeface="Menlo" charset="0"/>
+              </a:rPr>
+              <a:t>To https://</a:t>
+            </a:r>
+            <a:r>
+              <a:rPr lang="en-US" dirty="0" err="1">
+                <a:solidFill>
+                  <a:schemeClr val="bg1"/>
+                </a:solidFill>
+                <a:latin typeface="Menlo" charset="0"/>
+              </a:rPr>
+              <a:t>github.com</a:t>
+            </a:r>
+            <a:r>
+              <a:rPr lang="en-US" dirty="0">
+                <a:solidFill>
+                  <a:schemeClr val="bg1"/>
+                </a:solidFill>
+                <a:latin typeface="Menlo" charset="0"/>
+              </a:rPr>
+              <a:t>/</a:t>
+            </a:r>
+            <a:r>
+              <a:rPr lang="en-US" dirty="0" err="1">
+                <a:solidFill>
+                  <a:schemeClr val="bg1"/>
+                </a:solidFill>
+                <a:latin typeface="Menlo" charset="0"/>
+              </a:rPr>
+              <a:t>spepler</a:t>
+            </a:r>
+            <a:r>
+              <a:rPr lang="en-US" dirty="0">
+                <a:solidFill>
+                  <a:schemeClr val="bg1"/>
+                </a:solidFill>
+                <a:latin typeface="Menlo" charset="0"/>
+              </a:rPr>
+              <a:t>/my-</a:t>
+            </a:r>
+            <a:r>
+              <a:rPr lang="en-US" dirty="0" err="1">
+                <a:solidFill>
+                  <a:schemeClr val="bg1"/>
+                </a:solidFill>
+                <a:latin typeface="Menlo" charset="0"/>
+              </a:rPr>
+              <a:t>isc</a:t>
+            </a:r>
+            <a:r>
+              <a:rPr lang="en-US" dirty="0">
+                <a:solidFill>
+                  <a:schemeClr val="bg1"/>
+                </a:solidFill>
+                <a:latin typeface="Menlo" charset="0"/>
+              </a:rPr>
+              <a:t>-</a:t>
+            </a:r>
+            <a:r>
+              <a:rPr lang="en-US" dirty="0" err="1">
+                <a:solidFill>
+                  <a:schemeClr val="bg1"/>
+                </a:solidFill>
+                <a:latin typeface="Menlo" charset="0"/>
+              </a:rPr>
+              <a:t>work.git</a:t>
+            </a:r>
+            <a:endParaRPr lang="en-US" dirty="0">
+              <a:solidFill>
+                <a:schemeClr val="bg1"/>
+              </a:solidFill>
+              <a:latin typeface="Menlo" charset="0"/>
+            </a:endParaRPr>
+          </a:p>
+          <a:p>
+            <a:r>
+              <a:rPr lang="en-US" dirty="0">
+                <a:solidFill>
+                  <a:schemeClr val="bg1"/>
+                </a:solidFill>
+                <a:latin typeface="Menlo" charset="0"/>
+              </a:rPr>
+              <a:t>   183fa53..3aefe17  master -&gt; </a:t>
+            </a:r>
+            <a:r>
+              <a:rPr lang="en-US" dirty="0" smtClean="0">
+                <a:solidFill>
+                  <a:schemeClr val="bg1"/>
+                </a:solidFill>
+                <a:latin typeface="Menlo" charset="0"/>
+              </a:rPr>
+              <a:t>master</a:t>
+            </a:r>
+            <a:endParaRPr lang="en-US" dirty="0">
+              <a:solidFill>
+                <a:schemeClr val="bg1"/>
+              </a:solidFill>
+              <a:latin typeface="Menlo" charset="0"/>
+            </a:endParaRPr>
+          </a:p>
+        </p:txBody>
+      </p:sp>
+      <p:sp>
+        <p:nvSpPr>
+          <p:cNvPr id="7" name="TextBox 6"/>
+          <p:cNvSpPr txBox="1"/>
+          <p:nvPr/>
+        </p:nvSpPr>
+        <p:spPr>
+          <a:xfrm>
+            <a:off x="2565400" y="147638"/>
+            <a:ext cx="3289300" cy="923330"/>
+          </a:xfrm>
+          <a:prstGeom prst="rect">
+            <a:avLst/>
+          </a:prstGeom>
+          <a:solidFill>
+            <a:schemeClr val="accent2"/>
+          </a:solidFill>
+          <a:ln>
+            <a:solidFill>
+              <a:schemeClr val="bg1"/>
+            </a:solidFill>
+          </a:ln>
+        </p:spPr>
+        <p:txBody>
+          <a:bodyPr wrap="square" rtlCol="0">
+            <a:spAutoFit/>
+          </a:bodyPr>
+          <a:lstStyle/>
+          <a:p>
+            <a:r>
+              <a:rPr lang="en-US" dirty="0" smtClean="0">
+                <a:solidFill>
+                  <a:schemeClr val="bg1"/>
+                </a:solidFill>
+              </a:rPr>
+              <a:t>The my-</a:t>
+            </a:r>
+            <a:r>
+              <a:rPr lang="en-US" dirty="0" err="1" smtClean="0">
+                <a:solidFill>
+                  <a:schemeClr val="bg1"/>
+                </a:solidFill>
+              </a:rPr>
+              <a:t>isc</a:t>
+            </a:r>
+            <a:r>
+              <a:rPr lang="en-US" dirty="0" smtClean="0">
+                <a:solidFill>
+                  <a:schemeClr val="bg1"/>
+                </a:solidFill>
+              </a:rPr>
+              <a:t>-work repo is now on the laptop and I can list the </a:t>
+            </a:r>
+            <a:r>
+              <a:rPr lang="en-US" dirty="0" err="1" smtClean="0">
+                <a:solidFill>
+                  <a:schemeClr val="bg1"/>
+                </a:solidFill>
+              </a:rPr>
+              <a:t>README.md</a:t>
+            </a:r>
+            <a:r>
+              <a:rPr lang="en-US" dirty="0" smtClean="0">
+                <a:solidFill>
+                  <a:schemeClr val="bg1"/>
+                </a:solidFill>
+              </a:rPr>
+              <a:t> file</a:t>
+            </a:r>
+            <a:endParaRPr lang="en-US" dirty="0">
+              <a:solidFill>
+                <a:schemeClr val="bg1"/>
+              </a:solidFill>
+            </a:endParaRPr>
+          </a:p>
+        </p:txBody>
+      </p:sp>
+      <p:sp>
+        <p:nvSpPr>
+          <p:cNvPr id="8" name="TextBox 7"/>
+          <p:cNvSpPr txBox="1"/>
+          <p:nvPr/>
+        </p:nvSpPr>
+        <p:spPr>
+          <a:xfrm>
+            <a:off x="1866900" y="1314153"/>
+            <a:ext cx="3289300" cy="369332"/>
+          </a:xfrm>
+          <a:prstGeom prst="rect">
+            <a:avLst/>
+          </a:prstGeom>
+          <a:solidFill>
+            <a:schemeClr val="accent2"/>
+          </a:solidFill>
+          <a:ln>
+            <a:solidFill>
+              <a:schemeClr val="bg1"/>
+            </a:solidFill>
+          </a:ln>
+        </p:spPr>
+        <p:txBody>
+          <a:bodyPr wrap="square" rtlCol="0">
+            <a:spAutoFit/>
+          </a:bodyPr>
+          <a:lstStyle/>
+          <a:p>
+            <a:r>
+              <a:rPr lang="en-US" smtClean="0">
+                <a:solidFill>
+                  <a:schemeClr val="bg1"/>
+                </a:solidFill>
+              </a:rPr>
+              <a:t>Make a blank file “x” </a:t>
+            </a:r>
+            <a:endParaRPr lang="en-US" dirty="0">
+              <a:solidFill>
+                <a:schemeClr val="bg1"/>
+              </a:solidFill>
+            </a:endParaRPr>
+          </a:p>
+        </p:txBody>
+      </p:sp>
+      <p:sp>
+        <p:nvSpPr>
+          <p:cNvPr id="9" name="TextBox 8"/>
+          <p:cNvSpPr txBox="1"/>
+          <p:nvPr/>
+        </p:nvSpPr>
+        <p:spPr>
+          <a:xfrm>
+            <a:off x="4508500" y="1926670"/>
+            <a:ext cx="3289300" cy="923330"/>
+          </a:xfrm>
+          <a:prstGeom prst="rect">
+            <a:avLst/>
+          </a:prstGeom>
+          <a:solidFill>
+            <a:schemeClr val="accent2"/>
+          </a:solidFill>
+          <a:ln>
+            <a:solidFill>
+              <a:schemeClr val="bg1"/>
+            </a:solidFill>
+          </a:ln>
+        </p:spPr>
+        <p:txBody>
+          <a:bodyPr wrap="square" rtlCol="0">
+            <a:spAutoFit/>
+          </a:bodyPr>
+          <a:lstStyle/>
+          <a:p>
+            <a:r>
+              <a:rPr lang="en-US" dirty="0" smtClean="0">
+                <a:solidFill>
+                  <a:schemeClr val="bg1"/>
+                </a:solidFill>
+              </a:rPr>
+              <a:t>Use </a:t>
+            </a:r>
+            <a:r>
+              <a:rPr lang="en-US" dirty="0" err="1" smtClean="0">
+                <a:solidFill>
+                  <a:schemeClr val="bg1"/>
+                </a:solidFill>
+              </a:rPr>
+              <a:t>git</a:t>
+            </a:r>
+            <a:r>
+              <a:rPr lang="en-US" dirty="0" smtClean="0">
+                <a:solidFill>
+                  <a:schemeClr val="bg1"/>
+                </a:solidFill>
+              </a:rPr>
+              <a:t> add and </a:t>
+            </a:r>
+            <a:r>
+              <a:rPr lang="en-US" dirty="0" err="1" smtClean="0">
+                <a:solidFill>
+                  <a:schemeClr val="bg1"/>
+                </a:solidFill>
+              </a:rPr>
+              <a:t>git</a:t>
+            </a:r>
+            <a:r>
+              <a:rPr lang="en-US" dirty="0" smtClean="0">
+                <a:solidFill>
+                  <a:schemeClr val="bg1"/>
+                </a:solidFill>
+              </a:rPr>
+              <a:t> commit to put the file under version control</a:t>
+            </a:r>
+            <a:endParaRPr lang="en-US" dirty="0">
+              <a:solidFill>
+                <a:schemeClr val="bg1"/>
+              </a:solidFill>
+            </a:endParaRPr>
+          </a:p>
+        </p:txBody>
+      </p:sp>
+      <p:sp>
+        <p:nvSpPr>
+          <p:cNvPr id="10" name="TextBox 9"/>
+          <p:cNvSpPr txBox="1"/>
+          <p:nvPr/>
+        </p:nvSpPr>
+        <p:spPr>
+          <a:xfrm>
+            <a:off x="5854700" y="3292793"/>
+            <a:ext cx="3289300" cy="1200329"/>
+          </a:xfrm>
+          <a:prstGeom prst="rect">
+            <a:avLst/>
+          </a:prstGeom>
+          <a:solidFill>
+            <a:schemeClr val="accent2"/>
+          </a:solidFill>
+          <a:ln>
+            <a:solidFill>
+              <a:schemeClr val="bg1"/>
+            </a:solidFill>
+          </a:ln>
+        </p:spPr>
+        <p:txBody>
+          <a:bodyPr wrap="square" rtlCol="0">
+            <a:spAutoFit/>
+          </a:bodyPr>
+          <a:lstStyle/>
+          <a:p>
+            <a:r>
+              <a:rPr lang="en-US" dirty="0" smtClean="0">
+                <a:solidFill>
+                  <a:schemeClr val="bg1"/>
+                </a:solidFill>
+              </a:rPr>
+              <a:t>Use </a:t>
+            </a:r>
+            <a:r>
+              <a:rPr lang="en-US" dirty="0" err="1" smtClean="0">
+                <a:solidFill>
+                  <a:schemeClr val="bg1"/>
+                </a:solidFill>
+              </a:rPr>
+              <a:t>git</a:t>
+            </a:r>
+            <a:r>
+              <a:rPr lang="en-US" dirty="0" smtClean="0">
+                <a:solidFill>
+                  <a:schemeClr val="bg1"/>
+                </a:solidFill>
+              </a:rPr>
+              <a:t> push to update </a:t>
+            </a:r>
+            <a:r>
+              <a:rPr lang="en-US" dirty="0" err="1" smtClean="0">
+                <a:solidFill>
+                  <a:schemeClr val="bg1"/>
+                </a:solidFill>
+              </a:rPr>
+              <a:t>github</a:t>
+            </a:r>
+            <a:r>
+              <a:rPr lang="en-US" dirty="0" smtClean="0">
+                <a:solidFill>
+                  <a:schemeClr val="bg1"/>
+                </a:solidFill>
+              </a:rPr>
+              <a:t> copy of the repo with the changes (in this case adding the “x” file)</a:t>
+            </a:r>
+            <a:endParaRPr lang="en-US" dirty="0">
+              <a:solidFill>
+                <a:schemeClr val="bg1"/>
+              </a:solidFill>
+            </a:endParaRPr>
+          </a:p>
+        </p:txBody>
+      </p:sp>
+      <p:cxnSp>
+        <p:nvCxnSpPr>
+          <p:cNvPr id="12" name="Straight Arrow Connector 11"/>
+          <p:cNvCxnSpPr/>
+          <p:nvPr/>
+        </p:nvCxnSpPr>
+        <p:spPr>
+          <a:xfrm flipH="1">
+            <a:off x="1447800" y="1020168"/>
+            <a:ext cx="1117600" cy="105768"/>
+          </a:xfrm>
+          <a:prstGeom prst="straightConnector1">
+            <a:avLst/>
+          </a:prstGeom>
+          <a:ln w="50800">
+            <a:solidFill>
+              <a:srgbClr val="FF0000"/>
+            </a:solidFill>
+            <a:tailEnd type="triangle"/>
+          </a:ln>
+        </p:spPr>
+        <p:style>
+          <a:lnRef idx="1">
+            <a:schemeClr val="accent1"/>
+          </a:lnRef>
+          <a:fillRef idx="0">
+            <a:schemeClr val="accent1"/>
+          </a:fillRef>
+          <a:effectRef idx="0">
+            <a:schemeClr val="accent1"/>
+          </a:effectRef>
+          <a:fontRef idx="minor">
+            <a:schemeClr val="tx1"/>
+          </a:fontRef>
+        </p:style>
+      </p:cxnSp>
+      <p:cxnSp>
+        <p:nvCxnSpPr>
+          <p:cNvPr id="13" name="Straight Arrow Connector 12"/>
+          <p:cNvCxnSpPr>
+            <a:stCxn id="8" idx="1"/>
+          </p:cNvCxnSpPr>
+          <p:nvPr/>
+        </p:nvCxnSpPr>
+        <p:spPr>
+          <a:xfrm flipH="1" flipV="1">
+            <a:off x="1447800" y="1473122"/>
+            <a:ext cx="419100" cy="25697"/>
+          </a:xfrm>
+          <a:prstGeom prst="straightConnector1">
+            <a:avLst/>
+          </a:prstGeom>
+          <a:ln w="50800">
+            <a:solidFill>
+              <a:srgbClr val="FF0000"/>
+            </a:solidFill>
+            <a:tailEnd type="triangle"/>
+          </a:ln>
+        </p:spPr>
+        <p:style>
+          <a:lnRef idx="1">
+            <a:schemeClr val="accent1"/>
+          </a:lnRef>
+          <a:fillRef idx="0">
+            <a:schemeClr val="accent1"/>
+          </a:fillRef>
+          <a:effectRef idx="0">
+            <a:schemeClr val="accent1"/>
+          </a:effectRef>
+          <a:fontRef idx="minor">
+            <a:schemeClr val="tx1"/>
+          </a:fontRef>
+        </p:style>
+      </p:cxnSp>
+      <p:cxnSp>
+        <p:nvCxnSpPr>
+          <p:cNvPr id="15" name="Straight Arrow Connector 14"/>
+          <p:cNvCxnSpPr/>
+          <p:nvPr/>
+        </p:nvCxnSpPr>
+        <p:spPr>
+          <a:xfrm flipH="1">
+            <a:off x="1866900" y="2267744"/>
+            <a:ext cx="2641600" cy="30956"/>
+          </a:xfrm>
+          <a:prstGeom prst="straightConnector1">
+            <a:avLst/>
+          </a:prstGeom>
+          <a:ln w="50800">
+            <a:solidFill>
+              <a:srgbClr val="FF0000"/>
+            </a:solidFill>
+            <a:tailEnd type="triangle"/>
+          </a:ln>
+        </p:spPr>
+        <p:style>
+          <a:lnRef idx="1">
+            <a:schemeClr val="accent1"/>
+          </a:lnRef>
+          <a:fillRef idx="0">
+            <a:schemeClr val="accent1"/>
+          </a:fillRef>
+          <a:effectRef idx="0">
+            <a:schemeClr val="accent1"/>
+          </a:effectRef>
+          <a:fontRef idx="minor">
+            <a:schemeClr val="tx1"/>
+          </a:fontRef>
+        </p:style>
+      </p:cxnSp>
+      <p:cxnSp>
+        <p:nvCxnSpPr>
+          <p:cNvPr id="17" name="Straight Arrow Connector 16"/>
+          <p:cNvCxnSpPr/>
+          <p:nvPr/>
+        </p:nvCxnSpPr>
+        <p:spPr>
+          <a:xfrm flipH="1">
+            <a:off x="1657350" y="3630225"/>
+            <a:ext cx="4197350" cy="52884"/>
+          </a:xfrm>
+          <a:prstGeom prst="straightConnector1">
+            <a:avLst/>
+          </a:prstGeom>
+          <a:ln w="50800">
+            <a:solidFill>
+              <a:srgbClr val="FF0000"/>
+            </a:solidFill>
+            <a:tailEnd type="triangle"/>
+          </a:ln>
+        </p:spPr>
+        <p:style>
+          <a:lnRef idx="1">
+            <a:schemeClr val="accent1"/>
+          </a:lnRef>
+          <a:fillRef idx="0">
+            <a:schemeClr val="accent1"/>
+          </a:fillRef>
+          <a:effectRef idx="0">
+            <a:schemeClr val="accent1"/>
+          </a:effectRef>
+          <a:fontRef idx="minor">
+            <a:schemeClr val="tx1"/>
+          </a:fontRef>
+        </p:style>
+      </p:cxnSp>
+    </p:spTree>
+    <p:extLst>
+      <p:ext uri="{BB962C8B-B14F-4D97-AF65-F5344CB8AC3E}">
+        <p14:creationId xmlns:p14="http://schemas.microsoft.com/office/powerpoint/2010/main" val="1071580711"/>
+      </p:ext>
+    </p:extLst>
+  </p:cSld>
+  <p:clrMapOvr>
+    <a:masterClrMapping/>
+  </p:clrMapOvr>
+</p:sld>
+</file>
+
+<file path=ppt/slides/slide14.xml><?xml version="1.0" encoding="utf-8"?>
+<p:sld xmlns:a="http://schemas.openxmlformats.org/drawingml/2006/main" xmlns:r="http://schemas.openxmlformats.org/officeDocument/2006/relationships" xmlns:p="http://schemas.openxmlformats.org/presentationml/2006/main">
+  <p:cSld>
+    <p:spTree>
+      <p:nvGrpSpPr>
+        <p:cNvPr id="1" name=""/>
+        <p:cNvGrpSpPr/>
+        <p:nvPr/>
+      </p:nvGrpSpPr>
+      <p:grpSpPr>
+        <a:xfrm>
+          <a:off x="0" y="0"/>
+          <a:ext cx="0" cy="0"/>
+          <a:chOff x="0" y="0"/>
+          <a:chExt cx="0" cy="0"/>
+        </a:xfrm>
+      </p:grpSpPr>
+      <p:sp>
+        <p:nvSpPr>
           <p:cNvPr id="2" name="Title 1"/>
           <p:cNvSpPr>
             <a:spLocks noGrp="1"/>
@@ -5999,6 +7184,100 @@
           <a:bodyPr/>
           <a:lstStyle/>
           <a:p>
+            <a:r>
+              <a:rPr lang="en-US" dirty="0" smtClean="0"/>
+              <a:t>Now it’s visible on </a:t>
+            </a:r>
+            <a:r>
+              <a:rPr lang="en-US" dirty="0" err="1" smtClean="0"/>
+              <a:t>github</a:t>
+            </a:r>
+            <a:endParaRPr lang="en-US" dirty="0"/>
+          </a:p>
+        </p:txBody>
+      </p:sp>
+      <p:pic>
+        <p:nvPicPr>
+          <p:cNvPr id="4" name="Content Placeholder 3"/>
+          <p:cNvPicPr>
+            <a:picLocks noGrp="1" noChangeAspect="1"/>
+          </p:cNvPicPr>
+          <p:nvPr>
+            <p:ph idx="1"/>
+          </p:nvPr>
+        </p:nvPicPr>
+        <p:blipFill>
+          <a:blip r:embed="rId2">
+            <a:extLst>
+              <a:ext uri="{28A0092B-C50C-407E-A947-70E740481C1C}">
+                <a14:useLocalDpi xmlns:a14="http://schemas.microsoft.com/office/drawing/2010/main" val="0"/>
+              </a:ext>
+            </a:extLst>
+          </a:blip>
+          <a:stretch>
+            <a:fillRect/>
+          </a:stretch>
+        </p:blipFill>
+        <p:spPr>
+          <a:xfrm>
+            <a:off x="203199" y="1895122"/>
+            <a:ext cx="8858559" cy="1940278"/>
+          </a:xfrm>
+        </p:spPr>
+      </p:pic>
+    </p:spTree>
+    <p:extLst>
+      <p:ext uri="{BB962C8B-B14F-4D97-AF65-F5344CB8AC3E}">
+        <p14:creationId xmlns:p14="http://schemas.microsoft.com/office/powerpoint/2010/main" val="1613817997"/>
+      </p:ext>
+    </p:extLst>
+  </p:cSld>
+  <p:clrMapOvr>
+    <a:masterClrMapping/>
+  </p:clrMapOvr>
+</p:sld>
+</file>
+
+<file path=ppt/slides/slide15.xml><?xml version="1.0" encoding="utf-8"?>
+<p:sld xmlns:a="http://schemas.openxmlformats.org/drawingml/2006/main" xmlns:r="http://schemas.openxmlformats.org/officeDocument/2006/relationships" xmlns:p="http://schemas.openxmlformats.org/presentationml/2006/main">
+  <p:cSld>
+    <p:spTree>
+      <p:nvGrpSpPr>
+        <p:cNvPr id="1" name=""/>
+        <p:cNvGrpSpPr/>
+        <p:nvPr/>
+      </p:nvGrpSpPr>
+      <p:grpSpPr>
+        <a:xfrm>
+          <a:off x="0" y="0"/>
+          <a:ext cx="0" cy="0"/>
+          <a:chOff x="0" y="0"/>
+          <a:chExt cx="0" cy="0"/>
+        </a:xfrm>
+      </p:grpSpPr>
+      <p:sp>
+        <p:nvSpPr>
+          <p:cNvPr id="2" name="Title 1"/>
+          <p:cNvSpPr>
+            <a:spLocks noGrp="1"/>
+          </p:cNvSpPr>
+          <p:nvPr>
+            <p:ph type="title"/>
+          </p:nvPr>
+        </p:nvSpPr>
+        <p:spPr/>
+        <p:txBody>
+          <a:bodyPr/>
+          <a:lstStyle/>
+          <a:p>
+            <a:r>
+              <a:rPr lang="en-US" dirty="0" smtClean="0"/>
+              <a:t>I’ll be back</a:t>
+            </a:r>
+            <a:r>
+              <a:rPr lang="mr-IN" dirty="0" smtClean="0"/>
+              <a:t>…</a:t>
+            </a:r>
             <a:endParaRPr lang="en-US" dirty="0"/>
           </a:p>
         </p:txBody>
@@ -6013,20 +7292,37 @@
             <p:ph idx="1"/>
           </p:nvPr>
         </p:nvSpPr>
-        <p:spPr/>
+        <p:spPr>
+          <a:xfrm>
+            <a:off x="457200" y="1600200"/>
+            <a:ext cx="5575300" cy="4525963"/>
+          </a:xfrm>
+        </p:spPr>
         <p:txBody>
           <a:bodyPr/>
           <a:lstStyle/>
           <a:p>
             <a:r>
               <a:rPr lang="en-US" dirty="0" smtClean="0"/>
-              <a:t>Now you have a copy of all the course materials on your laptop and </a:t>
-            </a:r>
-          </a:p>
-          <a:p>
+              <a:t>There is already a copy of the course materials on your laptop from a public </a:t>
+            </a:r>
+            <a:r>
+              <a:rPr lang="en-US" dirty="0" err="1" smtClean="0"/>
+              <a:t>github</a:t>
+            </a:r>
             <a:r>
               <a:rPr lang="en-US" dirty="0" smtClean="0"/>
-              <a:t>You are setup on </a:t>
+              <a:t> repository. </a:t>
+            </a:r>
+          </a:p>
+          <a:p>
+            <a:r>
+              <a:rPr lang="en-US" dirty="0" smtClean="0"/>
+              <a:t>You </a:t>
+            </a:r>
+            <a:r>
+              <a:rPr lang="en-US" dirty="0" smtClean="0"/>
+              <a:t>are setup on </a:t>
             </a:r>
             <a:r>
               <a:rPr lang="en-US" dirty="0" err="1" smtClean="0"/>
@@ -6034,12 +7330,99 @@
             </a:r>
             <a:r>
               <a:rPr lang="en-US" dirty="0" smtClean="0"/>
-              <a:t> for use latter in the course.</a:t>
+              <a:t> for use latter in the course</a:t>
+            </a:r>
+            <a:r>
+              <a:rPr lang="en-US" dirty="0" smtClean="0"/>
+              <a:t>.</a:t>
+            </a:r>
+          </a:p>
+          <a:p>
+            <a:r>
+              <a:rPr lang="en-US" dirty="0" smtClean="0"/>
+              <a:t>We’ll add more </a:t>
+            </a:r>
+            <a:r>
+              <a:rPr lang="en-US" dirty="0" err="1" smtClean="0"/>
+              <a:t>git</a:t>
+            </a:r>
+            <a:r>
+              <a:rPr lang="en-US" dirty="0" smtClean="0"/>
+              <a:t> stuff as we go.</a:t>
             </a:r>
             <a:endParaRPr lang="en-US" dirty="0"/>
           </a:p>
         </p:txBody>
       </p:sp>
+      <p:grpSp>
+        <p:nvGrpSpPr>
+          <p:cNvPr id="6" name="Group 5"/>
+          <p:cNvGrpSpPr/>
+          <p:nvPr/>
+        </p:nvGrpSpPr>
+        <p:grpSpPr>
+          <a:xfrm>
+            <a:off x="3958166" y="1227138"/>
+            <a:ext cx="7078134" cy="3302000"/>
+            <a:chOff x="3627966" y="561181"/>
+            <a:chExt cx="7078134" cy="3302000"/>
+          </a:xfrm>
+        </p:grpSpPr>
+        <p:pic>
+          <p:nvPicPr>
+            <p:cNvPr id="4" name="Picture 3"/>
+            <p:cNvPicPr>
+              <a:picLocks noChangeAspect="1"/>
+            </p:cNvPicPr>
+            <p:nvPr/>
+          </p:nvPicPr>
+          <p:blipFill>
+            <a:blip r:embed="rId2"/>
+            <a:stretch>
+              <a:fillRect/>
+            </a:stretch>
+          </p:blipFill>
+          <p:spPr>
+            <a:xfrm>
+              <a:off x="5435600" y="561181"/>
+              <a:ext cx="3251200" cy="3302000"/>
+            </a:xfrm>
+            <a:prstGeom prst="rect">
+              <a:avLst/>
+            </a:prstGeom>
+          </p:spPr>
+        </p:pic>
+        <p:pic>
+          <p:nvPicPr>
+            <p:cNvPr id="5" name="Picture 4"/>
+            <p:cNvPicPr>
+              <a:picLocks noChangeAspect="1"/>
+            </p:cNvPicPr>
+            <p:nvPr/>
+          </p:nvPicPr>
+          <p:blipFill>
+            <a:blip r:embed="rId3">
+              <a:extLst>
+                <a:ext uri="{28A0092B-C50C-407E-A947-70E740481C1C}">
+                  <a14:useLocalDpi xmlns:a14="http://schemas.microsoft.com/office/drawing/2010/main" val="0"/>
+                </a:ext>
+              </a:extLst>
+            </a:blip>
+            <a:stretch>
+              <a:fillRect/>
+            </a:stretch>
+          </p:blipFill>
+          <p:spPr>
+            <a:xfrm>
+              <a:off x="3627966" y="660401"/>
+              <a:ext cx="7078134" cy="2057400"/>
+            </a:xfrm>
+            <a:prstGeom prst="rect">
+              <a:avLst/>
+            </a:prstGeom>
+          </p:spPr>
+        </p:pic>
+      </p:grpSp>
     </p:spTree>
     <p:extLst>
       <p:ext uri="{BB962C8B-B14F-4D97-AF65-F5344CB8AC3E}">
@@ -6268,7 +7651,7 @@
   <p:timing>
     <p:tnLst>
       <p:par>
-        <p:cTn xmlns:p14="http://schemas.microsoft.com/office/powerpoint/2010/main" id="1" dur="indefinite" restart="never" nodeType="tmRoot">
+        <p:cTn id="1" dur="indefinite" restart="never" nodeType="tmRoot">
           <p:childTnLst>
             <p:seq concurrent="1" nextAc="seek">
               <p:cTn id="2" dur="indefinite" nodeType="mainSeq">
@@ -6737,7 +8120,7 @@
   <p:timing>
     <p:tnLst>
       <p:par>
-        <p:cTn xmlns:p14="http://schemas.microsoft.com/office/powerpoint/2010/main" id="1" dur="indefinite" restart="never" nodeType="tmRoot">
+        <p:cTn id="1" dur="indefinite" restart="never" nodeType="tmRoot">
           <p:childTnLst>
             <p:seq concurrent="1" nextAc="seek">
               <p:cTn id="2" dur="indefinite" nodeType="mainSeq">
@@ -6904,14 +8287,14 @@
           </a:ln>
           <a:extLst>
             <a:ext uri="{909E8E84-426E-40dd-AFC4-6F175D3DCCD1}">
-              <a14:hiddenFill xmlns:a14="http://schemas.microsoft.com/office/drawing/2010/main">
+              <a14:hiddenFill xmlns:a14="http://schemas.microsoft.com/office/drawing/2010/main" xmlns="">
                 <a:solidFill>
                   <a:srgbClr val="FFFFFF"/>
                 </a:solidFill>
               </a14:hiddenFill>
             </a:ext>
             <a:ext uri="{91240B29-F687-4f45-9708-019B960494DF}">
-              <a14:hiddenLine xmlns:a14="http://schemas.microsoft.com/office/drawing/2010/main" w="9525">
+              <a14:hiddenLine xmlns:a14="http://schemas.microsoft.com/office/drawing/2010/main" xmlns="" w="9525">
                 <a:solidFill>
                   <a:srgbClr val="000000"/>
                 </a:solidFill>
@@ -7149,11 +8532,11 @@
   <p:clrMapOvr>
     <a:masterClrMapping/>
   </p:clrMapOvr>
-  <p:transition xmlns:p14="http://schemas.microsoft.com/office/powerpoint/2010/main" spd="med"/>
+  <p:transition spd="med"/>
   <p:timing>
     <p:tnLst>
       <p:par>
-        <p:cTn xmlns:p14="http://schemas.microsoft.com/office/powerpoint/2010/main" id="1" dur="indefinite" restart="never" nodeType="tmRoot">
+        <p:cTn id="1" dur="indefinite" restart="never" nodeType="tmRoot">
           <p:childTnLst>
             <p:seq concurrent="1" nextAc="seek">
               <p:cTn id="2" dur="0" nodeType="mainSeq"/>
@@ -7243,14 +8626,14 @@
           </a:ln>
           <a:extLst>
             <a:ext uri="{909E8E84-426E-40dd-AFC4-6F175D3DCCD1}">
-              <a14:hiddenFill xmlns:a14="http://schemas.microsoft.com/office/drawing/2010/main">
+              <a14:hiddenFill xmlns:a14="http://schemas.microsoft.com/office/drawing/2010/main" xmlns="">
                 <a:solidFill>
                   <a:srgbClr val="FFFFFF"/>
                 </a:solidFill>
               </a14:hiddenFill>
             </a:ext>
             <a:ext uri="{91240B29-F687-4f45-9708-019B960494DF}">
-              <a14:hiddenLine xmlns:a14="http://schemas.microsoft.com/office/drawing/2010/main" w="9525">
+              <a14:hiddenLine xmlns:a14="http://schemas.microsoft.com/office/drawing/2010/main" xmlns="" w="9525">
                 <a:solidFill>
                   <a:srgbClr val="000000"/>
                 </a:solidFill>
@@ -7530,11 +8913,11 @@
   <p:clrMapOvr>
     <a:masterClrMapping/>
   </p:clrMapOvr>
-  <p:transition xmlns:p14="http://schemas.microsoft.com/office/powerpoint/2010/main" spd="med"/>
+  <p:transition spd="med"/>
   <p:timing>
     <p:tnLst>
       <p:par>
-        <p:cTn xmlns:p14="http://schemas.microsoft.com/office/powerpoint/2010/main" id="1" dur="indefinite" restart="never" nodeType="tmRoot">
+        <p:cTn id="1" dur="indefinite" restart="never" nodeType="tmRoot">
           <p:childTnLst>
             <p:seq concurrent="1" nextAc="seek">
               <p:cTn id="2" dur="0" nodeType="mainSeq"/>
@@ -7667,14 +9050,14 @@
           </a:ln>
           <a:extLst>
             <a:ext uri="{909E8E84-426E-40dd-AFC4-6F175D3DCCD1}">
-              <a14:hiddenFill xmlns:a14="http://schemas.microsoft.com/office/drawing/2010/main">
+              <a14:hiddenFill xmlns:a14="http://schemas.microsoft.com/office/drawing/2010/main" xmlns="">
                 <a:solidFill>
                   <a:srgbClr val="FFFFFF"/>
                 </a:solidFill>
               </a14:hiddenFill>
             </a:ext>
             <a:ext uri="{91240B29-F687-4f45-9708-019B960494DF}">
-              <a14:hiddenLine xmlns:a14="http://schemas.microsoft.com/office/drawing/2010/main" w="9525">
+              <a14:hiddenLine xmlns:a14="http://schemas.microsoft.com/office/drawing/2010/main" xmlns="" w="9525">
                 <a:solidFill>
                   <a:srgbClr val="000000"/>
                 </a:solidFill>

</xml_diff>

<commit_message>
Finished updating learning_python5 and changed shell presentations so that font matches python presentations
</commit_message>
<xml_diff>
--- a/shell/presentations/01_git1.pptx
+++ b/shell/presentations/01_git1.pptx
@@ -267,7 +267,7 @@
             <a:fld id="{17F80633-BAA2-0049-BDEC-E483C21777A6}" type="datetimeFigureOut">
               <a:rPr lang="en-GB"/>
               <a:pPr/>
-              <a:t>07/11/2017</a:t>
+              <a:t>25/09/2018</a:t>
             </a:fld>
             <a:endParaRPr lang="en-GB"/>
           </a:p>
@@ -619,14 +619,14 @@
           <a:noFill/>
           <a:extLst>
             <a:ext uri="{909E8E84-426E-40dd-AFC4-6F175D3DCCD1}">
-              <a14:hiddenFill xmlns="" xmlns:a14="http://schemas.microsoft.com/office/drawing/2010/main">
+              <a14:hiddenFill xmlns:a14="http://schemas.microsoft.com/office/drawing/2010/main" xmlns="">
                 <a:solidFill>
                   <a:srgbClr val="FFFFFF"/>
                 </a:solidFill>
               </a14:hiddenFill>
             </a:ext>
             <a:ext uri="{91240B29-F687-4f45-9708-019B960494DF}">
-              <a14:hiddenLine xmlns="" xmlns:a14="http://schemas.microsoft.com/office/drawing/2010/main" w="9525">
+              <a14:hiddenLine xmlns:a14="http://schemas.microsoft.com/office/drawing/2010/main" xmlns="" w="9525">
                 <a:solidFill>
                   <a:srgbClr val="000000"/>
                 </a:solidFill>
@@ -799,7 +799,7 @@
           </a:ln>
           <a:extLst>
             <a:ext uri="{FAA26D3D-D897-4be2-8F04-BA451C77F1D7}">
-              <ma14:placeholderFlag xmlns:ma14="http://schemas.microsoft.com/office/mac/drawingml/2011/main" val="1"/>
+              <ma14:placeholderFlag xmlns:ma14="http://schemas.microsoft.com/office/mac/drawingml/2011/main" xmlns="" val="1"/>
             </a:ext>
           </a:extLst>
         </p:spPr>
@@ -822,17 +822,17 @@
           <a:noFill/>
           <a:extLst>
             <a:ext uri="{FAA26D3D-D897-4be2-8F04-BA451C77F1D7}">
-              <ma14:placeholderFlag xmlns:ma14="http://schemas.microsoft.com/office/mac/drawingml/2011/main" val="1"/>
+              <ma14:placeholderFlag xmlns:ma14="http://schemas.microsoft.com/office/mac/drawingml/2011/main" xmlns="" val="1"/>
             </a:ext>
             <a:ext uri="{909E8E84-426E-40dd-AFC4-6F175D3DCCD1}">
-              <a14:hiddenFill xmlns="" xmlns:a14="http://schemas.microsoft.com/office/drawing/2010/main">
+              <a14:hiddenFill xmlns:a14="http://schemas.microsoft.com/office/drawing/2010/main" xmlns="">
                 <a:solidFill>
                   <a:srgbClr val="FFFFFF"/>
                 </a:solidFill>
               </a14:hiddenFill>
             </a:ext>
             <a:ext uri="{91240B29-F687-4f45-9708-019B960494DF}">
-              <a14:hiddenLine xmlns="" xmlns:a14="http://schemas.microsoft.com/office/drawing/2010/main" w="9525">
+              <a14:hiddenLine xmlns:a14="http://schemas.microsoft.com/office/drawing/2010/main" xmlns="" w="9525">
                 <a:solidFill>
                   <a:srgbClr val="000000"/>
                 </a:solidFill>
@@ -911,14 +911,14 @@
           <a:noFill/>
           <a:extLst>
             <a:ext uri="{909E8E84-426E-40dd-AFC4-6F175D3DCCD1}">
-              <a14:hiddenFill xmlns="" xmlns:a14="http://schemas.microsoft.com/office/drawing/2010/main">
+              <a14:hiddenFill xmlns:a14="http://schemas.microsoft.com/office/drawing/2010/main" xmlns="">
                 <a:solidFill>
                   <a:srgbClr val="FFFFFF"/>
                 </a:solidFill>
               </a14:hiddenFill>
             </a:ext>
             <a:ext uri="{91240B29-F687-4f45-9708-019B960494DF}">
-              <a14:hiddenLine xmlns="" xmlns:a14="http://schemas.microsoft.com/office/drawing/2010/main" w="9525">
+              <a14:hiddenLine xmlns:a14="http://schemas.microsoft.com/office/drawing/2010/main" xmlns="" w="9525">
                 <a:solidFill>
                   <a:srgbClr val="000000"/>
                 </a:solidFill>
@@ -1091,7 +1091,7 @@
           </a:ln>
           <a:extLst>
             <a:ext uri="{FAA26D3D-D897-4be2-8F04-BA451C77F1D7}">
-              <ma14:placeholderFlag xmlns:ma14="http://schemas.microsoft.com/office/mac/drawingml/2011/main" val="1"/>
+              <ma14:placeholderFlag xmlns:ma14="http://schemas.microsoft.com/office/mac/drawingml/2011/main" xmlns="" val="1"/>
             </a:ext>
           </a:extLst>
         </p:spPr>
@@ -1114,14 +1114,14 @@
           <a:noFill/>
           <a:extLst>
             <a:ext uri="{909E8E84-426E-40dd-AFC4-6F175D3DCCD1}">
-              <a14:hiddenFill xmlns="" xmlns:a14="http://schemas.microsoft.com/office/drawing/2010/main">
+              <a14:hiddenFill xmlns:a14="http://schemas.microsoft.com/office/drawing/2010/main" xmlns="">
                 <a:solidFill>
                   <a:srgbClr val="FFFFFF"/>
                 </a:solidFill>
               </a14:hiddenFill>
             </a:ext>
             <a:ext uri="{91240B29-F687-4f45-9708-019B960494DF}">
-              <a14:hiddenLine xmlns="" xmlns:a14="http://schemas.microsoft.com/office/drawing/2010/main" w="9525">
+              <a14:hiddenLine xmlns:a14="http://schemas.microsoft.com/office/drawing/2010/main" xmlns="" w="9525">
                 <a:solidFill>
                   <a:srgbClr val="000000"/>
                 </a:solidFill>
@@ -1218,10 +1218,10 @@
           </a:ln>
           <a:extLst>
             <a:ext uri="{FAA26D3D-D897-4be2-8F04-BA451C77F1D7}">
-              <ma14:placeholderFlag xmlns:ma14="http://schemas.microsoft.com/office/mac/drawingml/2011/main" val="1"/>
+              <ma14:placeholderFlag xmlns:ma14="http://schemas.microsoft.com/office/mac/drawingml/2011/main" xmlns="" val="1"/>
             </a:ext>
             <a:ext uri="{909E8E84-426E-40dd-AFC4-6F175D3DCCD1}">
-              <a14:hiddenFill xmlns="" xmlns:a14="http://schemas.microsoft.com/office/drawing/2010/main">
+              <a14:hiddenFill xmlns:a14="http://schemas.microsoft.com/office/drawing/2010/main" xmlns="">
                 <a:solidFill>
                   <a:srgbClr val="FFFFFF"/>
                 </a:solidFill>
@@ -1244,14 +1244,14 @@
           <a:noFill/>
           <a:extLst>
             <a:ext uri="{909E8E84-426E-40dd-AFC4-6F175D3DCCD1}">
-              <a14:hiddenFill xmlns="" xmlns:a14="http://schemas.microsoft.com/office/drawing/2010/main">
+              <a14:hiddenFill xmlns:a14="http://schemas.microsoft.com/office/drawing/2010/main" xmlns="">
                 <a:solidFill>
                   <a:srgbClr val="FFFFFF"/>
                 </a:solidFill>
               </a14:hiddenFill>
             </a:ext>
             <a:ext uri="{91240B29-F687-4f45-9708-019B960494DF}">
-              <a14:hiddenLine xmlns="" xmlns:a14="http://schemas.microsoft.com/office/drawing/2010/main" w="9525">
+              <a14:hiddenLine xmlns:a14="http://schemas.microsoft.com/office/drawing/2010/main" xmlns="" w="9525">
                 <a:solidFill>
                   <a:srgbClr val="000000"/>
                 </a:solidFill>
@@ -1293,14 +1293,14 @@
           <a:noFill/>
           <a:extLst>
             <a:ext uri="{909E8E84-426E-40dd-AFC4-6F175D3DCCD1}">
-              <a14:hiddenFill xmlns="" xmlns:a14="http://schemas.microsoft.com/office/drawing/2010/main">
+              <a14:hiddenFill xmlns:a14="http://schemas.microsoft.com/office/drawing/2010/main" xmlns="">
                 <a:solidFill>
                   <a:srgbClr val="FFFFFF"/>
                 </a:solidFill>
               </a14:hiddenFill>
             </a:ext>
             <a:ext uri="{91240B29-F687-4f45-9708-019B960494DF}">
-              <a14:hiddenLine xmlns="" xmlns:a14="http://schemas.microsoft.com/office/drawing/2010/main" w="9525">
+              <a14:hiddenLine xmlns:a14="http://schemas.microsoft.com/office/drawing/2010/main" xmlns="" w="9525">
                 <a:solidFill>
                   <a:srgbClr val="000000"/>
                 </a:solidFill>
@@ -1628,7 +1628,7 @@
             <a:fld id="{B7A367C5-1E2C-CB49-90C2-50C3BE82679A}" type="datetimeFigureOut">
               <a:rPr lang="en-GB"/>
               <a:pPr/>
-              <a:t>07/11/2017</a:t>
+              <a:t>25/09/2018</a:t>
             </a:fld>
             <a:endParaRPr lang="en-GB"/>
           </a:p>
@@ -1815,7 +1815,7 @@
             <a:fld id="{1AF0192A-B5CE-2E46-846F-9DA536A07A6F}" type="datetimeFigureOut">
               <a:rPr lang="en-GB"/>
               <a:pPr/>
-              <a:t>07/11/2017</a:t>
+              <a:t>25/09/2018</a:t>
             </a:fld>
             <a:endParaRPr lang="en-GB"/>
           </a:p>
@@ -2012,7 +2012,7 @@
             <a:fld id="{14964D74-F6FD-584B-8773-DA379A568572}" type="datetimeFigureOut">
               <a:rPr lang="en-GB"/>
               <a:pPr/>
-              <a:t>07/11/2017</a:t>
+              <a:t>25/09/2018</a:t>
             </a:fld>
             <a:endParaRPr lang="en-GB"/>
           </a:p>
@@ -2199,7 +2199,7 @@
             <a:fld id="{FA908017-0343-2E4A-A971-A34E43823FE2}" type="datetimeFigureOut">
               <a:rPr lang="en-GB"/>
               <a:pPr/>
-              <a:t>07/11/2017</a:t>
+              <a:t>25/09/2018</a:t>
             </a:fld>
             <a:endParaRPr lang="en-GB"/>
           </a:p>
@@ -2462,7 +2462,7 @@
             <a:fld id="{7262627B-B807-9440-AD38-D8B4DA6F586E}" type="datetimeFigureOut">
               <a:rPr lang="en-GB"/>
               <a:pPr/>
-              <a:t>07/11/2017</a:t>
+              <a:t>25/09/2018</a:t>
             </a:fld>
             <a:endParaRPr lang="en-GB"/>
           </a:p>
@@ -2767,7 +2767,7 @@
             <a:fld id="{96AD9194-77F4-8A47-892A-B7B6CD36162F}" type="datetimeFigureOut">
               <a:rPr lang="en-GB"/>
               <a:pPr/>
-              <a:t>07/11/2017</a:t>
+              <a:t>25/09/2018</a:t>
             </a:fld>
             <a:endParaRPr lang="en-GB"/>
           </a:p>
@@ -3206,7 +3206,7 @@
             <a:fld id="{AA9A3B28-0B63-874E-ACA7-CC8A68737EB4}" type="datetimeFigureOut">
               <a:rPr lang="en-GB"/>
               <a:pPr/>
-              <a:t>07/11/2017</a:t>
+              <a:t>25/09/2018</a:t>
             </a:fld>
             <a:endParaRPr lang="en-GB"/>
           </a:p>
@@ -3341,7 +3341,7 @@
             <a:fld id="{91345AEA-5A42-614B-8C2F-EAF77C40756C}" type="datetimeFigureOut">
               <a:rPr lang="en-GB"/>
               <a:pPr/>
-              <a:t>07/11/2017</a:t>
+              <a:t>25/09/2018</a:t>
             </a:fld>
             <a:endParaRPr lang="en-GB"/>
           </a:p>
@@ -3453,7 +3453,7 @@
             <a:fld id="{F967FF78-FFF3-D94C-8CB8-21E3487233EA}" type="datetimeFigureOut">
               <a:rPr lang="en-GB"/>
               <a:pPr/>
-              <a:t>07/11/2017</a:t>
+              <a:t>25/09/2018</a:t>
             </a:fld>
             <a:endParaRPr lang="en-GB"/>
           </a:p>
@@ -3747,7 +3747,7 @@
             <a:fld id="{9F21DFAE-376C-6746-8A99-31F1B1243D38}" type="datetimeFigureOut">
               <a:rPr lang="en-GB"/>
               <a:pPr/>
-              <a:t>07/11/2017</a:t>
+              <a:t>25/09/2018</a:t>
             </a:fld>
             <a:endParaRPr lang="en-GB"/>
           </a:p>
@@ -4020,7 +4020,7 @@
             <a:fld id="{9CC96C97-DE49-4347-998C-7CD167784C4D}" type="datetimeFigureOut">
               <a:rPr lang="en-GB"/>
               <a:pPr/>
-              <a:t>07/11/2017</a:t>
+              <a:t>25/09/2018</a:t>
             </a:fld>
             <a:endParaRPr lang="en-GB"/>
           </a:p>
@@ -4142,17 +4142,17 @@
           </a:ln>
           <a:extLst>
             <a:ext uri="{FAA26D3D-D897-4be2-8F04-BA451C77F1D7}">
-              <ma14:placeholderFlag xmlns:ma14="http://schemas.microsoft.com/office/mac/drawingml/2011/main" val="1"/>
+              <ma14:placeholderFlag xmlns:ma14="http://schemas.microsoft.com/office/mac/drawingml/2011/main" xmlns="" val="1"/>
             </a:ext>
             <a:ext uri="{909E8E84-426E-40dd-AFC4-6F175D3DCCD1}">
-              <a14:hiddenFill xmlns="" xmlns:a14="http://schemas.microsoft.com/office/drawing/2010/main">
+              <a14:hiddenFill xmlns:a14="http://schemas.microsoft.com/office/drawing/2010/main" xmlns="">
                 <a:solidFill>
                   <a:srgbClr val="FFFFFF"/>
                 </a:solidFill>
               </a14:hiddenFill>
             </a:ext>
             <a:ext uri="{91240B29-F687-4f45-9708-019B960494DF}">
-              <a14:hiddenLine xmlns="" xmlns:a14="http://schemas.microsoft.com/office/drawing/2010/main" w="9525">
+              <a14:hiddenLine xmlns:a14="http://schemas.microsoft.com/office/drawing/2010/main" xmlns="" w="9525">
                 <a:solidFill>
                   <a:srgbClr val="000000"/>
                 </a:solidFill>
@@ -4204,17 +4204,17 @@
           </a:ln>
           <a:extLst>
             <a:ext uri="{FAA26D3D-D897-4be2-8F04-BA451C77F1D7}">
-              <ma14:placeholderFlag xmlns:ma14="http://schemas.microsoft.com/office/mac/drawingml/2011/main" val="1"/>
+              <ma14:placeholderFlag xmlns:ma14="http://schemas.microsoft.com/office/mac/drawingml/2011/main" xmlns="" val="1"/>
             </a:ext>
             <a:ext uri="{909E8E84-426E-40dd-AFC4-6F175D3DCCD1}">
-              <a14:hiddenFill xmlns="" xmlns:a14="http://schemas.microsoft.com/office/drawing/2010/main">
+              <a14:hiddenFill xmlns:a14="http://schemas.microsoft.com/office/drawing/2010/main" xmlns="">
                 <a:solidFill>
                   <a:srgbClr val="FFFFFF"/>
                 </a:solidFill>
               </a14:hiddenFill>
             </a:ext>
             <a:ext uri="{91240B29-F687-4f45-9708-019B960494DF}">
-              <a14:hiddenLine xmlns="" xmlns:a14="http://schemas.microsoft.com/office/drawing/2010/main" w="9525">
+              <a14:hiddenLine xmlns:a14="http://schemas.microsoft.com/office/drawing/2010/main" xmlns="" w="9525">
                 <a:solidFill>
                   <a:srgbClr val="000000"/>
                 </a:solidFill>
@@ -4309,7 +4309,7 @@
             <a:fld id="{EC40E7FB-B30A-A942-A21D-EE0E54040989}" type="datetimeFigureOut">
               <a:rPr lang="en-GB"/>
               <a:pPr/>
-              <a:t>07/11/2017</a:t>
+              <a:t>25/09/2018</a:t>
             </a:fld>
             <a:endParaRPr lang="en-GB"/>
           </a:p>
@@ -4418,7 +4418,7 @@
           <p:nvPr userDrawn="1"/>
         </p:nvPicPr>
         <p:blipFill>
-          <a:blip r:embed="rId13">
+          <a:blip r:embed="rId13" cstate="email">
             <a:extLst>
               <a:ext uri="{28A0092B-C50C-407E-A947-70E740481C1C}">
                 <a14:useLocalDpi xmlns:a14="http://schemas.microsoft.com/office/drawing/2010/main" val="0"/>
@@ -4444,14 +4444,14 @@
           </a:ln>
           <a:extLst>
             <a:ext uri="{909E8E84-426E-40dd-AFC4-6F175D3DCCD1}">
-              <a14:hiddenFill xmlns="" xmlns:a14="http://schemas.microsoft.com/office/drawing/2010/main">
+              <a14:hiddenFill xmlns:a14="http://schemas.microsoft.com/office/drawing/2010/main" xmlns="">
                 <a:solidFill>
                   <a:srgbClr val="FFFFFF"/>
                 </a:solidFill>
               </a14:hiddenFill>
             </a:ext>
             <a:ext uri="{91240B29-F687-4f45-9708-019B960494DF}">
-              <a14:hiddenLine xmlns="" xmlns:a14="http://schemas.microsoft.com/office/drawing/2010/main" w="9525">
+              <a14:hiddenLine xmlns:a14="http://schemas.microsoft.com/office/drawing/2010/main" xmlns="" w="9525">
                 <a:solidFill>
                   <a:srgbClr val="000000"/>
                 </a:solidFill>
@@ -4472,7 +4472,7 @@
           <p:nvPr userDrawn="1"/>
         </p:nvPicPr>
         <p:blipFill>
-          <a:blip r:embed="rId14">
+          <a:blip r:embed="rId14" cstate="email">
             <a:extLst>
               <a:ext uri="{28A0092B-C50C-407E-A947-70E740481C1C}">
                 <a14:useLocalDpi xmlns:a14="http://schemas.microsoft.com/office/drawing/2010/main" val="0"/>
@@ -4498,14 +4498,14 @@
           </a:ln>
           <a:extLst>
             <a:ext uri="{909E8E84-426E-40dd-AFC4-6F175D3DCCD1}">
-              <a14:hiddenFill xmlns="" xmlns:a14="http://schemas.microsoft.com/office/drawing/2010/main">
+              <a14:hiddenFill xmlns:a14="http://schemas.microsoft.com/office/drawing/2010/main" xmlns="">
                 <a:solidFill>
                   <a:srgbClr val="FFFFFF"/>
                 </a:solidFill>
               </a14:hiddenFill>
             </a:ext>
             <a:ext uri="{91240B29-F687-4f45-9708-019B960494DF}">
-              <a14:hiddenLine xmlns="" xmlns:a14="http://schemas.microsoft.com/office/drawing/2010/main" w="9525">
+              <a14:hiddenLine xmlns:a14="http://schemas.microsoft.com/office/drawing/2010/main" xmlns="" w="9525">
                 <a:solidFill>
                   <a:srgbClr val="000000"/>
                 </a:solidFill>
@@ -4953,19 +4953,19 @@
           <a:p>
             <a:pPr eaLnBrk="1" hangingPunct="1"/>
             <a:r>
-              <a:rPr lang="en-GB" b="1">
+              <a:rPr lang="en-GB" b="1" dirty="0">
                 <a:latin typeface="Calibri" charset="0"/>
               </a:rPr>
               <a:t>Managing your code: quietly introducing </a:t>
             </a:r>
             <a:r>
-              <a:rPr lang="en-GB" b="1" i="1">
+              <a:rPr lang="en-GB" b="1" i="1" dirty="0">
                 <a:latin typeface="Calibri" charset="0"/>
               </a:rPr>
               <a:t>Git</a:t>
             </a:r>
             <a:r>
-              <a:rPr lang="en-GB" b="1">
+              <a:rPr lang="en-GB" b="1" dirty="0">
                 <a:latin typeface="Calibri" charset="0"/>
               </a:rPr>
               <a:t> - a friend for life</a:t>
@@ -5054,7 +5054,7 @@
           <p:nvPr/>
         </p:nvPicPr>
         <p:blipFill>
-          <a:blip r:embed="rId2">
+          <a:blip r:embed="rId2" cstate="email">
             <a:extLst>
               <a:ext uri="{28A0092B-C50C-407E-A947-70E740481C1C}">
                 <a14:useLocalDpi xmlns:a14="http://schemas.microsoft.com/office/drawing/2010/main" val="0"/>
@@ -5080,14 +5080,14 @@
           </a:ln>
           <a:extLst>
             <a:ext uri="{909E8E84-426E-40dd-AFC4-6F175D3DCCD1}">
-              <a14:hiddenFill xmlns="" xmlns:a14="http://schemas.microsoft.com/office/drawing/2010/main">
+              <a14:hiddenFill xmlns:a14="http://schemas.microsoft.com/office/drawing/2010/main" xmlns="">
                 <a:solidFill>
                   <a:srgbClr val="FFFFFF"/>
                 </a:solidFill>
               </a14:hiddenFill>
             </a:ext>
             <a:ext uri="{91240B29-F687-4f45-9708-019B960494DF}">
-              <a14:hiddenLine xmlns="" xmlns:a14="http://schemas.microsoft.com/office/drawing/2010/main" w="9525">
+              <a14:hiddenLine xmlns:a14="http://schemas.microsoft.com/office/drawing/2010/main" xmlns="" w="9525">
                 <a:solidFill>
                   <a:srgbClr val="000000"/>
                 </a:solidFill>
@@ -5108,7 +5108,7 @@
           <p:nvPr/>
         </p:nvPicPr>
         <p:blipFill>
-          <a:blip r:embed="rId3">
+          <a:blip r:embed="rId3" cstate="email">
             <a:extLst>
               <a:ext uri="{28A0092B-C50C-407E-A947-70E740481C1C}">
                 <a14:useLocalDpi xmlns:a14="http://schemas.microsoft.com/office/drawing/2010/main" val="0"/>
@@ -5134,14 +5134,14 @@
           </a:ln>
           <a:extLst>
             <a:ext uri="{909E8E84-426E-40dd-AFC4-6F175D3DCCD1}">
-              <a14:hiddenFill xmlns="" xmlns:a14="http://schemas.microsoft.com/office/drawing/2010/main">
+              <a14:hiddenFill xmlns:a14="http://schemas.microsoft.com/office/drawing/2010/main" xmlns="">
                 <a:solidFill>
                   <a:srgbClr val="FFFFFF"/>
                 </a:solidFill>
               </a14:hiddenFill>
             </a:ext>
             <a:ext uri="{91240B29-F687-4f45-9708-019B960494DF}">
-              <a14:hiddenLine xmlns="" xmlns:a14="http://schemas.microsoft.com/office/drawing/2010/main" w="9525">
+              <a14:hiddenLine xmlns:a14="http://schemas.microsoft.com/office/drawing/2010/main" xmlns="" w="9525">
                 <a:solidFill>
                   <a:srgbClr val="000000"/>
                 </a:solidFill>
@@ -5194,7 +5194,7 @@
           <p:nvPr/>
         </p:nvPicPr>
         <p:blipFill>
-          <a:blip r:embed="rId2">
+          <a:blip r:embed="rId2" cstate="email">
             <a:extLst>
               <a:ext uri="{28A0092B-C50C-407E-A947-70E740481C1C}">
                 <a14:useLocalDpi xmlns:a14="http://schemas.microsoft.com/office/drawing/2010/main" val="0"/>
@@ -5249,7 +5249,7 @@
           </p:nvPr>
         </p:nvPicPr>
         <p:blipFill>
-          <a:blip r:embed="rId3">
+          <a:blip r:embed="rId3" cstate="email">
             <a:extLst>
               <a:ext uri="{28A0092B-C50C-407E-A947-70E740481C1C}">
                 <a14:useLocalDpi xmlns:a14="http://schemas.microsoft.com/office/drawing/2010/main" val="0"/>
@@ -5402,6 +5402,7 @@
                 <a:solidFill>
                   <a:srgbClr val="FF0000"/>
                 </a:solidFill>
+                <a:latin typeface="+mn-lt"/>
               </a:rPr>
               <a:t>1) Click to add a new repo</a:t>
             </a:r>
@@ -5409,6 +5410,7 @@
               <a:solidFill>
                 <a:srgbClr val="FF0000"/>
               </a:solidFill>
+              <a:latin typeface="+mn-lt"/>
             </a:endParaRPr>
           </a:p>
         </p:txBody>
@@ -5440,6 +5442,7 @@
                 <a:solidFill>
                   <a:srgbClr val="FF0000"/>
                 </a:solidFill>
+                <a:latin typeface="+mn-lt"/>
               </a:rPr>
               <a:t>3</a:t>
             </a:r>
@@ -5448,6 +5451,7 @@
                 <a:solidFill>
                   <a:srgbClr val="FF0000"/>
                 </a:solidFill>
+                <a:latin typeface="+mn-lt"/>
               </a:rPr>
               <a:t>) Click the add README box</a:t>
             </a:r>
@@ -5455,6 +5459,7 @@
               <a:solidFill>
                 <a:srgbClr val="FF0000"/>
               </a:solidFill>
+              <a:latin typeface="+mn-lt"/>
             </a:endParaRPr>
           </a:p>
         </p:txBody>
@@ -5486,6 +5491,7 @@
                 <a:solidFill>
                   <a:srgbClr val="FF0000"/>
                 </a:solidFill>
+                <a:latin typeface="+mn-lt"/>
               </a:rPr>
               <a:t>2</a:t>
             </a:r>
@@ -5494,6 +5500,7 @@
                 <a:solidFill>
                   <a:srgbClr val="FF0000"/>
                 </a:solidFill>
+                <a:latin typeface="+mn-lt"/>
               </a:rPr>
               <a:t>) Call new repo my-</a:t>
             </a:r>
@@ -5502,6 +5509,7 @@
                 <a:solidFill>
                   <a:srgbClr val="FF0000"/>
                 </a:solidFill>
+                <a:latin typeface="+mn-lt"/>
               </a:rPr>
               <a:t>isc</a:t>
             </a:r>
@@ -5510,6 +5518,7 @@
                 <a:solidFill>
                   <a:srgbClr val="FF0000"/>
                 </a:solidFill>
+                <a:latin typeface="+mn-lt"/>
               </a:rPr>
               <a:t>-work</a:t>
             </a:r>
@@ -5517,6 +5526,7 @@
               <a:solidFill>
                 <a:srgbClr val="FF0000"/>
               </a:solidFill>
+              <a:latin typeface="+mn-lt"/>
             </a:endParaRPr>
           </a:p>
         </p:txBody>
@@ -5572,19 +5582,19 @@
           <a:lstStyle/>
           <a:p>
             <a:r>
-              <a:rPr lang="en-GB">
+              <a:rPr lang="en-GB" dirty="0">
                 <a:latin typeface="Calibri" charset="0"/>
               </a:rPr>
               <a:t>Copy the </a:t>
             </a:r>
             <a:r>
-              <a:rPr lang="en-GB" i="1">
+              <a:rPr lang="en-GB" i="1" dirty="0">
                 <a:latin typeface="Calibri" charset="0"/>
               </a:rPr>
               <a:t>clone</a:t>
             </a:r>
             <a:r>
-              <a:rPr lang="en-GB">
+              <a:rPr lang="en-GB" dirty="0">
                 <a:latin typeface="Calibri" charset="0"/>
               </a:rPr>
               <a:t> link</a:t>
@@ -5724,7 +5734,7 @@
           </a:ln>
           <a:extLst>
             <a:ext uri="{909E8E84-426E-40dd-AFC4-6F175D3DCCD1}">
-              <a14:hiddenFill xmlns="" xmlns:a14="http://schemas.microsoft.com/office/drawing/2010/main">
+              <a14:hiddenFill xmlns:a14="http://schemas.microsoft.com/office/drawing/2010/main" xmlns="">
                 <a:solidFill>
                   <a:srgbClr val="FFFFFF"/>
                 </a:solidFill>
@@ -5773,7 +5783,7 @@
           </a:ln>
           <a:extLst>
             <a:ext uri="{909E8E84-426E-40dd-AFC4-6F175D3DCCD1}">
-              <a14:hiddenFill xmlns="" xmlns:a14="http://schemas.microsoft.com/office/drawing/2010/main">
+              <a14:hiddenFill xmlns:a14="http://schemas.microsoft.com/office/drawing/2010/main" xmlns="">
                 <a:solidFill>
                   <a:schemeClr val="accent1"/>
                 </a:solidFill>
@@ -5895,19 +5905,19 @@
           <a:lstStyle/>
           <a:p>
             <a:r>
-              <a:rPr lang="en-GB">
+              <a:rPr lang="en-GB" dirty="0">
                 <a:latin typeface="Calibri" charset="0"/>
               </a:rPr>
               <a:t>Copy the </a:t>
             </a:r>
             <a:r>
-              <a:rPr lang="en-GB" i="1">
+              <a:rPr lang="en-GB" i="1" dirty="0">
                 <a:latin typeface="Calibri" charset="0"/>
               </a:rPr>
               <a:t>clone</a:t>
             </a:r>
             <a:r>
-              <a:rPr lang="en-GB">
+              <a:rPr lang="en-GB" dirty="0">
                 <a:latin typeface="Calibri" charset="0"/>
               </a:rPr>
               <a:t> link</a:t>
@@ -6278,7 +6288,8 @@
                 <a:solidFill>
                   <a:schemeClr val="bg1"/>
                 </a:solidFill>
-                <a:latin typeface="Menlo" charset="0"/>
+                <a:latin typeface="Courier New" panose="02070309020205020404" pitchFamily="49" charset="0"/>
+                <a:cs typeface="Courier New" panose="02070309020205020404" pitchFamily="49" charset="0"/>
               </a:rPr>
               <a:t>$ </a:t>
             </a:r>
@@ -6287,7 +6298,8 @@
                 <a:solidFill>
                   <a:schemeClr val="bg1"/>
                 </a:solidFill>
-                <a:latin typeface="Menlo" charset="0"/>
+                <a:latin typeface="Courier New" panose="02070309020205020404" pitchFamily="49" charset="0"/>
+                <a:cs typeface="Courier New" panose="02070309020205020404" pitchFamily="49" charset="0"/>
               </a:rPr>
               <a:t>cd my-</a:t>
             </a:r>
@@ -6296,7 +6308,8 @@
                 <a:solidFill>
                   <a:schemeClr val="bg1"/>
                 </a:solidFill>
-                <a:latin typeface="Menlo" charset="0"/>
+                <a:latin typeface="Courier New" panose="02070309020205020404" pitchFamily="49" charset="0"/>
+                <a:cs typeface="Courier New" panose="02070309020205020404" pitchFamily="49" charset="0"/>
               </a:rPr>
               <a:t>isc</a:t>
             </a:r>
@@ -6305,7 +6318,8 @@
                 <a:solidFill>
                   <a:schemeClr val="bg1"/>
                 </a:solidFill>
-                <a:latin typeface="Menlo" charset="0"/>
+                <a:latin typeface="Courier New" panose="02070309020205020404" pitchFamily="49" charset="0"/>
+                <a:cs typeface="Courier New" panose="02070309020205020404" pitchFamily="49" charset="0"/>
               </a:rPr>
               <a:t>-work</a:t>
             </a:r>
@@ -6314,7 +6328,8 @@
                 <a:solidFill>
                   <a:schemeClr val="bg1"/>
                 </a:solidFill>
-                <a:latin typeface="Menlo" charset="0"/>
+                <a:latin typeface="Courier New" panose="02070309020205020404" pitchFamily="49" charset="0"/>
+                <a:cs typeface="Courier New" panose="02070309020205020404" pitchFamily="49" charset="0"/>
               </a:rPr>
               <a:t>/</a:t>
             </a:r>
@@ -6323,7 +6338,8 @@
                 <a:solidFill>
                   <a:schemeClr val="bg1"/>
                 </a:solidFill>
-                <a:latin typeface="Menlo" charset="0"/>
+                <a:latin typeface="Courier New" panose="02070309020205020404" pitchFamily="49" charset="0"/>
+                <a:cs typeface="Courier New" panose="02070309020205020404" pitchFamily="49" charset="0"/>
               </a:rPr>
               <a:t> </a:t>
             </a:r>
@@ -6332,7 +6348,8 @@
                 <a:solidFill>
                   <a:schemeClr val="bg1"/>
                 </a:solidFill>
-                <a:latin typeface="Menlo" charset="0"/>
+                <a:latin typeface="Courier New" panose="02070309020205020404" pitchFamily="49" charset="0"/>
+                <a:cs typeface="Courier New" panose="02070309020205020404" pitchFamily="49" charset="0"/>
               </a:rPr>
               <a:t>    </a:t>
             </a:r>
@@ -6343,7 +6360,8 @@
                 <a:solidFill>
                   <a:schemeClr val="bg1"/>
                 </a:solidFill>
-                <a:latin typeface="Menlo" charset="0"/>
+                <a:latin typeface="Courier New" panose="02070309020205020404" pitchFamily="49" charset="0"/>
+                <a:cs typeface="Courier New" panose="02070309020205020404" pitchFamily="49" charset="0"/>
               </a:rPr>
               <a:t>$ </a:t>
             </a:r>
@@ -6352,7 +6370,8 @@
                 <a:solidFill>
                   <a:schemeClr val="bg1"/>
                 </a:solidFill>
-                <a:latin typeface="Menlo" charset="0"/>
+                <a:latin typeface="Courier New" panose="02070309020205020404" pitchFamily="49" charset="0"/>
+                <a:cs typeface="Courier New" panose="02070309020205020404" pitchFamily="49" charset="0"/>
               </a:rPr>
               <a:t>ls</a:t>
             </a:r>
@@ -6363,7 +6382,8 @@
                 <a:solidFill>
                   <a:schemeClr val="bg1"/>
                 </a:solidFill>
-                <a:latin typeface="Menlo" charset="0"/>
+                <a:latin typeface="Courier New" panose="02070309020205020404" pitchFamily="49" charset="0"/>
+                <a:cs typeface="Courier New" panose="02070309020205020404" pitchFamily="49" charset="0"/>
               </a:rPr>
               <a:t>README.md</a:t>
             </a:r>
@@ -6371,7 +6391,8 @@
               <a:solidFill>
                 <a:schemeClr val="bg1"/>
               </a:solidFill>
-              <a:latin typeface="Menlo" charset="0"/>
+              <a:latin typeface="Courier New" panose="02070309020205020404" pitchFamily="49" charset="0"/>
+              <a:cs typeface="Courier New" panose="02070309020205020404" pitchFamily="49" charset="0"/>
             </a:endParaRPr>
           </a:p>
           <a:p>
@@ -6380,7 +6401,8 @@
                 <a:solidFill>
                   <a:schemeClr val="bg1"/>
                 </a:solidFill>
-                <a:latin typeface="Menlo" charset="0"/>
+                <a:latin typeface="Courier New" panose="02070309020205020404" pitchFamily="49" charset="0"/>
+                <a:cs typeface="Courier New" panose="02070309020205020404" pitchFamily="49" charset="0"/>
               </a:rPr>
               <a:t>$ </a:t>
             </a:r>
@@ -6389,7 +6411,8 @@
                 <a:solidFill>
                   <a:schemeClr val="bg1"/>
                 </a:solidFill>
-                <a:latin typeface="Menlo" charset="0"/>
+                <a:latin typeface="Courier New" panose="02070309020205020404" pitchFamily="49" charset="0"/>
+                <a:cs typeface="Courier New" panose="02070309020205020404" pitchFamily="49" charset="0"/>
               </a:rPr>
               <a:t>touch x</a:t>
             </a:r>
@@ -6400,7 +6423,8 @@
                 <a:solidFill>
                   <a:schemeClr val="bg1"/>
                 </a:solidFill>
-                <a:latin typeface="Menlo" charset="0"/>
+                <a:latin typeface="Courier New" panose="02070309020205020404" pitchFamily="49" charset="0"/>
+                <a:cs typeface="Courier New" panose="02070309020205020404" pitchFamily="49" charset="0"/>
               </a:rPr>
               <a:t>$ </a:t>
             </a:r>
@@ -6409,7 +6433,8 @@
                 <a:solidFill>
                   <a:schemeClr val="bg1"/>
                 </a:solidFill>
-                <a:latin typeface="Menlo" charset="0"/>
+                <a:latin typeface="Courier New" panose="02070309020205020404" pitchFamily="49" charset="0"/>
+                <a:cs typeface="Courier New" panose="02070309020205020404" pitchFamily="49" charset="0"/>
               </a:rPr>
               <a:t>ls</a:t>
             </a:r>
@@ -6420,7 +6445,8 @@
                 <a:solidFill>
                   <a:schemeClr val="bg1"/>
                 </a:solidFill>
-                <a:latin typeface="Menlo" charset="0"/>
+                <a:latin typeface="Courier New" panose="02070309020205020404" pitchFamily="49" charset="0"/>
+                <a:cs typeface="Courier New" panose="02070309020205020404" pitchFamily="49" charset="0"/>
               </a:rPr>
               <a:t>README.md</a:t>
             </a:r>
@@ -6429,7 +6455,8 @@
                 <a:solidFill>
                   <a:schemeClr val="bg1"/>
                 </a:solidFill>
-                <a:latin typeface="Menlo" charset="0"/>
+                <a:latin typeface="Courier New" panose="02070309020205020404" pitchFamily="49" charset="0"/>
+                <a:cs typeface="Courier New" panose="02070309020205020404" pitchFamily="49" charset="0"/>
               </a:rPr>
               <a:t> x</a:t>
             </a:r>
@@ -6440,7 +6467,8 @@
                 <a:solidFill>
                   <a:schemeClr val="bg1"/>
                 </a:solidFill>
-                <a:latin typeface="Menlo" charset="0"/>
+                <a:latin typeface="Courier New" panose="02070309020205020404" pitchFamily="49" charset="0"/>
+                <a:cs typeface="Courier New" panose="02070309020205020404" pitchFamily="49" charset="0"/>
               </a:rPr>
               <a:t>$ </a:t>
             </a:r>
@@ -6449,7 +6477,8 @@
                 <a:solidFill>
                   <a:schemeClr val="bg1"/>
                 </a:solidFill>
-                <a:latin typeface="Menlo" charset="0"/>
+                <a:latin typeface="Courier New" panose="02070309020205020404" pitchFamily="49" charset="0"/>
+                <a:cs typeface="Courier New" panose="02070309020205020404" pitchFamily="49" charset="0"/>
               </a:rPr>
               <a:t>git</a:t>
             </a:r>
@@ -6458,7 +6487,8 @@
                 <a:solidFill>
                   <a:schemeClr val="bg1"/>
                 </a:solidFill>
-                <a:latin typeface="Menlo" charset="0"/>
+                <a:latin typeface="Courier New" panose="02070309020205020404" pitchFamily="49" charset="0"/>
+                <a:cs typeface="Courier New" panose="02070309020205020404" pitchFamily="49" charset="0"/>
               </a:rPr>
               <a:t> add x</a:t>
             </a:r>
@@ -6469,7 +6499,8 @@
                 <a:solidFill>
                   <a:schemeClr val="bg1"/>
                 </a:solidFill>
-                <a:latin typeface="Menlo" charset="0"/>
+                <a:latin typeface="Courier New" panose="02070309020205020404" pitchFamily="49" charset="0"/>
+                <a:cs typeface="Courier New" panose="02070309020205020404" pitchFamily="49" charset="0"/>
               </a:rPr>
               <a:t>$ </a:t>
             </a:r>
@@ -6478,7 +6509,8 @@
                 <a:solidFill>
                   <a:schemeClr val="bg1"/>
                 </a:solidFill>
-                <a:latin typeface="Menlo" charset="0"/>
+                <a:latin typeface="Courier New" panose="02070309020205020404" pitchFamily="49" charset="0"/>
+                <a:cs typeface="Courier New" panose="02070309020205020404" pitchFamily="49" charset="0"/>
               </a:rPr>
               <a:t>git</a:t>
             </a:r>
@@ -6487,7 +6519,8 @@
                 <a:solidFill>
                   <a:schemeClr val="bg1"/>
                 </a:solidFill>
-                <a:latin typeface="Menlo" charset="0"/>
+                <a:latin typeface="Courier New" panose="02070309020205020404" pitchFamily="49" charset="0"/>
+                <a:cs typeface="Courier New" panose="02070309020205020404" pitchFamily="49" charset="0"/>
               </a:rPr>
               <a:t> commit x -m 'new x file'</a:t>
             </a:r>
@@ -6498,7 +6531,8 @@
                 <a:solidFill>
                   <a:schemeClr val="bg1"/>
                 </a:solidFill>
-                <a:latin typeface="Menlo" charset="0"/>
+                <a:latin typeface="Courier New" panose="02070309020205020404" pitchFamily="49" charset="0"/>
+                <a:cs typeface="Courier New" panose="02070309020205020404" pitchFamily="49" charset="0"/>
               </a:rPr>
               <a:t>[master 3aefe17] new x file</a:t>
             </a:r>
@@ -6509,7 +6543,8 @@
                 <a:solidFill>
                   <a:schemeClr val="bg1"/>
                 </a:solidFill>
-                <a:latin typeface="Menlo" charset="0"/>
+                <a:latin typeface="Courier New" panose="02070309020205020404" pitchFamily="49" charset="0"/>
+                <a:cs typeface="Courier New" panose="02070309020205020404" pitchFamily="49" charset="0"/>
               </a:rPr>
               <a:t> 1 file changed, 0 insertions(+), 0 deletions(-)</a:t>
             </a:r>
@@ -6520,7 +6555,8 @@
                 <a:solidFill>
                   <a:schemeClr val="bg1"/>
                 </a:solidFill>
-                <a:latin typeface="Menlo" charset="0"/>
+                <a:latin typeface="Courier New" panose="02070309020205020404" pitchFamily="49" charset="0"/>
+                <a:cs typeface="Courier New" panose="02070309020205020404" pitchFamily="49" charset="0"/>
               </a:rPr>
               <a:t> create mode 100644 x</a:t>
             </a:r>
@@ -6531,7 +6567,8 @@
                 <a:solidFill>
                   <a:schemeClr val="bg1"/>
                 </a:solidFill>
-                <a:latin typeface="Menlo" charset="0"/>
+                <a:latin typeface="Courier New" panose="02070309020205020404" pitchFamily="49" charset="0"/>
+                <a:cs typeface="Courier New" panose="02070309020205020404" pitchFamily="49" charset="0"/>
               </a:rPr>
               <a:t>$ </a:t>
             </a:r>
@@ -6540,7 +6577,8 @@
                 <a:solidFill>
                   <a:schemeClr val="bg1"/>
                 </a:solidFill>
-                <a:latin typeface="Menlo" charset="0"/>
+                <a:latin typeface="Courier New" panose="02070309020205020404" pitchFamily="49" charset="0"/>
+                <a:cs typeface="Courier New" panose="02070309020205020404" pitchFamily="49" charset="0"/>
               </a:rPr>
               <a:t>git</a:t>
             </a:r>
@@ -6549,7 +6587,8 @@
                 <a:solidFill>
                   <a:schemeClr val="bg1"/>
                 </a:solidFill>
-                <a:latin typeface="Menlo" charset="0"/>
+                <a:latin typeface="Courier New" panose="02070309020205020404" pitchFamily="49" charset="0"/>
+                <a:cs typeface="Courier New" panose="02070309020205020404" pitchFamily="49" charset="0"/>
               </a:rPr>
               <a:t> push</a:t>
             </a:r>
@@ -6560,7 +6599,8 @@
                 <a:solidFill>
                   <a:schemeClr val="bg1"/>
                 </a:solidFill>
-                <a:latin typeface="Menlo" charset="0"/>
+                <a:latin typeface="Courier New" panose="02070309020205020404" pitchFamily="49" charset="0"/>
+                <a:cs typeface="Courier New" panose="02070309020205020404" pitchFamily="49" charset="0"/>
               </a:rPr>
               <a:t>Counting objects: 3, done.</a:t>
             </a:r>
@@ -6571,7 +6611,8 @@
                 <a:solidFill>
                   <a:schemeClr val="bg1"/>
                 </a:solidFill>
-                <a:latin typeface="Menlo" charset="0"/>
+                <a:latin typeface="Courier New" panose="02070309020205020404" pitchFamily="49" charset="0"/>
+                <a:cs typeface="Courier New" panose="02070309020205020404" pitchFamily="49" charset="0"/>
               </a:rPr>
               <a:t>Delta compression using up to 4 threads.</a:t>
             </a:r>
@@ -6582,7 +6623,8 @@
                 <a:solidFill>
                   <a:schemeClr val="bg1"/>
                 </a:solidFill>
-                <a:latin typeface="Menlo" charset="0"/>
+                <a:latin typeface="Courier New" panose="02070309020205020404" pitchFamily="49" charset="0"/>
+                <a:cs typeface="Courier New" panose="02070309020205020404" pitchFamily="49" charset="0"/>
               </a:rPr>
               <a:t>Compressing objects: 100% (2/2), done.</a:t>
             </a:r>
@@ -6593,7 +6635,8 @@
                 <a:solidFill>
                   <a:schemeClr val="bg1"/>
                 </a:solidFill>
-                <a:latin typeface="Menlo" charset="0"/>
+                <a:latin typeface="Courier New" panose="02070309020205020404" pitchFamily="49" charset="0"/>
+                <a:cs typeface="Courier New" panose="02070309020205020404" pitchFamily="49" charset="0"/>
               </a:rPr>
               <a:t>Writing objects: 100% (3/3), 272 bytes | 272.00 KiB/s, done.</a:t>
             </a:r>
@@ -6604,7 +6647,8 @@
                 <a:solidFill>
                   <a:schemeClr val="bg1"/>
                 </a:solidFill>
-                <a:latin typeface="Menlo" charset="0"/>
+                <a:latin typeface="Courier New" panose="02070309020205020404" pitchFamily="49" charset="0"/>
+                <a:cs typeface="Courier New" panose="02070309020205020404" pitchFamily="49" charset="0"/>
               </a:rPr>
               <a:t>Total 3 (delta 0), reused 0 (delta 0)</a:t>
             </a:r>
@@ -6615,7 +6659,8 @@
                 <a:solidFill>
                   <a:schemeClr val="bg1"/>
                 </a:solidFill>
-                <a:latin typeface="Menlo" charset="0"/>
+                <a:latin typeface="Courier New" panose="02070309020205020404" pitchFamily="49" charset="0"/>
+                <a:cs typeface="Courier New" panose="02070309020205020404" pitchFamily="49" charset="0"/>
               </a:rPr>
               <a:t>To https://</a:t>
             </a:r>
@@ -6624,7 +6669,8 @@
                 <a:solidFill>
                   <a:schemeClr val="bg1"/>
                 </a:solidFill>
-                <a:latin typeface="Menlo" charset="0"/>
+                <a:latin typeface="Courier New" panose="02070309020205020404" pitchFamily="49" charset="0"/>
+                <a:cs typeface="Courier New" panose="02070309020205020404" pitchFamily="49" charset="0"/>
               </a:rPr>
               <a:t>github.com</a:t>
             </a:r>
@@ -6633,7 +6679,8 @@
                 <a:solidFill>
                   <a:schemeClr val="bg1"/>
                 </a:solidFill>
-                <a:latin typeface="Menlo" charset="0"/>
+                <a:latin typeface="Courier New" panose="02070309020205020404" pitchFamily="49" charset="0"/>
+                <a:cs typeface="Courier New" panose="02070309020205020404" pitchFamily="49" charset="0"/>
               </a:rPr>
               <a:t>/</a:t>
             </a:r>
@@ -6642,7 +6689,8 @@
                 <a:solidFill>
                   <a:schemeClr val="bg1"/>
                 </a:solidFill>
-                <a:latin typeface="Menlo" charset="0"/>
+                <a:latin typeface="Courier New" panose="02070309020205020404" pitchFamily="49" charset="0"/>
+                <a:cs typeface="Courier New" panose="02070309020205020404" pitchFamily="49" charset="0"/>
               </a:rPr>
               <a:t>spepler</a:t>
             </a:r>
@@ -6651,7 +6699,8 @@
                 <a:solidFill>
                   <a:schemeClr val="bg1"/>
                 </a:solidFill>
-                <a:latin typeface="Menlo" charset="0"/>
+                <a:latin typeface="Courier New" panose="02070309020205020404" pitchFamily="49" charset="0"/>
+                <a:cs typeface="Courier New" panose="02070309020205020404" pitchFamily="49" charset="0"/>
               </a:rPr>
               <a:t>/my-</a:t>
             </a:r>
@@ -6660,7 +6709,8 @@
                 <a:solidFill>
                   <a:schemeClr val="bg1"/>
                 </a:solidFill>
-                <a:latin typeface="Menlo" charset="0"/>
+                <a:latin typeface="Courier New" panose="02070309020205020404" pitchFamily="49" charset="0"/>
+                <a:cs typeface="Courier New" panose="02070309020205020404" pitchFamily="49" charset="0"/>
               </a:rPr>
               <a:t>isc</a:t>
             </a:r>
@@ -6669,7 +6719,8 @@
                 <a:solidFill>
                   <a:schemeClr val="bg1"/>
                 </a:solidFill>
-                <a:latin typeface="Menlo" charset="0"/>
+                <a:latin typeface="Courier New" panose="02070309020205020404" pitchFamily="49" charset="0"/>
+                <a:cs typeface="Courier New" panose="02070309020205020404" pitchFamily="49" charset="0"/>
               </a:rPr>
               <a:t>-</a:t>
             </a:r>
@@ -6678,7 +6729,8 @@
                 <a:solidFill>
                   <a:schemeClr val="bg1"/>
                 </a:solidFill>
-                <a:latin typeface="Menlo" charset="0"/>
+                <a:latin typeface="Courier New" panose="02070309020205020404" pitchFamily="49" charset="0"/>
+                <a:cs typeface="Courier New" panose="02070309020205020404" pitchFamily="49" charset="0"/>
               </a:rPr>
               <a:t>work.git</a:t>
             </a:r>
@@ -6686,7 +6738,8 @@
               <a:solidFill>
                 <a:schemeClr val="bg1"/>
               </a:solidFill>
-              <a:latin typeface="Menlo" charset="0"/>
+              <a:latin typeface="Courier New" panose="02070309020205020404" pitchFamily="49" charset="0"/>
+              <a:cs typeface="Courier New" panose="02070309020205020404" pitchFamily="49" charset="0"/>
             </a:endParaRPr>
           </a:p>
           <a:p>
@@ -6695,7 +6748,8 @@
                 <a:solidFill>
                   <a:schemeClr val="bg1"/>
                 </a:solidFill>
-                <a:latin typeface="Menlo" charset="0"/>
+                <a:latin typeface="Courier New" panose="02070309020205020404" pitchFamily="49" charset="0"/>
+                <a:cs typeface="Courier New" panose="02070309020205020404" pitchFamily="49" charset="0"/>
               </a:rPr>
               <a:t>   183fa53..3aefe17  master -&gt; </a:t>
             </a:r>
@@ -6704,7 +6758,8 @@
                 <a:solidFill>
                   <a:schemeClr val="bg1"/>
                 </a:solidFill>
-                <a:latin typeface="Menlo" charset="0"/>
+                <a:latin typeface="Courier New" panose="02070309020205020404" pitchFamily="49" charset="0"/>
+                <a:cs typeface="Courier New" panose="02070309020205020404" pitchFamily="49" charset="0"/>
               </a:rPr>
               <a:t>master</a:t>
             </a:r>
@@ -6712,7 +6767,8 @@
               <a:solidFill>
                 <a:schemeClr val="bg1"/>
               </a:solidFill>
-              <a:latin typeface="Menlo" charset="0"/>
+              <a:latin typeface="Courier New" panose="02070309020205020404" pitchFamily="49" charset="0"/>
+              <a:cs typeface="Courier New" panose="02070309020205020404" pitchFamily="49" charset="0"/>
             </a:endParaRPr>
           </a:p>
         </p:txBody>
@@ -6751,6 +6807,7 @@
                 <a:solidFill>
                   <a:schemeClr val="bg1"/>
                 </a:solidFill>
+                <a:latin typeface="+mn-lt"/>
               </a:rPr>
               <a:t>The my-</a:t>
             </a:r>
@@ -6759,6 +6816,7 @@
                 <a:solidFill>
                   <a:schemeClr val="bg1"/>
                 </a:solidFill>
+                <a:latin typeface="+mn-lt"/>
               </a:rPr>
               <a:t>isc</a:t>
             </a:r>
@@ -6767,6 +6825,7 @@
                 <a:solidFill>
                   <a:schemeClr val="bg1"/>
                 </a:solidFill>
+                <a:latin typeface="+mn-lt"/>
               </a:rPr>
               <a:t>-work repo is now on the laptop and I can list the </a:t>
             </a:r>
@@ -6775,6 +6834,7 @@
                 <a:solidFill>
                   <a:schemeClr val="bg1"/>
                 </a:solidFill>
+                <a:latin typeface="+mn-lt"/>
               </a:rPr>
               <a:t>README.md</a:t>
             </a:r>
@@ -6783,6 +6843,7 @@
                 <a:solidFill>
                   <a:schemeClr val="bg1"/>
                 </a:solidFill>
+                <a:latin typeface="+mn-lt"/>
               </a:rPr>
               <a:t> file</a:t>
             </a:r>
@@ -6790,6 +6851,7 @@
               <a:solidFill>
                 <a:schemeClr val="bg1"/>
               </a:solidFill>
+              <a:latin typeface="+mn-lt"/>
             </a:endParaRPr>
           </a:p>
         </p:txBody>
@@ -6824,10 +6886,11 @@
           <a:lstStyle/>
           <a:p>
             <a:r>
-              <a:rPr lang="en-US" smtClean="0">
+              <a:rPr lang="en-US" dirty="0" smtClean="0">
                 <a:solidFill>
                   <a:schemeClr val="bg1"/>
                 </a:solidFill>
+                <a:latin typeface="+mn-lt"/>
               </a:rPr>
               <a:t>Make a blank file “x” </a:t>
             </a:r>
@@ -6835,6 +6898,7 @@
               <a:solidFill>
                 <a:schemeClr val="bg1"/>
               </a:solidFill>
+              <a:latin typeface="+mn-lt"/>
             </a:endParaRPr>
           </a:p>
         </p:txBody>
@@ -6848,7 +6912,7 @@
         <p:spPr>
           <a:xfrm>
             <a:off x="4508500" y="1926670"/>
-            <a:ext cx="3289300" cy="923330"/>
+            <a:ext cx="3289300" cy="646331"/>
           </a:xfrm>
           <a:prstGeom prst="rect">
             <a:avLst/>
@@ -6873,6 +6937,7 @@
                 <a:solidFill>
                   <a:schemeClr val="bg1"/>
                 </a:solidFill>
+                <a:latin typeface="+mn-lt"/>
               </a:rPr>
               <a:t>Use </a:t>
             </a:r>
@@ -6881,6 +6946,7 @@
                 <a:solidFill>
                   <a:schemeClr val="bg1"/>
                 </a:solidFill>
+                <a:latin typeface="+mn-lt"/>
               </a:rPr>
               <a:t>git</a:t>
             </a:r>
@@ -6889,6 +6955,7 @@
                 <a:solidFill>
                   <a:schemeClr val="bg1"/>
                 </a:solidFill>
+                <a:latin typeface="+mn-lt"/>
               </a:rPr>
               <a:t> add and </a:t>
             </a:r>
@@ -6897,6 +6964,7 @@
                 <a:solidFill>
                   <a:schemeClr val="bg1"/>
                 </a:solidFill>
+                <a:latin typeface="+mn-lt"/>
               </a:rPr>
               <a:t>git</a:t>
             </a:r>
@@ -6905,6 +6973,7 @@
                 <a:solidFill>
                   <a:schemeClr val="bg1"/>
                 </a:solidFill>
+                <a:latin typeface="+mn-lt"/>
               </a:rPr>
               <a:t> commit to put the file under version control</a:t>
             </a:r>
@@ -6912,6 +6981,7 @@
               <a:solidFill>
                 <a:schemeClr val="bg1"/>
               </a:solidFill>
+              <a:latin typeface="+mn-lt"/>
             </a:endParaRPr>
           </a:p>
         </p:txBody>
@@ -6950,6 +7020,7 @@
                 <a:solidFill>
                   <a:schemeClr val="bg1"/>
                 </a:solidFill>
+                <a:latin typeface="+mn-lt"/>
               </a:rPr>
               <a:t>Use </a:t>
             </a:r>
@@ -6958,6 +7029,7 @@
                 <a:solidFill>
                   <a:schemeClr val="bg1"/>
                 </a:solidFill>
+                <a:latin typeface="+mn-lt"/>
               </a:rPr>
               <a:t>git</a:t>
             </a:r>
@@ -6966,6 +7038,7 @@
                 <a:solidFill>
                   <a:schemeClr val="bg1"/>
                 </a:solidFill>
+                <a:latin typeface="+mn-lt"/>
               </a:rPr>
               <a:t> push to update </a:t>
             </a:r>
@@ -6974,6 +7047,7 @@
                 <a:solidFill>
                   <a:schemeClr val="bg1"/>
                 </a:solidFill>
+                <a:latin typeface="+mn-lt"/>
               </a:rPr>
               <a:t>github</a:t>
             </a:r>
@@ -6982,6 +7056,7 @@
                 <a:solidFill>
                   <a:schemeClr val="bg1"/>
                 </a:solidFill>
+                <a:latin typeface="+mn-lt"/>
               </a:rPr>
               <a:t> copy of the repo with the changes (in this case adding the “x” file)</a:t>
             </a:r>
@@ -6989,6 +7064,7 @@
               <a:solidFill>
                 <a:schemeClr val="bg1"/>
               </a:solidFill>
+              <a:latin typeface="+mn-lt"/>
             </a:endParaRPr>
           </a:p>
         </p:txBody>
@@ -7207,7 +7283,7 @@
           </p:nvPr>
         </p:nvPicPr>
         <p:blipFill>
-          <a:blip r:embed="rId2">
+          <a:blip r:embed="rId2" cstate="email">
             <a:extLst>
               <a:ext uri="{28A0092B-C50C-407E-A947-70E740481C1C}">
                 <a14:useLocalDpi xmlns:a14="http://schemas.microsoft.com/office/drawing/2010/main" val="0"/>
@@ -7461,7 +7537,7 @@
           <a:lstStyle/>
           <a:p>
             <a:r>
-              <a:rPr lang="en-GB">
+              <a:rPr lang="en-GB" dirty="0">
                 <a:latin typeface="Calibri" charset="0"/>
               </a:rPr>
               <a:t>Managing code in the olden days</a:t>
@@ -7490,13 +7566,13 @@
           <a:lstStyle/>
           <a:p>
             <a:r>
-              <a:rPr lang="en-GB" sz="2800">
+              <a:rPr lang="en-GB" sz="2800" dirty="0">
                 <a:latin typeface="Calibri" charset="0"/>
               </a:rPr>
               <a:t>Create “</a:t>
             </a:r>
             <a:r>
-              <a:rPr lang="en-GB" sz="2800" i="1">
+              <a:rPr lang="en-GB" sz="2800" i="1" dirty="0" err="1">
                 <a:solidFill>
                   <a:srgbClr val="376092"/>
                 </a:solidFill>
@@ -7505,7 +7581,7 @@
               <a:t>working_dir</a:t>
             </a:r>
             <a:r>
-              <a:rPr lang="en-GB" sz="2800">
+              <a:rPr lang="en-GB" sz="2800" dirty="0">
                 <a:latin typeface="Calibri" charset="0"/>
               </a:rPr>
               <a:t>”...add some code</a:t>
@@ -7513,7 +7589,7 @@
           </a:p>
           <a:p>
             <a:r>
-              <a:rPr lang="en-GB" sz="2800">
+              <a:rPr lang="en-GB" sz="2800" dirty="0">
                 <a:latin typeface="Calibri" charset="0"/>
               </a:rPr>
               <a:t>Write some outputs...change the code</a:t>
@@ -7521,7 +7597,7 @@
           </a:p>
           <a:p>
             <a:r>
-              <a:rPr lang="en-GB" sz="2800">
+              <a:rPr lang="en-GB" sz="2800" dirty="0">
                 <a:latin typeface="Calibri" charset="0"/>
               </a:rPr>
               <a:t>Publish a paper...change the code</a:t>
@@ -7529,13 +7605,13 @@
           </a:p>
           <a:p>
             <a:r>
-              <a:rPr lang="en-GB" sz="2800">
+              <a:rPr lang="en-GB" sz="2800" dirty="0">
                 <a:latin typeface="Calibri" charset="0"/>
               </a:rPr>
               <a:t>Copy “</a:t>
             </a:r>
             <a:r>
-              <a:rPr lang="en-GB" sz="2800" i="1">
+              <a:rPr lang="en-GB" sz="2800" i="1" dirty="0" err="1">
                 <a:solidFill>
                   <a:srgbClr val="376092"/>
                 </a:solidFill>
@@ -7544,13 +7620,13 @@
               <a:t>working_dir</a:t>
             </a:r>
             <a:r>
-              <a:rPr lang="en-GB" sz="2800">
+              <a:rPr lang="en-GB" sz="2800" dirty="0">
                 <a:latin typeface="Calibri" charset="0"/>
               </a:rPr>
               <a:t>” to “</a:t>
             </a:r>
             <a:r>
-              <a:rPr lang="en-GB" sz="2800" i="1">
+              <a:rPr lang="en-GB" sz="2800" i="1" dirty="0">
                 <a:solidFill>
                   <a:srgbClr val="376092"/>
                 </a:solidFill>
@@ -7559,7 +7635,7 @@
               <a:t>working_dir2</a:t>
             </a:r>
             <a:r>
-              <a:rPr lang="en-GB" sz="2800">
+              <a:rPr lang="en-GB" sz="2800" dirty="0">
                 <a:latin typeface="Calibri" charset="0"/>
               </a:rPr>
               <a:t>”</a:t>
@@ -7567,7 +7643,7 @@
           </a:p>
           <a:p>
             <a:r>
-              <a:rPr lang="en-GB" sz="2800">
+              <a:rPr lang="en-GB" sz="2800" dirty="0">
                 <a:latin typeface="Calibri" charset="0"/>
               </a:rPr>
               <a:t>Change the code</a:t>
@@ -7575,7 +7651,7 @@
           </a:p>
           <a:p>
             <a:r>
-              <a:rPr lang="en-GB" sz="2800">
+              <a:rPr lang="en-GB" sz="2800" dirty="0">
                 <a:latin typeface="Calibri" charset="0"/>
               </a:rPr>
               <a:t>Copy a version to a CD</a:t>
@@ -7586,7 +7662,7 @@
               <a:buFont typeface="Arial" charset="0"/>
               <a:buNone/>
             </a:pPr>
-            <a:endParaRPr lang="en-GB" sz="1000" i="1">
+            <a:endParaRPr lang="en-GB" sz="1000" i="1" dirty="0">
               <a:latin typeface="Calibri" charset="0"/>
             </a:endParaRPr>
           </a:p>
@@ -7596,7 +7672,7 @@
               <a:buNone/>
             </a:pPr>
             <a:r>
-              <a:rPr lang="en-GB" sz="2800" i="1">
+              <a:rPr lang="en-GB" sz="2800" i="1" dirty="0">
                 <a:solidFill>
                   <a:srgbClr val="404040"/>
                 </a:solidFill>
@@ -7605,16 +7681,34 @@
               <a:t>...now which version is current? Is it </a:t>
             </a:r>
             <a:r>
-              <a:rPr lang="en-GB" sz="2800" i="1">
+              <a:rPr lang="en-GB" sz="2800" i="1" dirty="0">
                 <a:solidFill>
                   <a:srgbClr val="002060"/>
                 </a:solidFill>
                 <a:latin typeface="Calibri" charset="0"/>
               </a:rPr>
-              <a:t>“working_dir” or “working_dir2”? </a:t>
-            </a:r>
-            <a:r>
-              <a:rPr lang="en-GB" sz="2800" i="1">
+              <a:t>“</a:t>
+            </a:r>
+            <a:r>
+              <a:rPr lang="en-GB" sz="2800" i="1" dirty="0" err="1">
+                <a:solidFill>
+                  <a:srgbClr val="002060"/>
+                </a:solidFill>
+                <a:latin typeface="Calibri" charset="0"/>
+              </a:rPr>
+              <a:t>working_dir</a:t>
+            </a:r>
+            <a:r>
+              <a:rPr lang="en-GB" sz="2800" i="1" dirty="0">
+                <a:solidFill>
+                  <a:srgbClr val="002060"/>
+                </a:solidFill>
+                <a:latin typeface="Calibri" charset="0"/>
+              </a:rPr>
+              <a:t>” or “working_dir2”? </a:t>
+            </a:r>
+            <a:r>
+              <a:rPr lang="en-GB" sz="2800" i="1" dirty="0">
                 <a:solidFill>
                   <a:srgbClr val="404040"/>
                 </a:solidFill>
@@ -7624,12 +7718,12 @@
             </a:r>
           </a:p>
           <a:p>
-            <a:endParaRPr lang="en-GB" sz="2800">
+            <a:endParaRPr lang="en-GB" sz="2800" dirty="0">
               <a:latin typeface="Calibri" charset="0"/>
             </a:endParaRPr>
           </a:p>
           <a:p>
-            <a:endParaRPr lang="en-GB" sz="2800">
+            <a:endParaRPr lang="en-GB" sz="2800" dirty="0">
               <a:latin typeface="Calibri" charset="0"/>
             </a:endParaRPr>
           </a:p>
@@ -8005,7 +8099,7 @@
           <a:lstStyle/>
           <a:p>
             <a:r>
-              <a:rPr lang="en-GB">
+              <a:rPr lang="en-GB" dirty="0">
                 <a:latin typeface="Calibri" charset="0"/>
               </a:rPr>
               <a:t>But those days are gone!</a:t>
@@ -8034,69 +8128,69 @@
           <a:lstStyle/>
           <a:p>
             <a:r>
-              <a:rPr lang="en-GB">
+              <a:rPr lang="en-GB" dirty="0">
                 <a:latin typeface="Calibri" charset="0"/>
               </a:rPr>
               <a:t>Scientists are typically </a:t>
             </a:r>
             <a:r>
-              <a:rPr lang="en-GB" b="1">
+              <a:rPr lang="en-GB" b="1" dirty="0">
                 <a:latin typeface="Calibri" charset="0"/>
               </a:rPr>
               <a:t>required to publish data and code</a:t>
             </a:r>
             <a:r>
-              <a:rPr lang="en-GB">
+              <a:rPr lang="en-GB" dirty="0">
                 <a:latin typeface="Calibri" charset="0"/>
               </a:rPr>
               <a:t> (by their funders/institutions).</a:t>
             </a:r>
           </a:p>
           <a:p>
-            <a:endParaRPr lang="en-GB" sz="1200">
+            <a:endParaRPr lang="en-GB" sz="1200" dirty="0">
               <a:latin typeface="Calibri" charset="0"/>
             </a:endParaRPr>
           </a:p>
           <a:p>
             <a:r>
-              <a:rPr lang="en-GB">
+              <a:rPr lang="en-GB" dirty="0">
                 <a:latin typeface="Calibri" charset="0"/>
               </a:rPr>
               <a:t>Collaboration between scientists requires data-sharing; this implicitly relies on </a:t>
             </a:r>
             <a:r>
-              <a:rPr lang="en-GB" b="1">
+              <a:rPr lang="en-GB" b="1" dirty="0">
                 <a:latin typeface="Calibri" charset="0"/>
               </a:rPr>
               <a:t>code-sharing</a:t>
             </a:r>
             <a:r>
-              <a:rPr lang="en-GB">
+              <a:rPr lang="en-GB" dirty="0">
                 <a:latin typeface="Calibri" charset="0"/>
               </a:rPr>
               <a:t>.</a:t>
             </a:r>
           </a:p>
           <a:p>
-            <a:endParaRPr lang="en-GB" sz="1200">
+            <a:endParaRPr lang="en-GB" sz="1200" dirty="0">
               <a:latin typeface="Calibri" charset="0"/>
             </a:endParaRPr>
           </a:p>
           <a:p>
             <a:r>
-              <a:rPr lang="en-GB">
+              <a:rPr lang="en-GB" dirty="0">
                 <a:latin typeface="Calibri" charset="0"/>
               </a:rPr>
               <a:t>There are </a:t>
             </a:r>
             <a:r>
-              <a:rPr lang="en-GB" b="1">
+              <a:rPr lang="en-GB" b="1" dirty="0">
                 <a:latin typeface="Calibri" charset="0"/>
               </a:rPr>
               <a:t>tools that make it easy </a:t>
             </a:r>
             <a:r>
-              <a:rPr lang="en-GB">
+              <a:rPr lang="en-GB" dirty="0">
                 <a:latin typeface="Calibri" charset="0"/>
               </a:rPr>
               <a:t>to record our changes, document our workflow and “fix” releases of our code at important steps along the way.</a:t>
@@ -8279,14 +8373,14 @@
           </a:ln>
           <a:extLst>
             <a:ext uri="{909E8E84-426E-40dd-AFC4-6F175D3DCCD1}">
-              <a14:hiddenFill xmlns="" xmlns:a14="http://schemas.microsoft.com/office/drawing/2010/main">
+              <a14:hiddenFill xmlns:a14="http://schemas.microsoft.com/office/drawing/2010/main" xmlns="">
                 <a:solidFill>
                   <a:srgbClr val="FFFFFF"/>
                 </a:solidFill>
               </a14:hiddenFill>
             </a:ext>
             <a:ext uri="{91240B29-F687-4f45-9708-019B960494DF}">
-              <a14:hiddenLine xmlns="" xmlns:a14="http://schemas.microsoft.com/office/drawing/2010/main" w="9525">
+              <a14:hiddenLine xmlns:a14="http://schemas.microsoft.com/office/drawing/2010/main" xmlns="" w="9525">
                 <a:solidFill>
                   <a:srgbClr val="000000"/>
                 </a:solidFill>
@@ -8508,11 +8602,11 @@
               </a:lnSpc>
             </a:pPr>
             <a:r>
-              <a:rPr lang="en-US" sz="3600">
+              <a:rPr lang="en-US" sz="3600" dirty="0">
                 <a:solidFill>
                   <a:srgbClr val="000000"/>
                 </a:solidFill>
-                <a:latin typeface="Droid Sans" charset="0"/>
+                <a:latin typeface="+mn-lt"/>
               </a:rPr>
               <a:t>So, working on the premise that we accept that we need to know about, and use, version control…</a:t>
             </a:r>
@@ -8618,14 +8712,14 @@
           </a:ln>
           <a:extLst>
             <a:ext uri="{909E8E84-426E-40dd-AFC4-6F175D3DCCD1}">
-              <a14:hiddenFill xmlns="" xmlns:a14="http://schemas.microsoft.com/office/drawing/2010/main">
+              <a14:hiddenFill xmlns:a14="http://schemas.microsoft.com/office/drawing/2010/main" xmlns="">
                 <a:solidFill>
                   <a:srgbClr val="FFFFFF"/>
                 </a:solidFill>
               </a14:hiddenFill>
             </a:ext>
             <a:ext uri="{91240B29-F687-4f45-9708-019B960494DF}">
-              <a14:hiddenLine xmlns="" xmlns:a14="http://schemas.microsoft.com/office/drawing/2010/main" w="9525">
+              <a14:hiddenLine xmlns:a14="http://schemas.microsoft.com/office/drawing/2010/main" xmlns="" w="9525">
                 <a:solidFill>
                   <a:srgbClr val="000000"/>
                 </a:solidFill>
@@ -8851,7 +8945,7 @@
                 <a:solidFill>
                   <a:srgbClr val="000000"/>
                 </a:solidFill>
-                <a:latin typeface="Droid Sans" charset="0"/>
+                <a:latin typeface="+mn-lt"/>
               </a:rPr>
               <a:t>We will </a:t>
             </a:r>
@@ -8860,7 +8954,7 @@
                 <a:solidFill>
                   <a:srgbClr val="000000"/>
                 </a:solidFill>
-                <a:latin typeface="Droid Sans" charset="0"/>
+                <a:latin typeface="+mn-lt"/>
               </a:rPr>
               <a:t>use </a:t>
             </a:r>
@@ -8869,7 +8963,7 @@
                 <a:solidFill>
                   <a:srgbClr val="000000"/>
                 </a:solidFill>
-                <a:latin typeface="Droid Sans" charset="0"/>
+                <a:latin typeface="+mn-lt"/>
               </a:rPr>
               <a:t>Git</a:t>
             </a:r>
@@ -8878,7 +8972,7 @@
                 <a:solidFill>
                   <a:srgbClr val="000000"/>
                 </a:solidFill>
-                <a:latin typeface="Droid Sans" charset="0"/>
+                <a:latin typeface="+mn-lt"/>
               </a:rPr>
               <a:t> and </a:t>
             </a:r>
@@ -8887,7 +8981,7 @@
                 <a:solidFill>
                   <a:srgbClr val="000000"/>
                 </a:solidFill>
-                <a:latin typeface="Droid Sans" charset="0"/>
+                <a:latin typeface="+mn-lt"/>
               </a:rPr>
               <a:t>GitHub</a:t>
             </a:r>
@@ -8895,7 +8989,7 @@
               <a:solidFill>
                 <a:srgbClr val="000000"/>
               </a:solidFill>
-              <a:latin typeface="Droid Sans" charset="0"/>
+              <a:latin typeface="+mn-lt"/>
             </a:endParaRPr>
           </a:p>
         </p:txBody>
@@ -8974,7 +9068,7 @@
           <a:lstStyle/>
           <a:p>
             <a:r>
-              <a:rPr lang="en-GB">
+              <a:rPr lang="en-GB" dirty="0">
                 <a:latin typeface="Calibri" charset="0"/>
               </a:rPr>
               <a:t>Introducing GitHub</a:t>
@@ -9042,14 +9136,14 @@
           </a:ln>
           <a:extLst>
             <a:ext uri="{909E8E84-426E-40dd-AFC4-6F175D3DCCD1}">
-              <a14:hiddenFill xmlns="" xmlns:a14="http://schemas.microsoft.com/office/drawing/2010/main">
+              <a14:hiddenFill xmlns:a14="http://schemas.microsoft.com/office/drawing/2010/main" xmlns="">
                 <a:solidFill>
                   <a:srgbClr val="FFFFFF"/>
                 </a:solidFill>
               </a14:hiddenFill>
             </a:ext>
             <a:ext uri="{91240B29-F687-4f45-9708-019B960494DF}">
-              <a14:hiddenLine xmlns="" xmlns:a14="http://schemas.microsoft.com/office/drawing/2010/main" w="9525">
+              <a14:hiddenLine xmlns:a14="http://schemas.microsoft.com/office/drawing/2010/main" xmlns="" w="9525">
                 <a:solidFill>
                   <a:srgbClr val="000000"/>
                 </a:solidFill>
@@ -9170,15 +9264,15 @@
           <a:p>
             <a:pPr algn="ctr"/>
             <a:r>
-              <a:rPr lang="en-GB">
-                <a:latin typeface="Arial" charset="0"/>
+              <a:rPr lang="en-GB" dirty="0">
+                <a:latin typeface="+mn-lt"/>
                 <a:hlinkClick r:id="rId4"/>
               </a:rPr>
               <a:t>https://github.com</a:t>
             </a:r>
             <a:r>
-              <a:rPr lang="en-GB">
-                <a:latin typeface="Arial" charset="0"/>
+              <a:rPr lang="en-GB" dirty="0">
+                <a:latin typeface="+mn-lt"/>
               </a:rPr>
               <a:t> </a:t>
             </a:r>
@@ -9226,7 +9320,7 @@
           <a:lstStyle/>
           <a:p>
             <a:r>
-              <a:rPr lang="en-GB">
+              <a:rPr lang="en-GB" dirty="0">
                 <a:latin typeface="Calibri" charset="0"/>
               </a:rPr>
               <a:t>Let's get started with GitHub</a:t>
@@ -9250,19 +9344,19 @@
           <a:lstStyle/>
           <a:p>
             <a:r>
-              <a:rPr lang="en-GB">
+              <a:rPr lang="en-GB" dirty="0">
                 <a:latin typeface="Calibri" charset="0"/>
               </a:rPr>
               <a:t>Anyone can get a free GitHub account - you'll only need to pay if you want </a:t>
             </a:r>
             <a:r>
-              <a:rPr lang="en-GB" i="1">
+              <a:rPr lang="en-GB" i="1" dirty="0">
                 <a:latin typeface="Calibri" charset="0"/>
               </a:rPr>
               <a:t>private</a:t>
             </a:r>
             <a:r>
-              <a:rPr lang="en-GB">
+              <a:rPr lang="en-GB" dirty="0">
                 <a:latin typeface="Calibri" charset="0"/>
               </a:rPr>
               <a:t> repos</a:t>
@@ -9270,7 +9364,7 @@
           </a:p>
           <a:p>
             <a:r>
-              <a:rPr lang="en-GB">
+              <a:rPr lang="en-GB" dirty="0">
                 <a:latin typeface="Calibri" charset="0"/>
               </a:rPr>
               <a:t>We are going to learn Git and GitHub by using them throughout this course.</a:t>
@@ -9278,19 +9372,19 @@
           </a:p>
           <a:p>
             <a:r>
-              <a:rPr lang="en-GB">
+              <a:rPr lang="en-GB" dirty="0">
                 <a:latin typeface="Calibri" charset="0"/>
               </a:rPr>
               <a:t>Let's get started… </a:t>
             </a:r>
             <a:r>
-              <a:rPr lang="en-GB" sz="4400" b="1">
+              <a:rPr lang="en-GB" sz="4400" b="1" dirty="0">
                 <a:latin typeface="Calibri" charset="0"/>
                 <a:sym typeface="Wingdings" charset="0"/>
               </a:rPr>
               <a:t></a:t>
             </a:r>
-            <a:endParaRPr lang="en-GB" b="1">
+            <a:endParaRPr lang="en-GB" b="1" dirty="0">
               <a:latin typeface="Calibri" charset="0"/>
             </a:endParaRPr>
           </a:p>
@@ -9337,7 +9431,7 @@
           <a:lstStyle/>
           <a:p>
             <a:r>
-              <a:rPr lang="en-GB">
+              <a:rPr lang="en-GB" dirty="0">
                 <a:latin typeface="Calibri" charset="0"/>
               </a:rPr>
               <a:t>Create a GitHub account</a:t>
@@ -9365,20 +9459,20 @@
               <a:buNone/>
             </a:pPr>
             <a:r>
-              <a:rPr lang="en-GB">
+              <a:rPr lang="en-GB" dirty="0">
                 <a:latin typeface="Calibri" charset="0"/>
               </a:rPr>
               <a:t>Go to:  </a:t>
             </a:r>
             <a:r>
-              <a:rPr lang="en-GB">
+              <a:rPr lang="en-GB" dirty="0">
                 <a:latin typeface="Calibri" charset="0"/>
                 <a:hlinkClick r:id="rId2"/>
               </a:rPr>
               <a:t>https://github.com</a:t>
             </a:r>
             <a:r>
-              <a:rPr lang="en-GB">
+              <a:rPr lang="en-GB" dirty="0">
                 <a:latin typeface="Calibri" charset="0"/>
               </a:rPr>
               <a:t>  and sign up:</a:t>
@@ -9527,7 +9621,7 @@
           <a:lstStyle/>
           <a:p>
             <a:r>
-              <a:rPr lang="en-GB">
+              <a:rPr lang="en-GB" dirty="0">
                 <a:latin typeface="Calibri" charset="0"/>
               </a:rPr>
               <a:t>Authentication</a:t>
@@ -9560,19 +9654,19 @@
               <a:buNone/>
             </a:pPr>
             <a:r>
-              <a:rPr lang="en-GB">
+              <a:rPr lang="en-GB" dirty="0">
                 <a:latin typeface="Calibri" charset="0"/>
               </a:rPr>
               <a:t>You can use either a username/password </a:t>
             </a:r>
             <a:r>
-              <a:rPr lang="en-GB" b="1">
+              <a:rPr lang="en-GB" b="1" dirty="0">
                 <a:latin typeface="Calibri" charset="0"/>
               </a:rPr>
               <a:t>or</a:t>
             </a:r>
             <a:r>
-              <a:rPr lang="en-GB">
+              <a:rPr lang="en-GB" dirty="0">
                 <a:latin typeface="Calibri" charset="0"/>
               </a:rPr>
               <a:t> SSH key authentication. The latter is more secure but many folks use username/password. </a:t>
@@ -9583,7 +9677,7 @@
               <a:buFont typeface="Arial" charset="0"/>
               <a:buNone/>
             </a:pPr>
-            <a:endParaRPr lang="en-GB">
+            <a:endParaRPr lang="en-GB" dirty="0">
               <a:latin typeface="Calibri" charset="0"/>
             </a:endParaRPr>
           </a:p>
@@ -9593,41 +9687,41 @@
               <a:buNone/>
             </a:pPr>
             <a:r>
-              <a:rPr lang="en-GB">
+              <a:rPr lang="en-GB" dirty="0">
                 <a:latin typeface="Calibri" charset="0"/>
               </a:rPr>
               <a:t>For this course </a:t>
             </a:r>
             <a:r>
-              <a:rPr lang="en-GB" b="1">
+              <a:rPr lang="en-GB" b="1" dirty="0">
                 <a:latin typeface="Calibri" charset="0"/>
               </a:rPr>
               <a:t>we will use </a:t>
             </a:r>
             <a:br>
-              <a:rPr lang="en-GB" b="1">
+              <a:rPr lang="en-GB" b="1" dirty="0">
                 <a:latin typeface="Calibri" charset="0"/>
               </a:rPr>
             </a:br>
             <a:r>
-              <a:rPr lang="en-GB" b="1">
+              <a:rPr lang="en-GB" b="1" dirty="0">
                 <a:latin typeface="Calibri" charset="0"/>
               </a:rPr>
               <a:t>username/password </a:t>
             </a:r>
             <a:r>
-              <a:rPr lang="en-GB">
+              <a:rPr lang="en-GB" dirty="0">
                 <a:latin typeface="Calibri" charset="0"/>
               </a:rPr>
               <a:t>for </a:t>
             </a:r>
             <a:br>
-              <a:rPr lang="en-GB">
+              <a:rPr lang="en-GB" dirty="0">
                 <a:latin typeface="Calibri" charset="0"/>
               </a:rPr>
             </a:br>
             <a:r>
-              <a:rPr lang="en-GB">
+              <a:rPr lang="en-GB" dirty="0">
                 <a:latin typeface="Calibri" charset="0"/>
               </a:rPr>
               <a:t>simplicity.</a:t>

</xml_diff>

<commit_message>
Rechecked shell presentations and finished and checked first 6 learning_python presentations
</commit_message>
<xml_diff>
--- a/shell/presentations/01_git1.pptx
+++ b/shell/presentations/01_git1.pptx
@@ -619,14 +619,14 @@
           <a:noFill/>
           <a:extLst>
             <a:ext uri="{909E8E84-426E-40dd-AFC4-6F175D3DCCD1}">
-              <a14:hiddenFill xmlns="" xmlns:a14="http://schemas.microsoft.com/office/drawing/2010/main">
+              <a14:hiddenFill xmlns:a14="http://schemas.microsoft.com/office/drawing/2010/main" xmlns="">
                 <a:solidFill>
                   <a:srgbClr val="FFFFFF"/>
                 </a:solidFill>
               </a14:hiddenFill>
             </a:ext>
             <a:ext uri="{91240B29-F687-4f45-9708-019B960494DF}">
-              <a14:hiddenLine xmlns="" xmlns:a14="http://schemas.microsoft.com/office/drawing/2010/main" w="9525">
+              <a14:hiddenLine xmlns:a14="http://schemas.microsoft.com/office/drawing/2010/main" xmlns="" w="9525">
                 <a:solidFill>
                   <a:srgbClr val="000000"/>
                 </a:solidFill>
@@ -799,7 +799,7 @@
           </a:ln>
           <a:extLst>
             <a:ext uri="{FAA26D3D-D897-4be2-8F04-BA451C77F1D7}">
-              <ma14:placeholderFlag xmlns="" xmlns:ma14="http://schemas.microsoft.com/office/mac/drawingml/2011/main" val="1"/>
+              <ma14:placeholderFlag xmlns:ma14="http://schemas.microsoft.com/office/mac/drawingml/2011/main" xmlns="" val="1"/>
             </a:ext>
           </a:extLst>
         </p:spPr>
@@ -822,17 +822,17 @@
           <a:noFill/>
           <a:extLst>
             <a:ext uri="{FAA26D3D-D897-4be2-8F04-BA451C77F1D7}">
-              <ma14:placeholderFlag xmlns="" xmlns:ma14="http://schemas.microsoft.com/office/mac/drawingml/2011/main" val="1"/>
+              <ma14:placeholderFlag xmlns:ma14="http://schemas.microsoft.com/office/mac/drawingml/2011/main" xmlns="" val="1"/>
             </a:ext>
             <a:ext uri="{909E8E84-426E-40dd-AFC4-6F175D3DCCD1}">
-              <a14:hiddenFill xmlns="" xmlns:a14="http://schemas.microsoft.com/office/drawing/2010/main">
+              <a14:hiddenFill xmlns:a14="http://schemas.microsoft.com/office/drawing/2010/main" xmlns="">
                 <a:solidFill>
                   <a:srgbClr val="FFFFFF"/>
                 </a:solidFill>
               </a14:hiddenFill>
             </a:ext>
             <a:ext uri="{91240B29-F687-4f45-9708-019B960494DF}">
-              <a14:hiddenLine xmlns="" xmlns:a14="http://schemas.microsoft.com/office/drawing/2010/main" w="9525">
+              <a14:hiddenLine xmlns:a14="http://schemas.microsoft.com/office/drawing/2010/main" xmlns="" w="9525">
                 <a:solidFill>
                   <a:srgbClr val="000000"/>
                 </a:solidFill>
@@ -911,14 +911,14 @@
           <a:noFill/>
           <a:extLst>
             <a:ext uri="{909E8E84-426E-40dd-AFC4-6F175D3DCCD1}">
-              <a14:hiddenFill xmlns="" xmlns:a14="http://schemas.microsoft.com/office/drawing/2010/main">
+              <a14:hiddenFill xmlns:a14="http://schemas.microsoft.com/office/drawing/2010/main" xmlns="">
                 <a:solidFill>
                   <a:srgbClr val="FFFFFF"/>
                 </a:solidFill>
               </a14:hiddenFill>
             </a:ext>
             <a:ext uri="{91240B29-F687-4f45-9708-019B960494DF}">
-              <a14:hiddenLine xmlns="" xmlns:a14="http://schemas.microsoft.com/office/drawing/2010/main" w="9525">
+              <a14:hiddenLine xmlns:a14="http://schemas.microsoft.com/office/drawing/2010/main" xmlns="" w="9525">
                 <a:solidFill>
                   <a:srgbClr val="000000"/>
                 </a:solidFill>
@@ -1091,7 +1091,7 @@
           </a:ln>
           <a:extLst>
             <a:ext uri="{FAA26D3D-D897-4be2-8F04-BA451C77F1D7}">
-              <ma14:placeholderFlag xmlns="" xmlns:ma14="http://schemas.microsoft.com/office/mac/drawingml/2011/main" val="1"/>
+              <ma14:placeholderFlag xmlns:ma14="http://schemas.microsoft.com/office/mac/drawingml/2011/main" xmlns="" val="1"/>
             </a:ext>
           </a:extLst>
         </p:spPr>
@@ -1114,14 +1114,14 @@
           <a:noFill/>
           <a:extLst>
             <a:ext uri="{909E8E84-426E-40dd-AFC4-6F175D3DCCD1}">
-              <a14:hiddenFill xmlns="" xmlns:a14="http://schemas.microsoft.com/office/drawing/2010/main">
+              <a14:hiddenFill xmlns:a14="http://schemas.microsoft.com/office/drawing/2010/main" xmlns="">
                 <a:solidFill>
                   <a:srgbClr val="FFFFFF"/>
                 </a:solidFill>
               </a14:hiddenFill>
             </a:ext>
             <a:ext uri="{91240B29-F687-4f45-9708-019B960494DF}">
-              <a14:hiddenLine xmlns="" xmlns:a14="http://schemas.microsoft.com/office/drawing/2010/main" w="9525">
+              <a14:hiddenLine xmlns:a14="http://schemas.microsoft.com/office/drawing/2010/main" xmlns="" w="9525">
                 <a:solidFill>
                   <a:srgbClr val="000000"/>
                 </a:solidFill>
@@ -1218,10 +1218,10 @@
           </a:ln>
           <a:extLst>
             <a:ext uri="{FAA26D3D-D897-4be2-8F04-BA451C77F1D7}">
-              <ma14:placeholderFlag xmlns="" xmlns:ma14="http://schemas.microsoft.com/office/mac/drawingml/2011/main" val="1"/>
+              <ma14:placeholderFlag xmlns:ma14="http://schemas.microsoft.com/office/mac/drawingml/2011/main" xmlns="" val="1"/>
             </a:ext>
             <a:ext uri="{909E8E84-426E-40dd-AFC4-6F175D3DCCD1}">
-              <a14:hiddenFill xmlns="" xmlns:a14="http://schemas.microsoft.com/office/drawing/2010/main">
+              <a14:hiddenFill xmlns:a14="http://schemas.microsoft.com/office/drawing/2010/main" xmlns="">
                 <a:solidFill>
                   <a:srgbClr val="FFFFFF"/>
                 </a:solidFill>
@@ -1244,14 +1244,14 @@
           <a:noFill/>
           <a:extLst>
             <a:ext uri="{909E8E84-426E-40dd-AFC4-6F175D3DCCD1}">
-              <a14:hiddenFill xmlns="" xmlns:a14="http://schemas.microsoft.com/office/drawing/2010/main">
+              <a14:hiddenFill xmlns:a14="http://schemas.microsoft.com/office/drawing/2010/main" xmlns="">
                 <a:solidFill>
                   <a:srgbClr val="FFFFFF"/>
                 </a:solidFill>
               </a14:hiddenFill>
             </a:ext>
             <a:ext uri="{91240B29-F687-4f45-9708-019B960494DF}">
-              <a14:hiddenLine xmlns="" xmlns:a14="http://schemas.microsoft.com/office/drawing/2010/main" w="9525">
+              <a14:hiddenLine xmlns:a14="http://schemas.microsoft.com/office/drawing/2010/main" xmlns="" w="9525">
                 <a:solidFill>
                   <a:srgbClr val="000000"/>
                 </a:solidFill>
@@ -1293,14 +1293,14 @@
           <a:noFill/>
           <a:extLst>
             <a:ext uri="{909E8E84-426E-40dd-AFC4-6F175D3DCCD1}">
-              <a14:hiddenFill xmlns="" xmlns:a14="http://schemas.microsoft.com/office/drawing/2010/main">
+              <a14:hiddenFill xmlns:a14="http://schemas.microsoft.com/office/drawing/2010/main" xmlns="">
                 <a:solidFill>
                   <a:srgbClr val="FFFFFF"/>
                 </a:solidFill>
               </a14:hiddenFill>
             </a:ext>
             <a:ext uri="{91240B29-F687-4f45-9708-019B960494DF}">
-              <a14:hiddenLine xmlns="" xmlns:a14="http://schemas.microsoft.com/office/drawing/2010/main" w="9525">
+              <a14:hiddenLine xmlns:a14="http://schemas.microsoft.com/office/drawing/2010/main" xmlns="" w="9525">
                 <a:solidFill>
                   <a:srgbClr val="000000"/>
                 </a:solidFill>
@@ -7126,7 +7126,7 @@
           </a:ln>
           <a:extLst>
             <a:ext uri="{909E8E84-426E-40dd-AFC4-6F175D3DCCD1}">
-              <a14:hiddenFill xmlns="" xmlns:a14="http://schemas.microsoft.com/office/drawing/2010/main">
+              <a14:hiddenFill xmlns:a14="http://schemas.microsoft.com/office/drawing/2010/main" xmlns="">
                 <a:solidFill>
                   <a:srgbClr val="FFFFFF"/>
                 </a:solidFill>
@@ -7175,7 +7175,7 @@
           </a:ln>
           <a:extLst>
             <a:ext uri="{909E8E84-426E-40dd-AFC4-6F175D3DCCD1}">
-              <a14:hiddenFill xmlns="" xmlns:a14="http://schemas.microsoft.com/office/drawing/2010/main">
+              <a14:hiddenFill xmlns:a14="http://schemas.microsoft.com/office/drawing/2010/main" xmlns="">
                 <a:solidFill>
                   <a:schemeClr val="accent1"/>
                 </a:solidFill>
@@ -9765,14 +9765,14 @@
           </a:ln>
           <a:extLst>
             <a:ext uri="{909E8E84-426E-40dd-AFC4-6F175D3DCCD1}">
-              <a14:hiddenFill xmlns="" xmlns:a14="http://schemas.microsoft.com/office/drawing/2010/main">
+              <a14:hiddenFill xmlns:a14="http://schemas.microsoft.com/office/drawing/2010/main" xmlns="">
                 <a:solidFill>
                   <a:srgbClr val="FFFFFF"/>
                 </a:solidFill>
               </a14:hiddenFill>
             </a:ext>
             <a:ext uri="{91240B29-F687-4f45-9708-019B960494DF}">
-              <a14:hiddenLine xmlns="" xmlns:a14="http://schemas.microsoft.com/office/drawing/2010/main" w="9525">
+              <a14:hiddenLine xmlns:a14="http://schemas.microsoft.com/office/drawing/2010/main" xmlns="" w="9525">
                 <a:solidFill>
                   <a:srgbClr val="000000"/>
                 </a:solidFill>
@@ -10104,14 +10104,14 @@
           </a:ln>
           <a:extLst>
             <a:ext uri="{909E8E84-426E-40dd-AFC4-6F175D3DCCD1}">
-              <a14:hiddenFill xmlns="" xmlns:a14="http://schemas.microsoft.com/office/drawing/2010/main">
+              <a14:hiddenFill xmlns:a14="http://schemas.microsoft.com/office/drawing/2010/main" xmlns="">
                 <a:solidFill>
                   <a:srgbClr val="FFFFFF"/>
                 </a:solidFill>
               </a14:hiddenFill>
             </a:ext>
             <a:ext uri="{91240B29-F687-4f45-9708-019B960494DF}">
-              <a14:hiddenLine xmlns="" xmlns:a14="http://schemas.microsoft.com/office/drawing/2010/main" w="9525">
+              <a14:hiddenLine xmlns:a14="http://schemas.microsoft.com/office/drawing/2010/main" xmlns="" w="9525">
                 <a:solidFill>
                   <a:srgbClr val="000000"/>
                 </a:solidFill>
@@ -10528,14 +10528,14 @@
           </a:ln>
           <a:extLst>
             <a:ext uri="{909E8E84-426E-40dd-AFC4-6F175D3DCCD1}">
-              <a14:hiddenFill xmlns="" xmlns:a14="http://schemas.microsoft.com/office/drawing/2010/main">
+              <a14:hiddenFill xmlns:a14="http://schemas.microsoft.com/office/drawing/2010/main" xmlns="">
                 <a:solidFill>
                   <a:srgbClr val="FFFFFF"/>
                 </a:solidFill>
               </a14:hiddenFill>
             </a:ext>
             <a:ext uri="{91240B29-F687-4f45-9708-019B960494DF}">
-              <a14:hiddenLine xmlns="" xmlns:a14="http://schemas.microsoft.com/office/drawing/2010/main" w="9525">
+              <a14:hiddenLine xmlns:a14="http://schemas.microsoft.com/office/drawing/2010/main" xmlns="" w="9525">
                 <a:solidFill>
                   <a:srgbClr val="000000"/>
                 </a:solidFill>

</xml_diff>

<commit_message>
Formatting and unicode quote problem now fixed for all shell presentations and first 6 learning_python presentations
</commit_message>
<xml_diff>
--- a/shell/presentations/01_git1.pptx
+++ b/shell/presentations/01_git1.pptx
@@ -6442,25 +6442,25 @@
         <p:spPr/>
         <p:txBody>
           <a:bodyPr>
-            <a:normAutofit fontScale="90000"/>
+            <a:noAutofit/>
           </a:bodyPr>
           <a:lstStyle/>
           <a:p>
             <a:pPr eaLnBrk="1" hangingPunct="1"/>
             <a:r>
-              <a:rPr lang="en-GB" b="1" dirty="0">
+              <a:rPr lang="en-GB" dirty="0">
                 <a:latin typeface="Calibri" charset="0"/>
               </a:rPr>
               <a:t>Managing your code: quietly introducing </a:t>
             </a:r>
             <a:r>
-              <a:rPr lang="en-GB" b="1" i="1" dirty="0">
+              <a:rPr lang="en-GB" i="1" dirty="0">
                 <a:latin typeface="Calibri" charset="0"/>
               </a:rPr>
               <a:t>Git</a:t>
             </a:r>
             <a:r>
-              <a:rPr lang="en-GB" b="1" dirty="0">
+              <a:rPr lang="en-GB" dirty="0">
                 <a:latin typeface="Calibri" charset="0"/>
               </a:rPr>
               <a:t> - a friend for life</a:t>
@@ -6585,7 +6585,7 @@
           </p:cNvPicPr>
           <p:nvPr/>
         </p:nvPicPr>
-        <p:blipFill>
+        <p:blipFill rotWithShape="1">
           <a:blip r:embed="rId2" cstate="email">
             <a:extLst>
               <a:ext uri="{28A0092B-C50C-407E-A947-70E740481C1C}">
@@ -6593,14 +6593,13 @@
               </a:ext>
             </a:extLst>
           </a:blip>
-          <a:stretch>
-            <a:fillRect/>
-          </a:stretch>
+          <a:srcRect l="74621"/>
+          <a:stretch/>
         </p:blipFill>
         <p:spPr>
           <a:xfrm>
-            <a:off x="-6515100" y="2120699"/>
-            <a:ext cx="9144000" cy="1497214"/>
+            <a:off x="308224" y="2120699"/>
+            <a:ext cx="2320675" cy="1497214"/>
           </a:xfrm>
           <a:prstGeom prst="rect">
             <a:avLst/>
@@ -6739,7 +6738,7 @@
         </p:nvCxnSpPr>
         <p:spPr>
           <a:xfrm flipV="1">
-            <a:off x="2984500" y="5435600"/>
+            <a:off x="2121476" y="4603400"/>
             <a:ext cx="952500" cy="12700"/>
           </a:xfrm>
           <a:prstGeom prst="straightConnector1">
@@ -6815,7 +6814,7 @@
         </p:nvSpPr>
         <p:spPr>
           <a:xfrm>
-            <a:off x="1682377" y="4835435"/>
+            <a:off x="819353" y="4003235"/>
             <a:ext cx="1302123" cy="1200329"/>
           </a:xfrm>
           <a:prstGeom prst="rect">
@@ -6978,10 +6977,40 @@
               <a:buAutoNum type="arabicPeriod"/>
             </a:pPr>
             <a:r>
+              <a:rPr lang="en-GB">
+                <a:latin typeface="Calibri" charset="0"/>
+              </a:rPr>
+              <a:t>Click </a:t>
+            </a:r>
+            <a:r>
+              <a:rPr lang="en-GB" smtClean="0">
+                <a:latin typeface="Calibri" charset="0"/>
+              </a:rPr>
+              <a:t>"Clone </a:t>
+            </a:r>
+            <a:r>
               <a:rPr lang="en-GB" dirty="0">
                 <a:latin typeface="Calibri" charset="0"/>
               </a:rPr>
-              <a:t>Click "Clone or download " and copy the link.</a:t>
+              <a:t>or </a:t>
+            </a:r>
+            <a:r>
+              <a:rPr lang="en-GB">
+                <a:latin typeface="Calibri" charset="0"/>
+              </a:rPr>
+              <a:t>download </a:t>
+            </a:r>
+            <a:r>
+              <a:rPr lang="en-GB" smtClean="0">
+                <a:latin typeface="Calibri" charset="0"/>
+              </a:rPr>
+              <a:t>" </a:t>
+            </a:r>
+            <a:r>
+              <a:rPr lang="en-GB" dirty="0">
+                <a:latin typeface="Calibri" charset="0"/>
+              </a:rPr>
+              <a:t>and copy the link.</a:t>
             </a:r>
           </a:p>
           <a:p>
@@ -7914,8 +7943,45 @@
                 <a:latin typeface="Courier New" panose="02070309020205020404" pitchFamily="49" charset="0"/>
                 <a:cs typeface="Courier New" panose="02070309020205020404" pitchFamily="49" charset="0"/>
               </a:rPr>
-              <a:t> commit x -m 'new x file'</a:t>
-            </a:r>
+              <a:t> commit x -m </a:t>
+            </a:r>
+            <a:r>
+              <a:rPr lang="en-US" dirty="0" smtClean="0">
+                <a:solidFill>
+                  <a:schemeClr val="bg1"/>
+                </a:solidFill>
+                <a:latin typeface="Courier New" panose="02070309020205020404" pitchFamily="49" charset="0"/>
+                <a:cs typeface="Courier New" panose="02070309020205020404" pitchFamily="49" charset="0"/>
+              </a:rPr>
+              <a:t>'new </a:t>
+            </a:r>
+            <a:r>
+              <a:rPr lang="en-US" dirty="0">
+                <a:solidFill>
+                  <a:schemeClr val="bg1"/>
+                </a:solidFill>
+                <a:latin typeface="Courier New" panose="02070309020205020404" pitchFamily="49" charset="0"/>
+                <a:cs typeface="Courier New" panose="02070309020205020404" pitchFamily="49" charset="0"/>
+              </a:rPr>
+              <a:t>x </a:t>
+            </a:r>
+            <a:r>
+              <a:rPr lang="en-US" dirty="0" smtClean="0">
+                <a:solidFill>
+                  <a:schemeClr val="bg1"/>
+                </a:solidFill>
+                <a:latin typeface="Courier New" panose="02070309020205020404" pitchFamily="49" charset="0"/>
+                <a:cs typeface="Courier New" panose="02070309020205020404" pitchFamily="49" charset="0"/>
+              </a:rPr>
+              <a:t>file'</a:t>
+            </a:r>
+            <a:endParaRPr lang="en-US" dirty="0">
+              <a:solidFill>
+                <a:schemeClr val="bg1"/>
+              </a:solidFill>
+              <a:latin typeface="Courier New" panose="02070309020205020404" pitchFamily="49" charset="0"/>
+              <a:cs typeface="Courier New" panose="02070309020205020404" pitchFamily="49" charset="0"/>
+            </a:endParaRPr>
           </a:p>
           <a:p>
             <a:r>
@@ -8284,7 +8350,25 @@
                 </a:solidFill>
                 <a:latin typeface="+mn-lt"/>
               </a:rPr>
-              <a:t>Make a blank file “x” </a:t>
+              <a:t>Make a blank </a:t>
+            </a:r>
+            <a:r>
+              <a:rPr lang="en-US" smtClean="0">
+                <a:solidFill>
+                  <a:schemeClr val="bg1"/>
+                </a:solidFill>
+                <a:latin typeface="+mn-lt"/>
+              </a:rPr>
+              <a:t>file </a:t>
+            </a:r>
+            <a:r>
+              <a:rPr lang="en-US" smtClean="0">
+                <a:solidFill>
+                  <a:schemeClr val="bg1"/>
+                </a:solidFill>
+                <a:latin typeface="+mn-lt"/>
+              </a:rPr>
+              <a:t>"x" </a:t>
             </a:r>
             <a:endParaRPr lang="en-US" dirty="0">
               <a:solidFill>
@@ -8450,7 +8534,34 @@
                 </a:solidFill>
                 <a:latin typeface="+mn-lt"/>
               </a:rPr>
-              <a:t> copy of the repo with the changes (in this case adding the “x” file)</a:t>
+              <a:t> copy of the repo with the changes (in this case adding </a:t>
+            </a:r>
+            <a:r>
+              <a:rPr lang="en-US" smtClean="0">
+                <a:solidFill>
+                  <a:schemeClr val="bg1"/>
+                </a:solidFill>
+                <a:latin typeface="+mn-lt"/>
+              </a:rPr>
+              <a:t>the </a:t>
+            </a:r>
+            <a:r>
+              <a:rPr lang="en-US" smtClean="0">
+                <a:solidFill>
+                  <a:schemeClr val="bg1"/>
+                </a:solidFill>
+                <a:latin typeface="+mn-lt"/>
+              </a:rPr>
+              <a:t>"x" </a:t>
+            </a:r>
+            <a:r>
+              <a:rPr lang="en-US" dirty="0" smtClean="0">
+                <a:solidFill>
+                  <a:schemeClr val="bg1"/>
+                </a:solidFill>
+                <a:latin typeface="+mn-lt"/>
+              </a:rPr>
+              <a:t>file)</a:t>
             </a:r>
             <a:endParaRPr lang="en-US" dirty="0">
               <a:solidFill>
@@ -8683,7 +8794,15 @@
           <a:p>
             <a:r>
               <a:rPr lang="en-US" dirty="0" smtClean="0"/>
-              <a:t>Now it’s visible on </a:t>
+              <a:t>Now </a:t>
+            </a:r>
+            <a:r>
+              <a:rPr lang="en-US" dirty="0" smtClean="0"/>
+              <a:t>it's </a:t>
+            </a:r>
+            <a:r>
+              <a:rPr lang="en-US" dirty="0" smtClean="0"/>
+              <a:t>visible on </a:t>
             </a:r>
             <a:r>
               <a:rPr lang="en-US" dirty="0" err="1" smtClean="0"/>
@@ -8773,7 +8892,11 @@
           <a:p>
             <a:r>
               <a:rPr lang="en-US" dirty="0" smtClean="0"/>
-              <a:t>We’ll add more </a:t>
+              <a:t>We'll </a:t>
+            </a:r>
+            <a:r>
+              <a:rPr lang="en-US" dirty="0" smtClean="0"/>
+              <a:t>add more </a:t>
             </a:r>
             <a:r>
               <a:rPr lang="en-US" dirty="0" err="1" smtClean="0"/>
@@ -8804,7 +8927,11 @@
           <a:p>
             <a:r>
               <a:rPr lang="en-US" dirty="0" smtClean="0"/>
-              <a:t>I’ll be back</a:t>
+              <a:t>I'll </a:t>
+            </a:r>
+            <a:r>
+              <a:rPr lang="en-US" dirty="0" smtClean="0"/>
+              <a:t>be back</a:t>
             </a:r>
             <a:r>
               <a:rPr lang="mr-IN" dirty="0" smtClean="0"/>
@@ -8934,13 +9061,70 @@
           <a:lstStyle/>
           <a:p>
             <a:r>
+              <a:rPr lang="en-GB" sz="2800">
+                <a:latin typeface="Calibri" charset="0"/>
+              </a:rPr>
+              <a:t>Create </a:t>
+            </a:r>
+            <a:r>
+              <a:rPr lang="en-GB" sz="2800" smtClean="0">
+                <a:latin typeface="Calibri" charset="0"/>
+              </a:rPr>
+              <a:t>"</a:t>
+            </a:r>
+            <a:r>
+              <a:rPr lang="en-GB" sz="2800" i="1" smtClean="0">
+                <a:solidFill>
+                  <a:srgbClr val="376092"/>
+                </a:solidFill>
+                <a:latin typeface="Calibri" charset="0"/>
+              </a:rPr>
+              <a:t>working_dir</a:t>
+            </a:r>
+            <a:r>
+              <a:rPr lang="en-GB" sz="2800" smtClean="0">
+                <a:latin typeface="Calibri" charset="0"/>
+              </a:rPr>
+              <a:t>"...</a:t>
+            </a:r>
+            <a:r>
               <a:rPr lang="en-GB" sz="2800" dirty="0">
                 <a:latin typeface="Calibri" charset="0"/>
               </a:rPr>
-              <a:t>Create “</a:t>
-            </a:r>
-            <a:r>
-              <a:rPr lang="en-GB" sz="2800" i="1" dirty="0" err="1">
+              <a:t>add some code</a:t>
+            </a:r>
+          </a:p>
+          <a:p>
+            <a:r>
+              <a:rPr lang="en-GB" sz="2800" dirty="0">
+                <a:latin typeface="Calibri" charset="0"/>
+              </a:rPr>
+              <a:t>Write some outputs...change the code</a:t>
+            </a:r>
+          </a:p>
+          <a:p>
+            <a:r>
+              <a:rPr lang="en-GB" sz="2800" dirty="0">
+                <a:latin typeface="Calibri" charset="0"/>
+              </a:rPr>
+              <a:t>Publish a paper...change the code</a:t>
+            </a:r>
+          </a:p>
+          <a:p>
+            <a:r>
+              <a:rPr lang="en-GB" sz="2800">
+                <a:latin typeface="Calibri" charset="0"/>
+              </a:rPr>
+              <a:t>Copy </a:t>
+            </a:r>
+            <a:r>
+              <a:rPr lang="en-GB" sz="2800" smtClean="0">
+                <a:latin typeface="Calibri" charset="0"/>
+              </a:rPr>
+              <a:t>"</a:t>
+            </a:r>
+            <a:r>
+              <a:rPr lang="en-GB" sz="2800" i="1" smtClean="0">
                 <a:solidFill>
                   <a:srgbClr val="376092"/>
                 </a:solidFill>
@@ -8949,65 +9133,41 @@
               <a:t>working_dir</a:t>
             </a:r>
             <a:r>
-              <a:rPr lang="en-GB" sz="2800" dirty="0">
-                <a:latin typeface="Calibri" charset="0"/>
-              </a:rPr>
-              <a:t>”...add some code</a:t>
-            </a:r>
-          </a:p>
-          <a:p>
-            <a:r>
-              <a:rPr lang="en-GB" sz="2800" dirty="0">
-                <a:latin typeface="Calibri" charset="0"/>
-              </a:rPr>
-              <a:t>Write some outputs...change the code</a:t>
-            </a:r>
-          </a:p>
-          <a:p>
-            <a:r>
-              <a:rPr lang="en-GB" sz="2800" dirty="0">
-                <a:latin typeface="Calibri" charset="0"/>
-              </a:rPr>
-              <a:t>Publish a paper...change the code</a:t>
-            </a:r>
-          </a:p>
-          <a:p>
-            <a:r>
-              <a:rPr lang="en-GB" sz="2800" dirty="0">
-                <a:latin typeface="Calibri" charset="0"/>
-              </a:rPr>
-              <a:t>Copy “</a:t>
-            </a:r>
-            <a:r>
-              <a:rPr lang="en-GB" sz="2800" i="1" dirty="0" err="1">
+              <a:rPr lang="en-GB" sz="2800" smtClean="0">
+                <a:latin typeface="Calibri" charset="0"/>
+              </a:rPr>
+              <a:t>" </a:t>
+            </a:r>
+            <a:r>
+              <a:rPr lang="en-GB" sz="2800">
+                <a:latin typeface="Calibri" charset="0"/>
+              </a:rPr>
+              <a:t>to </a:t>
+            </a:r>
+            <a:r>
+              <a:rPr lang="en-GB" sz="2800" smtClean="0">
+                <a:latin typeface="Calibri" charset="0"/>
+              </a:rPr>
+              <a:t>"</a:t>
+            </a:r>
+            <a:r>
+              <a:rPr lang="en-GB" sz="2800" i="1" smtClean="0">
                 <a:solidFill>
                   <a:srgbClr val="376092"/>
                 </a:solidFill>
                 <a:latin typeface="Calibri" charset="0"/>
               </a:rPr>
-              <a:t>working_dir</a:t>
-            </a:r>
-            <a:r>
-              <a:rPr lang="en-GB" sz="2800" dirty="0">
-                <a:latin typeface="Calibri" charset="0"/>
-              </a:rPr>
-              <a:t>” to “</a:t>
-            </a:r>
-            <a:r>
-              <a:rPr lang="en-GB" sz="2800" i="1" dirty="0">
-                <a:solidFill>
-                  <a:srgbClr val="376092"/>
-                </a:solidFill>
-                <a:latin typeface="Calibri" charset="0"/>
-              </a:rPr>
               <a:t>working_dir2</a:t>
             </a:r>
             <a:r>
-              <a:rPr lang="en-GB" sz="2800" dirty="0">
-                <a:latin typeface="Calibri" charset="0"/>
-              </a:rPr>
-              <a:t>”</a:t>
-            </a:r>
+              <a:rPr lang="en-GB" sz="2800" smtClean="0">
+                <a:latin typeface="Calibri" charset="0"/>
+              </a:rPr>
+              <a:t>"</a:t>
+            </a:r>
+            <a:endParaRPr lang="en-GB" sz="2800" dirty="0">
+              <a:latin typeface="Calibri" charset="0"/>
+            </a:endParaRPr>
           </a:p>
           <a:p>
             <a:r>
@@ -9046,34 +9206,43 @@
                 </a:solidFill>
                 <a:latin typeface="Calibri" charset="0"/>
               </a:rPr>
-              <a:t>...now which version is current? Is it </a:t>
-            </a:r>
-            <a:r>
-              <a:rPr lang="en-GB" sz="2800" i="1" dirty="0">
+              <a:t>...now which version is current? Is </a:t>
+            </a:r>
+            <a:r>
+              <a:rPr lang="en-GB" sz="2800" i="1">
+                <a:solidFill>
+                  <a:srgbClr val="404040"/>
+                </a:solidFill>
+                <a:latin typeface="Calibri" charset="0"/>
+              </a:rPr>
+              <a:t>it </a:t>
+            </a:r>
+            <a:r>
+              <a:rPr lang="en-GB" sz="2800" i="1" smtClean="0">
                 <a:solidFill>
                   <a:srgbClr val="002060"/>
                 </a:solidFill>
                 <a:latin typeface="Calibri" charset="0"/>
               </a:rPr>
-              <a:t>“</a:t>
-            </a:r>
-            <a:r>
-              <a:rPr lang="en-GB" sz="2800" i="1" dirty="0" err="1">
+              <a:t>"working_dir" </a:t>
+            </a:r>
+            <a:r>
+              <a:rPr lang="en-GB" sz="2800" i="1">
                 <a:solidFill>
                   <a:srgbClr val="002060"/>
                 </a:solidFill>
                 <a:latin typeface="Calibri" charset="0"/>
               </a:rPr>
-              <a:t>working_dir</a:t>
-            </a:r>
-            <a:r>
-              <a:rPr lang="en-GB" sz="2800" i="1" dirty="0">
+              <a:t>or </a:t>
+            </a:r>
+            <a:r>
+              <a:rPr lang="en-GB" sz="2800" i="1" smtClean="0">
                 <a:solidFill>
                   <a:srgbClr val="002060"/>
                 </a:solidFill>
                 <a:latin typeface="Calibri" charset="0"/>
               </a:rPr>
-              <a:t>” or “working_dir2”? </a:t>
+              <a:t>"working_dir2"? </a:t>
             </a:r>
             <a:r>
               <a:rPr lang="en-GB" sz="2800" i="1" dirty="0">
@@ -9556,7 +9725,25 @@
               <a:rPr lang="en-GB" dirty="0">
                 <a:latin typeface="Calibri" charset="0"/>
               </a:rPr>
-              <a:t>to record our changes, document our workflow and “fix” releases of our code at important steps along the way.</a:t>
+              <a:t>to record our changes, document our workflow </a:t>
+            </a:r>
+            <a:r>
+              <a:rPr lang="en-GB">
+                <a:latin typeface="Calibri" charset="0"/>
+              </a:rPr>
+              <a:t>and </a:t>
+            </a:r>
+            <a:r>
+              <a:rPr lang="en-GB" smtClean="0">
+                <a:latin typeface="Calibri" charset="0"/>
+              </a:rPr>
+              <a:t>"fix" </a:t>
+            </a:r>
+            <a:r>
+              <a:rPr lang="en-GB" dirty="0">
+                <a:latin typeface="Calibri" charset="0"/>
+              </a:rPr>
+              <a:t>releases of our code at important steps along the way.</a:t>
             </a:r>
           </a:p>
         </p:txBody>
@@ -10720,7 +10907,19 @@
               <a:rPr lang="en-GB" dirty="0">
                 <a:latin typeface="Calibri" charset="0"/>
               </a:rPr>
-              <a:t>Anyone can get a free GitHub account - you'll only need to pay if you want </a:t>
+              <a:t>Anyone can get a free GitHub account - </a:t>
+            </a:r>
+            <a:r>
+              <a:rPr lang="en-GB" dirty="0" smtClean="0">
+                <a:latin typeface="Calibri" charset="0"/>
+              </a:rPr>
+              <a:t>you'll </a:t>
+            </a:r>
+            <a:r>
+              <a:rPr lang="en-GB" dirty="0">
+                <a:latin typeface="Calibri" charset="0"/>
+              </a:rPr>
+              <a:t>only need to pay if you want </a:t>
             </a:r>
             <a:r>
               <a:rPr lang="en-GB" i="1" dirty="0">
@@ -10745,10 +10944,16 @@
           </a:p>
           <a:p>
             <a:r>
+              <a:rPr lang="en-GB" dirty="0" smtClean="0">
+                <a:latin typeface="Calibri" charset="0"/>
+              </a:rPr>
+              <a:t>Let's </a:t>
+            </a:r>
+            <a:r>
               <a:rPr lang="en-GB" dirty="0">
                 <a:latin typeface="Calibri" charset="0"/>
               </a:rPr>
-              <a:t>Let's get started… </a:t>
+              <a:t>get started… </a:t>
             </a:r>
             <a:r>
               <a:rPr lang="en-GB" sz="4400" b="1" dirty="0">
@@ -10779,10 +10984,16 @@
           <a:lstStyle/>
           <a:p>
             <a:r>
+              <a:rPr lang="en-GB" dirty="0" smtClean="0">
+                <a:latin typeface="Calibri" charset="0"/>
+              </a:rPr>
+              <a:t>Let's </a:t>
+            </a:r>
+            <a:r>
               <a:rPr lang="en-GB" dirty="0">
                 <a:latin typeface="Calibri" charset="0"/>
               </a:rPr>
-              <a:t>Let's get started with GitHub</a:t>
+              <a:t>get started with GitHub</a:t>
             </a:r>
           </a:p>
         </p:txBody>

</xml_diff>

<commit_message>
Changed template title slide and updated shell presentations to new title slide, more consistent and clean
</commit_message>
<xml_diff>
--- a/shell/presentations/01_git1.pptx
+++ b/shell/presentations/01_git1.pptx
@@ -2,7 +2,7 @@
 <file path=ppt/presentation.xml><?xml version="1.0" encoding="utf-8"?>
 <p:presentation xmlns:a="http://schemas.openxmlformats.org/drawingml/2006/main" xmlns:r="http://schemas.openxmlformats.org/officeDocument/2006/relationships" xmlns:p="http://schemas.openxmlformats.org/presentationml/2006/main" saveSubsetFonts="1">
   <p:sldMasterIdLst>
-    <p:sldMasterId id="2147483693" r:id="rId1"/>
+    <p:sldMasterId id="2147483711" r:id="rId1"/>
   </p:sldMasterIdLst>
   <p:notesMasterIdLst>
     <p:notesMasterId r:id="rId17"/>
@@ -267,7 +267,7 @@
             <a:fld id="{17F80633-BAA2-0049-BDEC-E483C21777A6}" type="datetimeFigureOut">
               <a:rPr lang="en-GB"/>
               <a:pPr/>
-              <a:t>26/09/2018</a:t>
+              <a:t>27/09/2018</a:t>
             </a:fld>
             <a:endParaRPr lang="en-GB"/>
           </a:p>
@@ -619,14 +619,14 @@
           <a:noFill/>
           <a:extLst>
             <a:ext uri="{909E8E84-426E-40dd-AFC4-6F175D3DCCD1}">
-              <a14:hiddenFill xmlns:a14="http://schemas.microsoft.com/office/drawing/2010/main" xmlns="">
+              <a14:hiddenFill xmlns="" xmlns:a14="http://schemas.microsoft.com/office/drawing/2010/main">
                 <a:solidFill>
                   <a:srgbClr val="FFFFFF"/>
                 </a:solidFill>
               </a14:hiddenFill>
             </a:ext>
             <a:ext uri="{91240B29-F687-4f45-9708-019B960494DF}">
-              <a14:hiddenLine xmlns:a14="http://schemas.microsoft.com/office/drawing/2010/main" xmlns="" w="9525">
+              <a14:hiddenLine xmlns="" xmlns:a14="http://schemas.microsoft.com/office/drawing/2010/main" w="9525">
                 <a:solidFill>
                   <a:srgbClr val="000000"/>
                 </a:solidFill>
@@ -799,7 +799,7 @@
           </a:ln>
           <a:extLst>
             <a:ext uri="{FAA26D3D-D897-4be2-8F04-BA451C77F1D7}">
-              <ma14:placeholderFlag xmlns:ma14="http://schemas.microsoft.com/office/mac/drawingml/2011/main" xmlns="" val="1"/>
+              <ma14:placeholderFlag xmlns="" xmlns:ma14="http://schemas.microsoft.com/office/mac/drawingml/2011/main" val="1"/>
             </a:ext>
           </a:extLst>
         </p:spPr>
@@ -822,17 +822,17 @@
           <a:noFill/>
           <a:extLst>
             <a:ext uri="{FAA26D3D-D897-4be2-8F04-BA451C77F1D7}">
-              <ma14:placeholderFlag xmlns:ma14="http://schemas.microsoft.com/office/mac/drawingml/2011/main" xmlns="" val="1"/>
+              <ma14:placeholderFlag xmlns="" xmlns:ma14="http://schemas.microsoft.com/office/mac/drawingml/2011/main" val="1"/>
             </a:ext>
             <a:ext uri="{909E8E84-426E-40dd-AFC4-6F175D3DCCD1}">
-              <a14:hiddenFill xmlns:a14="http://schemas.microsoft.com/office/drawing/2010/main" xmlns="">
+              <a14:hiddenFill xmlns="" xmlns:a14="http://schemas.microsoft.com/office/drawing/2010/main">
                 <a:solidFill>
                   <a:srgbClr val="FFFFFF"/>
                 </a:solidFill>
               </a14:hiddenFill>
             </a:ext>
             <a:ext uri="{91240B29-F687-4f45-9708-019B960494DF}">
-              <a14:hiddenLine xmlns:a14="http://schemas.microsoft.com/office/drawing/2010/main" xmlns="" w="9525">
+              <a14:hiddenLine xmlns="" xmlns:a14="http://schemas.microsoft.com/office/drawing/2010/main" w="9525">
                 <a:solidFill>
                   <a:srgbClr val="000000"/>
                 </a:solidFill>
@@ -911,14 +911,14 @@
           <a:noFill/>
           <a:extLst>
             <a:ext uri="{909E8E84-426E-40dd-AFC4-6F175D3DCCD1}">
-              <a14:hiddenFill xmlns:a14="http://schemas.microsoft.com/office/drawing/2010/main" xmlns="">
+              <a14:hiddenFill xmlns="" xmlns:a14="http://schemas.microsoft.com/office/drawing/2010/main">
                 <a:solidFill>
                   <a:srgbClr val="FFFFFF"/>
                 </a:solidFill>
               </a14:hiddenFill>
             </a:ext>
             <a:ext uri="{91240B29-F687-4f45-9708-019B960494DF}">
-              <a14:hiddenLine xmlns:a14="http://schemas.microsoft.com/office/drawing/2010/main" xmlns="" w="9525">
+              <a14:hiddenLine xmlns="" xmlns:a14="http://schemas.microsoft.com/office/drawing/2010/main" w="9525">
                 <a:solidFill>
                   <a:srgbClr val="000000"/>
                 </a:solidFill>
@@ -1091,7 +1091,7 @@
           </a:ln>
           <a:extLst>
             <a:ext uri="{FAA26D3D-D897-4be2-8F04-BA451C77F1D7}">
-              <ma14:placeholderFlag xmlns:ma14="http://schemas.microsoft.com/office/mac/drawingml/2011/main" xmlns="" val="1"/>
+              <ma14:placeholderFlag xmlns="" xmlns:ma14="http://schemas.microsoft.com/office/mac/drawingml/2011/main" val="1"/>
             </a:ext>
           </a:extLst>
         </p:spPr>
@@ -1114,14 +1114,14 @@
           <a:noFill/>
           <a:extLst>
             <a:ext uri="{909E8E84-426E-40dd-AFC4-6F175D3DCCD1}">
-              <a14:hiddenFill xmlns:a14="http://schemas.microsoft.com/office/drawing/2010/main" xmlns="">
+              <a14:hiddenFill xmlns="" xmlns:a14="http://schemas.microsoft.com/office/drawing/2010/main">
                 <a:solidFill>
                   <a:srgbClr val="FFFFFF"/>
                 </a:solidFill>
               </a14:hiddenFill>
             </a:ext>
             <a:ext uri="{91240B29-F687-4f45-9708-019B960494DF}">
-              <a14:hiddenLine xmlns:a14="http://schemas.microsoft.com/office/drawing/2010/main" xmlns="" w="9525">
+              <a14:hiddenLine xmlns="" xmlns:a14="http://schemas.microsoft.com/office/drawing/2010/main" w="9525">
                 <a:solidFill>
                   <a:srgbClr val="000000"/>
                 </a:solidFill>
@@ -1218,10 +1218,10 @@
           </a:ln>
           <a:extLst>
             <a:ext uri="{FAA26D3D-D897-4be2-8F04-BA451C77F1D7}">
-              <ma14:placeholderFlag xmlns:ma14="http://schemas.microsoft.com/office/mac/drawingml/2011/main" xmlns="" val="1"/>
+              <ma14:placeholderFlag xmlns="" xmlns:ma14="http://schemas.microsoft.com/office/mac/drawingml/2011/main" val="1"/>
             </a:ext>
             <a:ext uri="{909E8E84-426E-40dd-AFC4-6F175D3DCCD1}">
-              <a14:hiddenFill xmlns:a14="http://schemas.microsoft.com/office/drawing/2010/main" xmlns="">
+              <a14:hiddenFill xmlns="" xmlns:a14="http://schemas.microsoft.com/office/drawing/2010/main">
                 <a:solidFill>
                   <a:srgbClr val="FFFFFF"/>
                 </a:solidFill>
@@ -1244,14 +1244,14 @@
           <a:noFill/>
           <a:extLst>
             <a:ext uri="{909E8E84-426E-40dd-AFC4-6F175D3DCCD1}">
-              <a14:hiddenFill xmlns:a14="http://schemas.microsoft.com/office/drawing/2010/main" xmlns="">
+              <a14:hiddenFill xmlns="" xmlns:a14="http://schemas.microsoft.com/office/drawing/2010/main">
                 <a:solidFill>
                   <a:srgbClr val="FFFFFF"/>
                 </a:solidFill>
               </a14:hiddenFill>
             </a:ext>
             <a:ext uri="{91240B29-F687-4f45-9708-019B960494DF}">
-              <a14:hiddenLine xmlns:a14="http://schemas.microsoft.com/office/drawing/2010/main" xmlns="" w="9525">
+              <a14:hiddenLine xmlns="" xmlns:a14="http://schemas.microsoft.com/office/drawing/2010/main" w="9525">
                 <a:solidFill>
                   <a:srgbClr val="000000"/>
                 </a:solidFill>
@@ -1293,14 +1293,14 @@
           <a:noFill/>
           <a:extLst>
             <a:ext uri="{909E8E84-426E-40dd-AFC4-6F175D3DCCD1}">
-              <a14:hiddenFill xmlns:a14="http://schemas.microsoft.com/office/drawing/2010/main" xmlns="">
+              <a14:hiddenFill xmlns="" xmlns:a14="http://schemas.microsoft.com/office/drawing/2010/main">
                 <a:solidFill>
                   <a:srgbClr val="FFFFFF"/>
                 </a:solidFill>
               </a14:hiddenFill>
             </a:ext>
             <a:ext uri="{91240B29-F687-4f45-9708-019B960494DF}">
-              <a14:hiddenLine xmlns:a14="http://schemas.microsoft.com/office/drawing/2010/main" xmlns="" w="9525">
+              <a14:hiddenLine xmlns="" xmlns:a14="http://schemas.microsoft.com/office/drawing/2010/main" w="9525">
                 <a:solidFill>
                   <a:srgbClr val="000000"/>
                 </a:solidFill>
@@ -1479,10 +1479,12 @@
           </a:prstGeom>
         </p:spPr>
         <p:txBody>
-          <a:bodyPr anchor="b"/>
+          <a:bodyPr anchor="b">
+            <a:noAutofit/>
+          </a:bodyPr>
           <a:lstStyle>
             <a:lvl1pPr algn="l">
-              <a:defRPr sz="4000" baseline="0">
+              <a:defRPr sz="6000" baseline="0">
                 <a:solidFill>
                   <a:schemeClr val="tx1"/>
                 </a:solidFill>
@@ -1517,11 +1519,13 @@
           </a:prstGeom>
         </p:spPr>
         <p:txBody>
-          <a:bodyPr/>
+          <a:bodyPr>
+            <a:normAutofit/>
+          </a:bodyPr>
           <a:lstStyle>
             <a:lvl1pPr marL="0" indent="0" algn="l">
               <a:buNone/>
-              <a:defRPr sz="2000">
+              <a:defRPr sz="2400">
                 <a:solidFill>
                   <a:schemeClr val="tx1"/>
                 </a:solidFill>
@@ -1567,48 +1571,6 @@
               <a:rPr lang="en-US" dirty="0"/>
               <a:t>Subheading</a:t>
             </a:r>
-          </a:p>
-        </p:txBody>
-      </p:sp>
-      <p:sp>
-        <p:nvSpPr>
-          <p:cNvPr id="4" name="Date Placeholder 3"/>
-          <p:cNvSpPr>
-            <a:spLocks noGrp="1"/>
-          </p:cNvSpPr>
-          <p:nvPr>
-            <p:ph type="dt" sz="half" idx="10"/>
-          </p:nvPr>
-        </p:nvSpPr>
-        <p:spPr>
-          <a:xfrm>
-            <a:off x="342718" y="4797452"/>
-            <a:ext cx="2057400" cy="365125"/>
-          </a:xfrm>
-          <a:prstGeom prst="rect">
-            <a:avLst/>
-          </a:prstGeom>
-        </p:spPr>
-        <p:txBody>
-          <a:bodyPr/>
-          <a:lstStyle>
-            <a:lvl1pPr>
-              <a:defRPr sz="1600">
-                <a:solidFill>
-                  <a:schemeClr val="tx1"/>
-                </a:solidFill>
-                <a:latin typeface="+mn-lt"/>
-                <a:cs typeface="Arial" panose="020B0604020202020204" pitchFamily="34" charset="0"/>
-              </a:defRPr>
-            </a:lvl1pPr>
-          </a:lstStyle>
-          <a:p>
-            <a:fld id="{EC40E7FB-B30A-A942-A21D-EE0E54040989}" type="datetimeFigureOut">
-              <a:rPr lang="en-GB" smtClean="0"/>
-              <a:pPr/>
-              <a:t>26/09/2018</a:t>
-            </a:fld>
-            <a:endParaRPr lang="en-GB" dirty="0"/>
           </a:p>
         </p:txBody>
       </p:sp>
@@ -1721,7 +1683,7 @@
     </p:spTree>
     <p:extLst>
       <p:ext uri="{BB962C8B-B14F-4D97-AF65-F5344CB8AC3E}">
-        <p14:creationId xmlns:p14="http://schemas.microsoft.com/office/powerpoint/2010/main" val="2862463358"/>
+        <p14:creationId xmlns:p14="http://schemas.microsoft.com/office/powerpoint/2010/main" val="3760468406"/>
       </p:ext>
     </p:extLst>
   </p:cSld>
@@ -1895,7 +1857,7 @@
             <a:fld id="{EC40E7FB-B30A-A942-A21D-EE0E54040989}" type="datetimeFigureOut">
               <a:rPr lang="en-GB" smtClean="0"/>
               <a:pPr/>
-              <a:t>26/09/2018</a:t>
+              <a:t>27/09/2018</a:t>
             </a:fld>
             <a:endParaRPr lang="en-GB"/>
           </a:p>
@@ -1948,7 +1910,7 @@
     </p:spTree>
     <p:extLst>
       <p:ext uri="{BB962C8B-B14F-4D97-AF65-F5344CB8AC3E}">
-        <p14:creationId xmlns:p14="http://schemas.microsoft.com/office/powerpoint/2010/main" val="3510191765"/>
+        <p14:creationId xmlns:p14="http://schemas.microsoft.com/office/powerpoint/2010/main" val="1318461183"/>
       </p:ext>
     </p:extLst>
   </p:cSld>
@@ -2122,7 +2084,7 @@
             <a:fld id="{EC40E7FB-B30A-A942-A21D-EE0E54040989}" type="datetimeFigureOut">
               <a:rPr lang="en-GB" smtClean="0"/>
               <a:pPr/>
-              <a:t>26/09/2018</a:t>
+              <a:t>27/09/2018</a:t>
             </a:fld>
             <a:endParaRPr lang="en-GB"/>
           </a:p>
@@ -2175,7 +2137,7 @@
     </p:spTree>
     <p:extLst>
       <p:ext uri="{BB962C8B-B14F-4D97-AF65-F5344CB8AC3E}">
-        <p14:creationId xmlns:p14="http://schemas.microsoft.com/office/powerpoint/2010/main" val="1639492616"/>
+        <p14:creationId xmlns:p14="http://schemas.microsoft.com/office/powerpoint/2010/main" val="1885008516"/>
       </p:ext>
     </p:extLst>
   </p:cSld>
@@ -3828,7 +3790,7 @@
     </p:spTree>
     <p:extLst>
       <p:ext uri="{BB962C8B-B14F-4D97-AF65-F5344CB8AC3E}">
-        <p14:creationId xmlns:p14="http://schemas.microsoft.com/office/powerpoint/2010/main" val="3040718740"/>
+        <p14:creationId xmlns:p14="http://schemas.microsoft.com/office/powerpoint/2010/main" val="3738347390"/>
       </p:ext>
     </p:extLst>
   </p:cSld>
@@ -5437,7 +5399,7 @@
     </p:spTree>
     <p:extLst>
       <p:ext uri="{BB962C8B-B14F-4D97-AF65-F5344CB8AC3E}">
-        <p14:creationId xmlns:p14="http://schemas.microsoft.com/office/powerpoint/2010/main" val="149446575"/>
+        <p14:creationId xmlns:p14="http://schemas.microsoft.com/office/powerpoint/2010/main" val="3131328726"/>
       </p:ext>
     </p:extLst>
   </p:cSld>
@@ -5592,7 +5554,7 @@
     </p:spTree>
     <p:extLst>
       <p:ext uri="{BB962C8B-B14F-4D97-AF65-F5344CB8AC3E}">
-        <p14:creationId xmlns:p14="http://schemas.microsoft.com/office/powerpoint/2010/main" val="3921297706"/>
+        <p14:creationId xmlns:p14="http://schemas.microsoft.com/office/powerpoint/2010/main" val="3811110833"/>
       </p:ext>
     </p:extLst>
   </p:cSld>
@@ -5722,7 +5684,7 @@
     </p:spTree>
     <p:extLst>
       <p:ext uri="{BB962C8B-B14F-4D97-AF65-F5344CB8AC3E}">
-        <p14:creationId xmlns:p14="http://schemas.microsoft.com/office/powerpoint/2010/main" val="3064370418"/>
+        <p14:creationId xmlns:p14="http://schemas.microsoft.com/office/powerpoint/2010/main" val="1240252212"/>
       </p:ext>
     </p:extLst>
   </p:cSld>
@@ -5767,7 +5729,7 @@
             <a:fld id="{F967FF78-FFF3-D94C-8CB8-21E3487233EA}" type="datetimeFigureOut">
               <a:rPr lang="en-GB" smtClean="0"/>
               <a:pPr/>
-              <a:t>26/09/2018</a:t>
+              <a:t>27/09/2018</a:t>
             </a:fld>
             <a:endParaRPr lang="en-GB"/>
           </a:p>
@@ -5830,7 +5792,7 @@
     </p:spTree>
     <p:extLst>
       <p:ext uri="{BB962C8B-B14F-4D97-AF65-F5344CB8AC3E}">
-        <p14:creationId xmlns:p14="http://schemas.microsoft.com/office/powerpoint/2010/main" val="3998349276"/>
+        <p14:creationId xmlns:p14="http://schemas.microsoft.com/office/powerpoint/2010/main" val="864199034"/>
       </p:ext>
     </p:extLst>
   </p:cSld>
@@ -6114,20 +6076,20 @@
     </p:spTree>
     <p:extLst>
       <p:ext uri="{BB962C8B-B14F-4D97-AF65-F5344CB8AC3E}">
-        <p14:creationId xmlns:p14="http://schemas.microsoft.com/office/powerpoint/2010/main" val="2996498855"/>
+        <p14:creationId xmlns:p14="http://schemas.microsoft.com/office/powerpoint/2010/main" val="1642597135"/>
       </p:ext>
     </p:extLst>
   </p:cSld>
   <p:clrMap bg1="lt1" tx1="dk1" bg2="lt2" tx2="dk2" accent1="accent1" accent2="accent2" accent3="accent3" accent4="accent4" accent5="accent5" accent6="accent6" hlink="hlink" folHlink="folHlink"/>
   <p:sldLayoutIdLst>
-    <p:sldLayoutId id="2147483694" r:id="rId1"/>
-    <p:sldLayoutId id="2147483695" r:id="rId2"/>
-    <p:sldLayoutId id="2147483696" r:id="rId3"/>
-    <p:sldLayoutId id="2147483697" r:id="rId4"/>
-    <p:sldLayoutId id="2147483698" r:id="rId5"/>
-    <p:sldLayoutId id="2147483699" r:id="rId6"/>
-    <p:sldLayoutId id="2147483700" r:id="rId7"/>
-    <p:sldLayoutId id="2147483701" r:id="rId8"/>
+    <p:sldLayoutId id="2147483712" r:id="rId1"/>
+    <p:sldLayoutId id="2147483713" r:id="rId2"/>
+    <p:sldLayoutId id="2147483714" r:id="rId3"/>
+    <p:sldLayoutId id="2147483715" r:id="rId4"/>
+    <p:sldLayoutId id="2147483716" r:id="rId5"/>
+    <p:sldLayoutId id="2147483717" r:id="rId6"/>
+    <p:sldLayoutId id="2147483718" r:id="rId7"/>
+    <p:sldLayoutId id="2147483719" r:id="rId8"/>
   </p:sldLayoutIdLst>
   <p:txStyles>
     <p:titleStyle>
@@ -6448,19 +6410,19 @@
           <a:p>
             <a:pPr eaLnBrk="1" hangingPunct="1"/>
             <a:r>
-              <a:rPr lang="en-GB" dirty="0">
+              <a:rPr lang="en-GB" sz="4000" dirty="0">
                 <a:latin typeface="Calibri" charset="0"/>
               </a:rPr>
               <a:t>Managing your code: quietly introducing </a:t>
             </a:r>
             <a:r>
-              <a:rPr lang="en-GB" i="1" dirty="0">
+              <a:rPr lang="en-GB" sz="4000" i="1" dirty="0">
                 <a:latin typeface="Calibri" charset="0"/>
               </a:rPr>
               <a:t>Git</a:t>
             </a:r>
             <a:r>
-              <a:rPr lang="en-GB" dirty="0">
+              <a:rPr lang="en-GB" sz="4000" dirty="0">
                 <a:latin typeface="Calibri" charset="0"/>
               </a:rPr>
               <a:t> - a friend for life</a:t>
@@ -6630,8 +6592,8 @@
         </p:blipFill>
         <p:spPr>
           <a:xfrm>
-            <a:off x="2221142" y="1357313"/>
-            <a:ext cx="4892215" cy="4351337"/>
+            <a:off x="2125560" y="1357313"/>
+            <a:ext cx="4892879" cy="4351337"/>
           </a:xfrm>
         </p:spPr>
       </p:pic>
@@ -7155,7 +7117,7 @@
           </a:ln>
           <a:extLst>
             <a:ext uri="{909E8E84-426E-40dd-AFC4-6F175D3DCCD1}">
-              <a14:hiddenFill xmlns:a14="http://schemas.microsoft.com/office/drawing/2010/main" xmlns="">
+              <a14:hiddenFill xmlns="" xmlns:a14="http://schemas.microsoft.com/office/drawing/2010/main">
                 <a:solidFill>
                   <a:srgbClr val="FFFFFF"/>
                 </a:solidFill>
@@ -7204,7 +7166,7 @@
           </a:ln>
           <a:extLst>
             <a:ext uri="{909E8E84-426E-40dd-AFC4-6F175D3DCCD1}">
-              <a14:hiddenFill xmlns:a14="http://schemas.microsoft.com/office/drawing/2010/main" xmlns="">
+              <a14:hiddenFill xmlns="" xmlns:a14="http://schemas.microsoft.com/office/drawing/2010/main">
                 <a:solidFill>
                   <a:schemeClr val="accent1"/>
                 </a:solidFill>
@@ -8359,16 +8321,7 @@
                 </a:solidFill>
                 <a:latin typeface="+mn-lt"/>
               </a:rPr>
-              <a:t>file </a:t>
-            </a:r>
-            <a:r>
-              <a:rPr lang="en-US" smtClean="0">
-                <a:solidFill>
-                  <a:schemeClr val="bg1"/>
-                </a:solidFill>
-                <a:latin typeface="+mn-lt"/>
-              </a:rPr>
-              <a:t>"x" </a:t>
+              <a:t>file "x" </a:t>
             </a:r>
             <a:endParaRPr lang="en-US" dirty="0">
               <a:solidFill>
@@ -8543,16 +8496,7 @@
                 </a:solidFill>
                 <a:latin typeface="+mn-lt"/>
               </a:rPr>
-              <a:t>the </a:t>
-            </a:r>
-            <a:r>
-              <a:rPr lang="en-US" smtClean="0">
-                <a:solidFill>
-                  <a:schemeClr val="bg1"/>
-                </a:solidFill>
-                <a:latin typeface="+mn-lt"/>
-              </a:rPr>
-              <a:t>"x" </a:t>
+              <a:t>the "x" </a:t>
             </a:r>
             <a:r>
               <a:rPr lang="en-US" dirty="0" smtClean="0">
@@ -8794,15 +8738,7 @@
           <a:p>
             <a:r>
               <a:rPr lang="en-US" dirty="0" smtClean="0"/>
-              <a:t>Now </a:t>
-            </a:r>
-            <a:r>
-              <a:rPr lang="en-US" dirty="0" smtClean="0"/>
-              <a:t>it's </a:t>
-            </a:r>
-            <a:r>
-              <a:rPr lang="en-US" dirty="0" smtClean="0"/>
-              <a:t>visible on </a:t>
+              <a:t>Now it's visible on </a:t>
             </a:r>
             <a:r>
               <a:rPr lang="en-US" dirty="0" err="1" smtClean="0"/>
@@ -8892,11 +8828,7 @@
           <a:p>
             <a:r>
               <a:rPr lang="en-US" dirty="0" smtClean="0"/>
-              <a:t>We'll </a:t>
-            </a:r>
-            <a:r>
-              <a:rPr lang="en-US" dirty="0" smtClean="0"/>
-              <a:t>add more </a:t>
+              <a:t>We'll add more </a:t>
             </a:r>
             <a:r>
               <a:rPr lang="en-US" dirty="0" err="1" smtClean="0"/>
@@ -8927,11 +8859,7 @@
           <a:p>
             <a:r>
               <a:rPr lang="en-US" dirty="0" smtClean="0"/>
-              <a:t>I'll </a:t>
-            </a:r>
-            <a:r>
-              <a:rPr lang="en-US" dirty="0" smtClean="0"/>
-              <a:t>be back</a:t>
+              <a:t>I'll be back</a:t>
             </a:r>
             <a:r>
               <a:rPr lang="mr-IN" dirty="0" smtClean="0"/>
@@ -9952,14 +9880,14 @@
           </a:ln>
           <a:extLst>
             <a:ext uri="{909E8E84-426E-40dd-AFC4-6F175D3DCCD1}">
-              <a14:hiddenFill xmlns:a14="http://schemas.microsoft.com/office/drawing/2010/main" xmlns="">
+              <a14:hiddenFill xmlns="" xmlns:a14="http://schemas.microsoft.com/office/drawing/2010/main">
                 <a:solidFill>
                   <a:srgbClr val="FFFFFF"/>
                 </a:solidFill>
               </a14:hiddenFill>
             </a:ext>
             <a:ext uri="{91240B29-F687-4f45-9708-019B960494DF}">
-              <a14:hiddenLine xmlns:a14="http://schemas.microsoft.com/office/drawing/2010/main" xmlns="" w="9525">
+              <a14:hiddenLine xmlns="" xmlns:a14="http://schemas.microsoft.com/office/drawing/2010/main" w="9525">
                 <a:solidFill>
                   <a:srgbClr val="000000"/>
                 </a:solidFill>
@@ -10291,14 +10219,14 @@
           </a:ln>
           <a:extLst>
             <a:ext uri="{909E8E84-426E-40dd-AFC4-6F175D3DCCD1}">
-              <a14:hiddenFill xmlns:a14="http://schemas.microsoft.com/office/drawing/2010/main" xmlns="">
+              <a14:hiddenFill xmlns="" xmlns:a14="http://schemas.microsoft.com/office/drawing/2010/main">
                 <a:solidFill>
                   <a:srgbClr val="FFFFFF"/>
                 </a:solidFill>
               </a14:hiddenFill>
             </a:ext>
             <a:ext uri="{91240B29-F687-4f45-9708-019B960494DF}">
-              <a14:hiddenLine xmlns:a14="http://schemas.microsoft.com/office/drawing/2010/main" xmlns="" w="9525">
+              <a14:hiddenLine xmlns="" xmlns:a14="http://schemas.microsoft.com/office/drawing/2010/main" w="9525">
                 <a:solidFill>
                   <a:srgbClr val="000000"/>
                 </a:solidFill>
@@ -10715,14 +10643,14 @@
           </a:ln>
           <a:extLst>
             <a:ext uri="{909E8E84-426E-40dd-AFC4-6F175D3DCCD1}">
-              <a14:hiddenFill xmlns:a14="http://schemas.microsoft.com/office/drawing/2010/main" xmlns="">
+              <a14:hiddenFill xmlns="" xmlns:a14="http://schemas.microsoft.com/office/drawing/2010/main">
                 <a:solidFill>
                   <a:srgbClr val="FFFFFF"/>
                 </a:solidFill>
               </a14:hiddenFill>
             </a:ext>
             <a:ext uri="{91240B29-F687-4f45-9708-019B960494DF}">
-              <a14:hiddenLine xmlns:a14="http://schemas.microsoft.com/office/drawing/2010/main" xmlns="" w="9525">
+              <a14:hiddenLine xmlns="" xmlns:a14="http://schemas.microsoft.com/office/drawing/2010/main" w="9525">
                 <a:solidFill>
                   <a:srgbClr val="000000"/>
                 </a:solidFill>
@@ -10893,12 +10821,7 @@
             <p:ph idx="1"/>
           </p:nvPr>
         </p:nvSpPr>
-        <p:spPr>
-          <a:xfrm>
-            <a:off x="448235" y="1356702"/>
-            <a:ext cx="8247530" cy="4351338"/>
-          </a:xfrm>
-        </p:spPr>
+        <p:spPr/>
         <p:txBody>
           <a:bodyPr/>
           <a:lstStyle/>
@@ -11033,12 +10956,7 @@
             <p:ph idx="1"/>
           </p:nvPr>
         </p:nvSpPr>
-        <p:spPr>
-          <a:xfrm>
-            <a:off x="448235" y="1356702"/>
-            <a:ext cx="8247530" cy="4351338"/>
-          </a:xfrm>
-        </p:spPr>
+        <p:spPr/>
         <p:txBody>
           <a:bodyPr/>
           <a:lstStyle/>
@@ -11643,7 +11561,7 @@
   <a:extraClrSchemeLst/>
   <a:extLst>
     <a:ext uri="{05A4C25C-085E-4340-85A3-A5531E510DB2}">
-      <thm15:themeFamily xmlns:thm15="http://schemas.microsoft.com/office/thememl/2012/main" name="UKRI-stfc-nerc-ceda-ncas-nceo-Presentation-Template.pptx" id="{16196DC8-0494-474D-9935-E7D06E7DAD21}" vid="{73A0A59C-1B13-40E9-B94A-99F65E47A944}"/>
+      <thm15:themeFamily xmlns:thm15="http://schemas.microsoft.com/office/thememl/2012/main" name="UKRI-stfc-nerc-ceda-ncas-nceo-Presentation-Template.pptx" id="{3736A5D0-76B6-4662-A043-28C0DDEBD04C}" vid="{B185B2AC-9719-4A75-B66D-4B9C98123E3E}"/>
     </a:ext>
   </a:extLst>
 </a:theme>

</xml_diff>

<commit_message>
Finished read_write_data1-6 presentations and checked where relevant, updated title of 3 shell presentations, updated and tested some example code to python3
</commit_message>
<xml_diff>
--- a/shell/presentations/01_git1.pptx
+++ b/shell/presentations/01_git1.pptx
@@ -267,7 +267,7 @@
             <a:fld id="{17F80633-BAA2-0049-BDEC-E483C21777A6}" type="datetimeFigureOut">
               <a:rPr lang="en-GB"/>
               <a:pPr/>
-              <a:t>27/09/2018</a:t>
+              <a:t>03/10/2018</a:t>
             </a:fld>
             <a:endParaRPr lang="en-GB"/>
           </a:p>
@@ -619,14 +619,14 @@
           <a:noFill/>
           <a:extLst>
             <a:ext uri="{909E8E84-426E-40dd-AFC4-6F175D3DCCD1}">
-              <a14:hiddenFill xmlns="" xmlns:a14="http://schemas.microsoft.com/office/drawing/2010/main">
+              <a14:hiddenFill xmlns:a14="http://schemas.microsoft.com/office/drawing/2010/main" xmlns="">
                 <a:solidFill>
                   <a:srgbClr val="FFFFFF"/>
                 </a:solidFill>
               </a14:hiddenFill>
             </a:ext>
             <a:ext uri="{91240B29-F687-4f45-9708-019B960494DF}">
-              <a14:hiddenLine xmlns="" xmlns:a14="http://schemas.microsoft.com/office/drawing/2010/main" w="9525">
+              <a14:hiddenLine xmlns:a14="http://schemas.microsoft.com/office/drawing/2010/main" xmlns="" w="9525">
                 <a:solidFill>
                   <a:srgbClr val="000000"/>
                 </a:solidFill>
@@ -799,7 +799,7 @@
           </a:ln>
           <a:extLst>
             <a:ext uri="{FAA26D3D-D897-4be2-8F04-BA451C77F1D7}">
-              <ma14:placeholderFlag xmlns="" xmlns:ma14="http://schemas.microsoft.com/office/mac/drawingml/2011/main" val="1"/>
+              <ma14:placeholderFlag xmlns:ma14="http://schemas.microsoft.com/office/mac/drawingml/2011/main" xmlns="" val="1"/>
             </a:ext>
           </a:extLst>
         </p:spPr>
@@ -822,17 +822,17 @@
           <a:noFill/>
           <a:extLst>
             <a:ext uri="{FAA26D3D-D897-4be2-8F04-BA451C77F1D7}">
-              <ma14:placeholderFlag xmlns="" xmlns:ma14="http://schemas.microsoft.com/office/mac/drawingml/2011/main" val="1"/>
+              <ma14:placeholderFlag xmlns:ma14="http://schemas.microsoft.com/office/mac/drawingml/2011/main" xmlns="" val="1"/>
             </a:ext>
             <a:ext uri="{909E8E84-426E-40dd-AFC4-6F175D3DCCD1}">
-              <a14:hiddenFill xmlns="" xmlns:a14="http://schemas.microsoft.com/office/drawing/2010/main">
+              <a14:hiddenFill xmlns:a14="http://schemas.microsoft.com/office/drawing/2010/main" xmlns="">
                 <a:solidFill>
                   <a:srgbClr val="FFFFFF"/>
                 </a:solidFill>
               </a14:hiddenFill>
             </a:ext>
             <a:ext uri="{91240B29-F687-4f45-9708-019B960494DF}">
-              <a14:hiddenLine xmlns="" xmlns:a14="http://schemas.microsoft.com/office/drawing/2010/main" w="9525">
+              <a14:hiddenLine xmlns:a14="http://schemas.microsoft.com/office/drawing/2010/main" xmlns="" w="9525">
                 <a:solidFill>
                   <a:srgbClr val="000000"/>
                 </a:solidFill>
@@ -911,14 +911,14 @@
           <a:noFill/>
           <a:extLst>
             <a:ext uri="{909E8E84-426E-40dd-AFC4-6F175D3DCCD1}">
-              <a14:hiddenFill xmlns="" xmlns:a14="http://schemas.microsoft.com/office/drawing/2010/main">
+              <a14:hiddenFill xmlns:a14="http://schemas.microsoft.com/office/drawing/2010/main" xmlns="">
                 <a:solidFill>
                   <a:srgbClr val="FFFFFF"/>
                 </a:solidFill>
               </a14:hiddenFill>
             </a:ext>
             <a:ext uri="{91240B29-F687-4f45-9708-019B960494DF}">
-              <a14:hiddenLine xmlns="" xmlns:a14="http://schemas.microsoft.com/office/drawing/2010/main" w="9525">
+              <a14:hiddenLine xmlns:a14="http://schemas.microsoft.com/office/drawing/2010/main" xmlns="" w="9525">
                 <a:solidFill>
                   <a:srgbClr val="000000"/>
                 </a:solidFill>
@@ -1091,7 +1091,7 @@
           </a:ln>
           <a:extLst>
             <a:ext uri="{FAA26D3D-D897-4be2-8F04-BA451C77F1D7}">
-              <ma14:placeholderFlag xmlns="" xmlns:ma14="http://schemas.microsoft.com/office/mac/drawingml/2011/main" val="1"/>
+              <ma14:placeholderFlag xmlns:ma14="http://schemas.microsoft.com/office/mac/drawingml/2011/main" xmlns="" val="1"/>
             </a:ext>
           </a:extLst>
         </p:spPr>
@@ -1114,14 +1114,14 @@
           <a:noFill/>
           <a:extLst>
             <a:ext uri="{909E8E84-426E-40dd-AFC4-6F175D3DCCD1}">
-              <a14:hiddenFill xmlns="" xmlns:a14="http://schemas.microsoft.com/office/drawing/2010/main">
+              <a14:hiddenFill xmlns:a14="http://schemas.microsoft.com/office/drawing/2010/main" xmlns="">
                 <a:solidFill>
                   <a:srgbClr val="FFFFFF"/>
                 </a:solidFill>
               </a14:hiddenFill>
             </a:ext>
             <a:ext uri="{91240B29-F687-4f45-9708-019B960494DF}">
-              <a14:hiddenLine xmlns="" xmlns:a14="http://schemas.microsoft.com/office/drawing/2010/main" w="9525">
+              <a14:hiddenLine xmlns:a14="http://schemas.microsoft.com/office/drawing/2010/main" xmlns="" w="9525">
                 <a:solidFill>
                   <a:srgbClr val="000000"/>
                 </a:solidFill>
@@ -1218,10 +1218,10 @@
           </a:ln>
           <a:extLst>
             <a:ext uri="{FAA26D3D-D897-4be2-8F04-BA451C77F1D7}">
-              <ma14:placeholderFlag xmlns="" xmlns:ma14="http://schemas.microsoft.com/office/mac/drawingml/2011/main" val="1"/>
+              <ma14:placeholderFlag xmlns:ma14="http://schemas.microsoft.com/office/mac/drawingml/2011/main" xmlns="" val="1"/>
             </a:ext>
             <a:ext uri="{909E8E84-426E-40dd-AFC4-6F175D3DCCD1}">
-              <a14:hiddenFill xmlns="" xmlns:a14="http://schemas.microsoft.com/office/drawing/2010/main">
+              <a14:hiddenFill xmlns:a14="http://schemas.microsoft.com/office/drawing/2010/main" xmlns="">
                 <a:solidFill>
                   <a:srgbClr val="FFFFFF"/>
                 </a:solidFill>
@@ -1244,14 +1244,14 @@
           <a:noFill/>
           <a:extLst>
             <a:ext uri="{909E8E84-426E-40dd-AFC4-6F175D3DCCD1}">
-              <a14:hiddenFill xmlns="" xmlns:a14="http://schemas.microsoft.com/office/drawing/2010/main">
+              <a14:hiddenFill xmlns:a14="http://schemas.microsoft.com/office/drawing/2010/main" xmlns="">
                 <a:solidFill>
                   <a:srgbClr val="FFFFFF"/>
                 </a:solidFill>
               </a14:hiddenFill>
             </a:ext>
             <a:ext uri="{91240B29-F687-4f45-9708-019B960494DF}">
-              <a14:hiddenLine xmlns="" xmlns:a14="http://schemas.microsoft.com/office/drawing/2010/main" w="9525">
+              <a14:hiddenLine xmlns:a14="http://schemas.microsoft.com/office/drawing/2010/main" xmlns="" w="9525">
                 <a:solidFill>
                   <a:srgbClr val="000000"/>
                 </a:solidFill>
@@ -1293,14 +1293,14 @@
           <a:noFill/>
           <a:extLst>
             <a:ext uri="{909E8E84-426E-40dd-AFC4-6F175D3DCCD1}">
-              <a14:hiddenFill xmlns="" xmlns:a14="http://schemas.microsoft.com/office/drawing/2010/main">
+              <a14:hiddenFill xmlns:a14="http://schemas.microsoft.com/office/drawing/2010/main" xmlns="">
                 <a:solidFill>
                   <a:srgbClr val="FFFFFF"/>
                 </a:solidFill>
               </a14:hiddenFill>
             </a:ext>
             <a:ext uri="{91240B29-F687-4f45-9708-019B960494DF}">
-              <a14:hiddenLine xmlns="" xmlns:a14="http://schemas.microsoft.com/office/drawing/2010/main" w="9525">
+              <a14:hiddenLine xmlns:a14="http://schemas.microsoft.com/office/drawing/2010/main" xmlns="" w="9525">
                 <a:solidFill>
                   <a:srgbClr val="000000"/>
                 </a:solidFill>
@@ -1857,7 +1857,7 @@
             <a:fld id="{EC40E7FB-B30A-A942-A21D-EE0E54040989}" type="datetimeFigureOut">
               <a:rPr lang="en-GB" smtClean="0"/>
               <a:pPr/>
-              <a:t>27/09/2018</a:t>
+              <a:t>03/10/2018</a:t>
             </a:fld>
             <a:endParaRPr lang="en-GB"/>
           </a:p>
@@ -2084,7 +2084,7 @@
             <a:fld id="{EC40E7FB-B30A-A942-A21D-EE0E54040989}" type="datetimeFigureOut">
               <a:rPr lang="en-GB" smtClean="0"/>
               <a:pPr/>
-              <a:t>27/09/2018</a:t>
+              <a:t>03/10/2018</a:t>
             </a:fld>
             <a:endParaRPr lang="en-GB"/>
           </a:p>
@@ -5729,7 +5729,7 @@
             <a:fld id="{F967FF78-FFF3-D94C-8CB8-21E3487233EA}" type="datetimeFigureOut">
               <a:rPr lang="en-GB" smtClean="0"/>
               <a:pPr/>
-              <a:t>27/09/2018</a:t>
+              <a:t>03/10/2018</a:t>
             </a:fld>
             <a:endParaRPr lang="en-GB"/>
           </a:p>
@@ -6410,29 +6410,133 @@
           <a:p>
             <a:pPr eaLnBrk="1" hangingPunct="1"/>
             <a:r>
-              <a:rPr lang="en-GB" sz="4000" dirty="0">
-                <a:latin typeface="Calibri" charset="0"/>
-              </a:rPr>
-              <a:t>Managing your code: quietly introducing </a:t>
-            </a:r>
-            <a:r>
-              <a:rPr lang="en-GB" sz="4000" i="1" dirty="0">
-                <a:latin typeface="Calibri" charset="0"/>
-              </a:rPr>
-              <a:t>Git</a:t>
-            </a:r>
-            <a:r>
-              <a:rPr lang="en-GB" sz="4000" dirty="0">
-                <a:latin typeface="Calibri" charset="0"/>
-              </a:rPr>
-              <a:t> - a friend for life</a:t>
-            </a:r>
+              <a:rPr lang="en-GB" dirty="0" smtClean="0">
+                <a:latin typeface="Calibri" charset="0"/>
+              </a:rPr>
+              <a:t>The Unix Shell</a:t>
+            </a:r>
+            <a:endParaRPr lang="en-GB" dirty="0">
+              <a:latin typeface="Calibri" charset="0"/>
+            </a:endParaRPr>
           </a:p>
         </p:txBody>
       </p:sp>
       <p:sp>
         <p:nvSpPr>
-          <p:cNvPr id="6" name="Subtitle 2"/>
+          <p:cNvPr id="4" name="Subtitle 2"/>
+          <p:cNvSpPr txBox="1">
+            <a:spLocks/>
+          </p:cNvSpPr>
+          <p:nvPr/>
+        </p:nvSpPr>
+        <p:spPr>
+          <a:xfrm>
+            <a:off x="342900" y="4754563"/>
+            <a:ext cx="8621713" cy="1266825"/>
+          </a:xfrm>
+          <a:prstGeom prst="rect">
+            <a:avLst/>
+          </a:prstGeom>
+        </p:spPr>
+        <p:txBody>
+          <a:bodyPr>
+            <a:normAutofit/>
+          </a:bodyPr>
+          <a:lstStyle/>
+          <a:p>
+            <a:pPr marL="342900" indent="-342900" eaLnBrk="1" fontAlgn="auto" hangingPunct="1">
+              <a:spcBef>
+                <a:spcPct val="20000"/>
+              </a:spcBef>
+              <a:spcAft>
+                <a:spcPts val="0"/>
+              </a:spcAft>
+              <a:defRPr/>
+            </a:pPr>
+            <a:r>
+              <a:rPr lang="en-GB" sz="1400" dirty="0">
+                <a:solidFill>
+                  <a:srgbClr val="002060"/>
+                </a:solidFill>
+                <a:latin typeface="+mn-lt"/>
+                <a:cs typeface="+mn-cs"/>
+              </a:rPr>
+              <a:t>Thanks to all contributors:</a:t>
+            </a:r>
+          </a:p>
+          <a:p>
+            <a:pPr eaLnBrk="1" fontAlgn="auto" hangingPunct="1">
+              <a:spcAft>
+                <a:spcPts val="0"/>
+              </a:spcAft>
+              <a:buFont typeface="Arial" pitchFamily="34" charset="0"/>
+              <a:buNone/>
+              <a:defRPr/>
+            </a:pPr>
+            <a:endParaRPr lang="en-GB" sz="1400" dirty="0">
+              <a:solidFill>
+                <a:srgbClr val="002060"/>
+              </a:solidFill>
+              <a:latin typeface="+mn-lt"/>
+            </a:endParaRPr>
+          </a:p>
+          <a:p>
+            <a:pPr eaLnBrk="1" fontAlgn="auto" hangingPunct="1">
+              <a:spcAft>
+                <a:spcPts val="0"/>
+              </a:spcAft>
+              <a:buFont typeface="Arial" pitchFamily="34" charset="0"/>
+              <a:buNone/>
+              <a:defRPr/>
+            </a:pPr>
+            <a:r>
+              <a:rPr lang="en-GB" sz="1400" dirty="0">
+                <a:latin typeface="+mn-lt"/>
+              </a:rPr>
+              <a:t>Alison </a:t>
+            </a:r>
+            <a:r>
+              <a:rPr lang="en-GB" sz="1400" dirty="0" err="1">
+                <a:latin typeface="+mn-lt"/>
+              </a:rPr>
+              <a:t>Pamment</a:t>
+            </a:r>
+            <a:r>
+              <a:rPr lang="en-GB" sz="1400" dirty="0">
+                <a:latin typeface="+mn-lt"/>
+              </a:rPr>
+              <a:t>, Sam </a:t>
+            </a:r>
+            <a:r>
+              <a:rPr lang="en-GB" sz="1400" dirty="0" err="1">
+                <a:latin typeface="+mn-lt"/>
+              </a:rPr>
+              <a:t>Pepler</a:t>
+            </a:r>
+            <a:r>
+              <a:rPr lang="en-GB" sz="1400" dirty="0">
+                <a:latin typeface="+mn-lt"/>
+              </a:rPr>
+              <a:t>, Ag Stephens, Stephen Pascoe, Kevin Marsh,  Anabelle Guillory, Graham Parton, Esther Conway, Eduardo </a:t>
+            </a:r>
+            <a:r>
+              <a:rPr lang="en-GB" sz="1400" dirty="0" err="1">
+                <a:latin typeface="+mn-lt"/>
+              </a:rPr>
+              <a:t>Damasio</a:t>
+            </a:r>
+            <a:r>
+              <a:rPr lang="en-GB" sz="1400" dirty="0">
+                <a:latin typeface="+mn-lt"/>
+              </a:rPr>
+              <a:t> Da Costa, Wendy Garland, Alan Iwi and Matt Pritchard.</a:t>
+            </a:r>
+          </a:p>
+        </p:txBody>
+      </p:sp>
+      <p:sp>
+        <p:nvSpPr>
+          <p:cNvPr id="2" name="Subtitle 1"/>
           <p:cNvSpPr>
             <a:spLocks noGrp="1"/>
           </p:cNvSpPr>
@@ -6443,67 +6547,34 @@
         <p:spPr>
           <a:xfrm>
             <a:off x="342355" y="4202927"/>
-            <a:ext cx="6858000" cy="1478682"/>
+            <a:ext cx="8318760" cy="551951"/>
           </a:xfrm>
         </p:spPr>
         <p:txBody>
-          <a:bodyPr rtlCol="0">
+          <a:bodyPr>
             <a:noAutofit/>
           </a:bodyPr>
           <a:lstStyle/>
           <a:p>
-            <a:pPr eaLnBrk="1" fontAlgn="auto" hangingPunct="1">
-              <a:spcAft>
-                <a:spcPts val="0"/>
-              </a:spcAft>
-              <a:buFont typeface="Arial" pitchFamily="34" charset="0"/>
-              <a:buNone/>
-              <a:defRPr/>
-            </a:pPr>
-            <a:r>
-              <a:rPr lang="en-GB" sz="1800" dirty="0" smtClean="0">
-                <a:solidFill>
-                  <a:srgbClr val="002060"/>
-                </a:solidFill>
-                <a:ea typeface="+mn-ea"/>
-              </a:rPr>
-              <a:t>Thanks to all contributors:</a:t>
-            </a:r>
-          </a:p>
-          <a:p>
-            <a:pPr eaLnBrk="1" fontAlgn="auto" hangingPunct="1">
-              <a:spcAft>
-                <a:spcPts val="0"/>
-              </a:spcAft>
-              <a:buFont typeface="Arial" pitchFamily="34" charset="0"/>
-              <a:buNone/>
-              <a:defRPr/>
-            </a:pPr>
-            <a:endParaRPr lang="en-GB" sz="1800" dirty="0" smtClean="0">
-              <a:solidFill>
-                <a:srgbClr val="002060"/>
-              </a:solidFill>
-              <a:ea typeface="+mn-ea"/>
-            </a:endParaRPr>
-          </a:p>
-          <a:p>
-            <a:pPr eaLnBrk="1" fontAlgn="auto" hangingPunct="1">
-              <a:spcAft>
-                <a:spcPts val="0"/>
-              </a:spcAft>
-              <a:buFont typeface="Arial" pitchFamily="34" charset="0"/>
-              <a:buNone/>
-              <a:defRPr/>
-            </a:pPr>
-            <a:r>
-              <a:rPr lang="en-GB" sz="1800" dirty="0" smtClean="0">
-                <a:solidFill>
-                  <a:schemeClr val="tx1"/>
-                </a:solidFill>
-                <a:ea typeface="+mn-ea"/>
-              </a:rPr>
-              <a:t>Alison Pamment, Sam Pepler, Ag Stephens, Stephen Pascoe, Kevin Marsh,  Anabelle Guillory, Graham Parton, Esther Conway, Eduardo Damasio Da Costa, Wendy Garland, Alan Iwi and Matt Pritchard.</a:t>
-            </a:r>
+            <a:r>
+              <a:rPr lang="en-GB" dirty="0">
+                <a:latin typeface="Calibri" charset="0"/>
+              </a:rPr>
+              <a:t>Managing your code: quietly introducing </a:t>
+            </a:r>
+            <a:r>
+              <a:rPr lang="en-GB" i="1" dirty="0">
+                <a:latin typeface="Calibri" charset="0"/>
+              </a:rPr>
+              <a:t>Git</a:t>
+            </a:r>
+            <a:r>
+              <a:rPr lang="en-GB" dirty="0">
+                <a:latin typeface="Calibri" charset="0"/>
+              </a:rPr>
+              <a:t> - a friend for life</a:t>
+            </a:r>
+            <a:endParaRPr lang="en-GB" dirty="0"/>
           </a:p>
         </p:txBody>
       </p:sp>
@@ -7117,7 +7188,7 @@
           </a:ln>
           <a:extLst>
             <a:ext uri="{909E8E84-426E-40dd-AFC4-6F175D3DCCD1}">
-              <a14:hiddenFill xmlns="" xmlns:a14="http://schemas.microsoft.com/office/drawing/2010/main">
+              <a14:hiddenFill xmlns:a14="http://schemas.microsoft.com/office/drawing/2010/main" xmlns="">
                 <a:solidFill>
                   <a:srgbClr val="FFFFFF"/>
                 </a:solidFill>
@@ -7166,7 +7237,7 @@
           </a:ln>
           <a:extLst>
             <a:ext uri="{909E8E84-426E-40dd-AFC4-6F175D3DCCD1}">
-              <a14:hiddenFill xmlns="" xmlns:a14="http://schemas.microsoft.com/office/drawing/2010/main">
+              <a14:hiddenFill xmlns:a14="http://schemas.microsoft.com/office/drawing/2010/main" xmlns="">
                 <a:solidFill>
                   <a:schemeClr val="accent1"/>
                 </a:solidFill>
@@ -9880,14 +9951,14 @@
           </a:ln>
           <a:extLst>
             <a:ext uri="{909E8E84-426E-40dd-AFC4-6F175D3DCCD1}">
-              <a14:hiddenFill xmlns="" xmlns:a14="http://schemas.microsoft.com/office/drawing/2010/main">
+              <a14:hiddenFill xmlns:a14="http://schemas.microsoft.com/office/drawing/2010/main" xmlns="">
                 <a:solidFill>
                   <a:srgbClr val="FFFFFF"/>
                 </a:solidFill>
               </a14:hiddenFill>
             </a:ext>
             <a:ext uri="{91240B29-F687-4f45-9708-019B960494DF}">
-              <a14:hiddenLine xmlns="" xmlns:a14="http://schemas.microsoft.com/office/drawing/2010/main" w="9525">
+              <a14:hiddenLine xmlns:a14="http://schemas.microsoft.com/office/drawing/2010/main" xmlns="" w="9525">
                 <a:solidFill>
                   <a:srgbClr val="000000"/>
                 </a:solidFill>
@@ -10219,14 +10290,14 @@
           </a:ln>
           <a:extLst>
             <a:ext uri="{909E8E84-426E-40dd-AFC4-6F175D3DCCD1}">
-              <a14:hiddenFill xmlns="" xmlns:a14="http://schemas.microsoft.com/office/drawing/2010/main">
+              <a14:hiddenFill xmlns:a14="http://schemas.microsoft.com/office/drawing/2010/main" xmlns="">
                 <a:solidFill>
                   <a:srgbClr val="FFFFFF"/>
                 </a:solidFill>
               </a14:hiddenFill>
             </a:ext>
             <a:ext uri="{91240B29-F687-4f45-9708-019B960494DF}">
-              <a14:hiddenLine xmlns="" xmlns:a14="http://schemas.microsoft.com/office/drawing/2010/main" w="9525">
+              <a14:hiddenLine xmlns:a14="http://schemas.microsoft.com/office/drawing/2010/main" xmlns="" w="9525">
                 <a:solidFill>
                   <a:srgbClr val="000000"/>
                 </a:solidFill>
@@ -10643,14 +10714,14 @@
           </a:ln>
           <a:extLst>
             <a:ext uri="{909E8E84-426E-40dd-AFC4-6F175D3DCCD1}">
-              <a14:hiddenFill xmlns="" xmlns:a14="http://schemas.microsoft.com/office/drawing/2010/main">
+              <a14:hiddenFill xmlns:a14="http://schemas.microsoft.com/office/drawing/2010/main" xmlns="">
                 <a:solidFill>
                   <a:srgbClr val="FFFFFF"/>
                 </a:solidFill>
               </a14:hiddenFill>
             </a:ext>
             <a:ext uri="{91240B29-F687-4f45-9708-019B960494DF}">
-              <a14:hiddenLine xmlns="" xmlns:a14="http://schemas.microsoft.com/office/drawing/2010/main" w="9525">
+              <a14:hiddenLine xmlns:a14="http://schemas.microsoft.com/office/drawing/2010/main" xmlns="" w="9525">
                 <a:solidFill>
                   <a:srgbClr val="000000"/>
                 </a:solidFill>

</xml_diff>